<commit_message>
removed block diagram contents in list form
</commit_message>
<xml_diff>
--- a/automated_soldering_machine.pptx
+++ b/automated_soldering_machine.pptx
@@ -5,15 +5,14 @@
     <p:sldMasterId id="2147483678" r:id="rId1"/>
   </p:sldMasterIdLst>
   <p:notesMasterIdLst>
-    <p:notesMasterId r:id="rId8"/>
+    <p:notesMasterId r:id="rId7"/>
   </p:notesMasterIdLst>
   <p:sldIdLst>
     <p:sldId id="256" r:id="rId2"/>
     <p:sldId id="257" r:id="rId3"/>
     <p:sldId id="258" r:id="rId4"/>
     <p:sldId id="259" r:id="rId5"/>
-    <p:sldId id="260" r:id="rId6"/>
-    <p:sldId id="261" r:id="rId7"/>
+    <p:sldId id="261" r:id="rId6"/>
   </p:sldIdLst>
   <p:sldSz cx="12192000" cy="6858000"/>
   <p:notesSz cx="6858000" cy="9144000"/>
@@ -202,7 +201,7 @@
           <a:p>
             <a:fld id="{6B1ABE9E-7FB6-47FC-BE31-5609706269A3}" type="datetimeFigureOut">
               <a:rPr lang="en-US" smtClean="0"/>
-              <a:t>1/2/2021</a:t>
+              <a:t>1/4/2021</a:t>
             </a:fld>
             <a:endParaRPr lang="en-US"/>
           </a:p>
@@ -4745,7 +4744,7 @@
           <a:p>
             <a:fld id="{9453E4B6-66BA-4B33-AFCD-F6084AE9AFDC}" type="datetime1">
               <a:rPr lang="en-US" smtClean="0"/>
-              <a:t>1/2/2021</a:t>
+              <a:t>1/4/2021</a:t>
             </a:fld>
             <a:endParaRPr lang="en-US"/>
           </a:p>
@@ -4813,6 +4812,18 @@
   <p:clrMapOvr>
     <a:masterClrMapping/>
   </p:clrMapOvr>
+  <mc:AlternateContent xmlns:mc="http://schemas.openxmlformats.org/markup-compatibility/2006" xmlns:p15="http://schemas.microsoft.com/office/powerpoint/2012/main">
+    <mc:Choice Requires="p15">
+      <p:transition xmlns:p14="http://schemas.microsoft.com/office/powerpoint/2010/main" spd="slow" p14:dur="1250">
+        <p15:prstTrans prst="peelOff"/>
+      </p:transition>
+    </mc:Choice>
+    <mc:Fallback xmlns="">
+      <p:transition spd="slow">
+        <p:fade/>
+      </p:transition>
+    </mc:Fallback>
+  </mc:AlternateContent>
 </p:sldLayout>
 </file>
 
@@ -5012,7 +5023,7 @@
           <a:p>
             <a:fld id="{3B030C01-3367-43BF-937D-3893ADD9B9F8}" type="datetime1">
               <a:rPr lang="en-US" smtClean="0"/>
-              <a:t>1/2/2021</a:t>
+              <a:t>1/4/2021</a:t>
             </a:fld>
             <a:endParaRPr lang="en-US"/>
           </a:p>
@@ -5070,6 +5081,18 @@
   <p:clrMapOvr>
     <a:masterClrMapping/>
   </p:clrMapOvr>
+  <mc:AlternateContent xmlns:mc="http://schemas.openxmlformats.org/markup-compatibility/2006" xmlns:p15="http://schemas.microsoft.com/office/powerpoint/2012/main">
+    <mc:Choice Requires="p15">
+      <p:transition xmlns:p14="http://schemas.microsoft.com/office/powerpoint/2010/main" spd="slow" p14:dur="1250">
+        <p15:prstTrans prst="peelOff"/>
+      </p:transition>
+    </mc:Choice>
+    <mc:Fallback xmlns="">
+      <p:transition spd="slow">
+        <p:fade/>
+      </p:transition>
+    </mc:Fallback>
+  </mc:AlternateContent>
 </p:sldLayout>
 </file>
 
@@ -5208,7 +5231,7 @@
           <a:p>
             <a:fld id="{7B0B9D8B-653D-4DAC-8F28-9C1357B30687}" type="datetime1">
               <a:rPr lang="en-US" smtClean="0"/>
-              <a:t>1/2/2021</a:t>
+              <a:t>1/4/2021</a:t>
             </a:fld>
             <a:endParaRPr lang="en-US"/>
           </a:p>
@@ -5266,6 +5289,18 @@
   <p:clrMapOvr>
     <a:masterClrMapping/>
   </p:clrMapOvr>
+  <mc:AlternateContent xmlns:mc="http://schemas.openxmlformats.org/markup-compatibility/2006" xmlns:p15="http://schemas.microsoft.com/office/powerpoint/2012/main">
+    <mc:Choice Requires="p15">
+      <p:transition xmlns:p14="http://schemas.microsoft.com/office/powerpoint/2010/main" spd="slow" p14:dur="1250">
+        <p15:prstTrans prst="peelOff"/>
+      </p:transition>
+    </mc:Choice>
+    <mc:Fallback xmlns="">
+      <p:transition spd="slow">
+        <p:fade/>
+      </p:transition>
+    </mc:Fallback>
+  </mc:AlternateContent>
 </p:sldLayout>
 </file>
 
@@ -5471,7 +5506,7 @@
           <a:p>
             <a:fld id="{3E0B0587-B13D-4CE2-ABF3-D82ACC0FE76B}" type="datetime1">
               <a:rPr lang="en-US" smtClean="0"/>
-              <a:t>1/2/2021</a:t>
+              <a:t>1/4/2021</a:t>
             </a:fld>
             <a:endParaRPr lang="en-US"/>
           </a:p>
@@ -5767,6 +5802,18 @@
   <p:clrMapOvr>
     <a:masterClrMapping/>
   </p:clrMapOvr>
+  <mc:AlternateContent xmlns:mc="http://schemas.openxmlformats.org/markup-compatibility/2006" xmlns:p15="http://schemas.microsoft.com/office/powerpoint/2012/main">
+    <mc:Choice Requires="p15">
+      <p:transition xmlns:p14="http://schemas.microsoft.com/office/powerpoint/2010/main" spd="slow" p14:dur="1250">
+        <p15:prstTrans prst="peelOff"/>
+      </p:transition>
+    </mc:Choice>
+    <mc:Fallback xmlns="">
+      <p:transition spd="slow">
+        <p:fade/>
+      </p:transition>
+    </mc:Fallback>
+  </mc:AlternateContent>
 </p:sldLayout>
 </file>
 
@@ -5905,7 +5952,7 @@
           <a:p>
             <a:fld id="{71639C8D-F100-4198-BC96-24268D604A86}" type="datetime1">
               <a:rPr lang="en-US" smtClean="0"/>
-              <a:t>1/2/2021</a:t>
+              <a:t>1/4/2021</a:t>
             </a:fld>
             <a:endParaRPr lang="en-US"/>
           </a:p>
@@ -5963,6 +6010,18 @@
   <p:clrMapOvr>
     <a:masterClrMapping/>
   </p:clrMapOvr>
+  <mc:AlternateContent xmlns:mc="http://schemas.openxmlformats.org/markup-compatibility/2006" xmlns:p15="http://schemas.microsoft.com/office/powerpoint/2012/main">
+    <mc:Choice Requires="p15">
+      <p:transition xmlns:p14="http://schemas.microsoft.com/office/powerpoint/2010/main" spd="slow" p14:dur="1250">
+        <p15:prstTrans prst="peelOff"/>
+      </p:transition>
+    </mc:Choice>
+    <mc:Fallback xmlns="">
+      <p:transition spd="slow">
+        <p:fade/>
+      </p:transition>
+    </mc:Fallback>
+  </mc:AlternateContent>
 </p:sldLayout>
 </file>
 
@@ -6451,7 +6510,7 @@
           <a:p>
             <a:fld id="{FFAF4433-B36B-42B9-9129-BFBD1397BF4E}" type="datetime1">
               <a:rPr lang="en-US" smtClean="0"/>
-              <a:t>1/2/2021</a:t>
+              <a:t>1/4/2021</a:t>
             </a:fld>
             <a:endParaRPr lang="en-US"/>
           </a:p>
@@ -6509,6 +6568,18 @@
   <p:clrMapOvr>
     <a:masterClrMapping/>
   </p:clrMapOvr>
+  <mc:AlternateContent xmlns:mc="http://schemas.openxmlformats.org/markup-compatibility/2006" xmlns:p15="http://schemas.microsoft.com/office/powerpoint/2012/main">
+    <mc:Choice Requires="p15">
+      <p:transition xmlns:p14="http://schemas.microsoft.com/office/powerpoint/2010/main" spd="slow" p14:dur="1250">
+        <p15:prstTrans prst="peelOff"/>
+      </p:transition>
+    </mc:Choice>
+    <mc:Fallback xmlns="">
+      <p:transition spd="slow">
+        <p:fade/>
+      </p:transition>
+    </mc:Fallback>
+  </mc:AlternateContent>
 </p:sldLayout>
 </file>
 
@@ -7171,7 +7242,7 @@
           <a:p>
             <a:fld id="{0456F42E-3AD5-45F5-AA4E-60673CE0A094}" type="datetime1">
               <a:rPr lang="en-US" smtClean="0"/>
-              <a:t>1/2/2021</a:t>
+              <a:t>1/4/2021</a:t>
             </a:fld>
             <a:endParaRPr lang="en-US"/>
           </a:p>
@@ -7229,6 +7300,18 @@
   <p:clrMapOvr>
     <a:masterClrMapping/>
   </p:clrMapOvr>
+  <mc:AlternateContent xmlns:mc="http://schemas.openxmlformats.org/markup-compatibility/2006" xmlns:p15="http://schemas.microsoft.com/office/powerpoint/2012/main">
+    <mc:Choice Requires="p15">
+      <p:transition xmlns:p14="http://schemas.microsoft.com/office/powerpoint/2010/main" spd="slow" p14:dur="1250">
+        <p15:prstTrans prst="peelOff"/>
+      </p:transition>
+    </mc:Choice>
+    <mc:Fallback xmlns="">
+      <p:transition spd="slow">
+        <p:fade/>
+      </p:transition>
+    </mc:Fallback>
+  </mc:AlternateContent>
 </p:sldLayout>
 </file>
 
@@ -7341,7 +7424,7 @@
           <a:p>
             <a:fld id="{96682EAD-E4E4-4F29-8F62-A2DBB9B02D15}" type="datetime1">
               <a:rPr lang="en-US" smtClean="0"/>
-              <a:t>1/2/2021</a:t>
+              <a:t>1/4/2021</a:t>
             </a:fld>
             <a:endParaRPr lang="en-US"/>
           </a:p>
@@ -7399,6 +7482,18 @@
   <p:clrMapOvr>
     <a:masterClrMapping/>
   </p:clrMapOvr>
+  <mc:AlternateContent xmlns:mc="http://schemas.openxmlformats.org/markup-compatibility/2006" xmlns:p15="http://schemas.microsoft.com/office/powerpoint/2012/main">
+    <mc:Choice Requires="p15">
+      <p:transition xmlns:p14="http://schemas.microsoft.com/office/powerpoint/2010/main" spd="slow" p14:dur="1250">
+        <p15:prstTrans prst="peelOff"/>
+      </p:transition>
+    </mc:Choice>
+    <mc:Fallback xmlns="">
+      <p:transition spd="slow">
+        <p:fade/>
+      </p:transition>
+    </mc:Fallback>
+  </mc:AlternateContent>
 </p:sldLayout>
 </file>
 
@@ -7521,7 +7616,7 @@
           <a:p>
             <a:fld id="{1D971B33-70FD-4CFB-BAAD-1813DAEC74FB}" type="datetime1">
               <a:rPr lang="en-US" smtClean="0"/>
-              <a:t>1/2/2021</a:t>
+              <a:t>1/4/2021</a:t>
             </a:fld>
             <a:endParaRPr lang="en-US"/>
           </a:p>
@@ -7579,6 +7674,18 @@
   <p:clrMapOvr>
     <a:masterClrMapping/>
   </p:clrMapOvr>
+  <mc:AlternateContent xmlns:mc="http://schemas.openxmlformats.org/markup-compatibility/2006" xmlns:p15="http://schemas.microsoft.com/office/powerpoint/2012/main">
+    <mc:Choice Requires="p15">
+      <p:transition xmlns:p14="http://schemas.microsoft.com/office/powerpoint/2010/main" spd="slow" p14:dur="1250">
+        <p15:prstTrans prst="peelOff"/>
+      </p:transition>
+    </mc:Choice>
+    <mc:Fallback xmlns="">
+      <p:transition spd="slow">
+        <p:fade/>
+      </p:transition>
+    </mc:Fallback>
+  </mc:AlternateContent>
 </p:sldLayout>
 </file>
 
@@ -7691,7 +7798,7 @@
           <a:p>
             <a:fld id="{7DC7A930-E568-44E6-84ED-3BB4016E0373}" type="datetime1">
               <a:rPr lang="en-US" smtClean="0"/>
-              <a:t>1/2/2021</a:t>
+              <a:t>1/4/2021</a:t>
             </a:fld>
             <a:endParaRPr lang="en-US"/>
           </a:p>
@@ -7749,6 +7856,18 @@
   <p:clrMapOvr>
     <a:masterClrMapping/>
   </p:clrMapOvr>
+  <mc:AlternateContent xmlns:mc="http://schemas.openxmlformats.org/markup-compatibility/2006" xmlns:p15="http://schemas.microsoft.com/office/powerpoint/2012/main">
+    <mc:Choice Requires="p15">
+      <p:transition xmlns:p14="http://schemas.microsoft.com/office/powerpoint/2010/main" spd="slow" p14:dur="1250">
+        <p15:prstTrans prst="peelOff"/>
+      </p:transition>
+    </mc:Choice>
+    <mc:Fallback xmlns="">
+      <p:transition spd="slow">
+        <p:fade/>
+      </p:transition>
+    </mc:Fallback>
+  </mc:AlternateContent>
 </p:sldLayout>
 </file>
 
@@ -7941,7 +8060,7 @@
           <a:p>
             <a:fld id="{14DF841F-E273-470C-888B-487BE062E0B0}" type="datetime1">
               <a:rPr lang="en-US" smtClean="0"/>
-              <a:t>1/2/2021</a:t>
+              <a:t>1/4/2021</a:t>
             </a:fld>
             <a:endParaRPr lang="en-US"/>
           </a:p>
@@ -7999,6 +8118,18 @@
   <p:clrMapOvr>
     <a:masterClrMapping/>
   </p:clrMapOvr>
+  <mc:AlternateContent xmlns:mc="http://schemas.openxmlformats.org/markup-compatibility/2006" xmlns:p15="http://schemas.microsoft.com/office/powerpoint/2012/main">
+    <mc:Choice Requires="p15">
+      <p:transition xmlns:p14="http://schemas.microsoft.com/office/powerpoint/2010/main" spd="slow" p14:dur="1250">
+        <p15:prstTrans prst="peelOff"/>
+      </p:transition>
+    </mc:Choice>
+    <mc:Fallback xmlns="">
+      <p:transition spd="slow">
+        <p:fade/>
+      </p:transition>
+    </mc:Fallback>
+  </mc:AlternateContent>
 </p:sldLayout>
 </file>
 
@@ -8173,7 +8304,7 @@
           <a:p>
             <a:fld id="{7976C994-3276-415C-8876-D8A57D02FBEA}" type="datetime1">
               <a:rPr lang="en-US" smtClean="0"/>
-              <a:t>1/2/2021</a:t>
+              <a:t>1/4/2021</a:t>
             </a:fld>
             <a:endParaRPr lang="en-US"/>
           </a:p>
@@ -8231,6 +8362,18 @@
   <p:clrMapOvr>
     <a:masterClrMapping/>
   </p:clrMapOvr>
+  <mc:AlternateContent xmlns:mc="http://schemas.openxmlformats.org/markup-compatibility/2006" xmlns:p15="http://schemas.microsoft.com/office/powerpoint/2012/main">
+    <mc:Choice Requires="p15">
+      <p:transition xmlns:p14="http://schemas.microsoft.com/office/powerpoint/2010/main" spd="slow" p14:dur="1250">
+        <p15:prstTrans prst="peelOff"/>
+      </p:transition>
+    </mc:Choice>
+    <mc:Fallback xmlns="">
+      <p:transition spd="slow">
+        <p:fade/>
+      </p:transition>
+    </mc:Fallback>
+  </mc:AlternateContent>
 </p:sldLayout>
 </file>
 
@@ -8554,7 +8697,7 @@
           <a:p>
             <a:fld id="{957CF569-10E6-499B-B10A-368AE7881220}" type="datetime1">
               <a:rPr lang="en-US" smtClean="0"/>
-              <a:t>1/2/2021</a:t>
+              <a:t>1/4/2021</a:t>
             </a:fld>
             <a:endParaRPr lang="en-US"/>
           </a:p>
@@ -8612,6 +8755,18 @@
   <p:clrMapOvr>
     <a:masterClrMapping/>
   </p:clrMapOvr>
+  <mc:AlternateContent xmlns:mc="http://schemas.openxmlformats.org/markup-compatibility/2006" xmlns:p15="http://schemas.microsoft.com/office/powerpoint/2012/main">
+    <mc:Choice Requires="p15">
+      <p:transition xmlns:p14="http://schemas.microsoft.com/office/powerpoint/2010/main" spd="slow" p14:dur="1250">
+        <p15:prstTrans prst="peelOff"/>
+      </p:transition>
+    </mc:Choice>
+    <mc:Fallback xmlns="">
+      <p:transition spd="slow">
+        <p:fade/>
+      </p:transition>
+    </mc:Fallback>
+  </mc:AlternateContent>
 </p:sldLayout>
 </file>
 
@@ -8672,7 +8827,7 @@
           <a:p>
             <a:fld id="{2B558DD0-02EC-4237-86A7-F584E5F12E9D}" type="datetime1">
               <a:rPr lang="en-US" smtClean="0"/>
-              <a:t>1/2/2021</a:t>
+              <a:t>1/4/2021</a:t>
             </a:fld>
             <a:endParaRPr lang="en-US"/>
           </a:p>
@@ -8730,6 +8885,18 @@
   <p:clrMapOvr>
     <a:masterClrMapping/>
   </p:clrMapOvr>
+  <mc:AlternateContent xmlns:mc="http://schemas.openxmlformats.org/markup-compatibility/2006" xmlns:p15="http://schemas.microsoft.com/office/powerpoint/2012/main">
+    <mc:Choice Requires="p15">
+      <p:transition xmlns:p14="http://schemas.microsoft.com/office/powerpoint/2010/main" spd="slow" p14:dur="1250">
+        <p15:prstTrans prst="peelOff"/>
+      </p:transition>
+    </mc:Choice>
+    <mc:Fallback xmlns="">
+      <p:transition spd="slow">
+        <p:fade/>
+      </p:transition>
+    </mc:Fallback>
+  </mc:AlternateContent>
 </p:sldLayout>
 </file>
 
@@ -8767,7 +8934,7 @@
           <a:p>
             <a:fld id="{6CDF8AA9-4674-4D39-A1B3-0222990FE499}" type="datetime1">
               <a:rPr lang="en-US" smtClean="0"/>
-              <a:t>1/2/2021</a:t>
+              <a:t>1/4/2021</a:t>
             </a:fld>
             <a:endParaRPr lang="en-US"/>
           </a:p>
@@ -8825,6 +8992,18 @@
   <p:clrMapOvr>
     <a:masterClrMapping/>
   </p:clrMapOvr>
+  <mc:AlternateContent xmlns:mc="http://schemas.openxmlformats.org/markup-compatibility/2006" xmlns:p15="http://schemas.microsoft.com/office/powerpoint/2012/main">
+    <mc:Choice Requires="p15">
+      <p:transition xmlns:p14="http://schemas.microsoft.com/office/powerpoint/2010/main" spd="slow" p14:dur="1250">
+        <p15:prstTrans prst="peelOff"/>
+      </p:transition>
+    </mc:Choice>
+    <mc:Fallback xmlns="">
+      <p:transition spd="slow">
+        <p:fade/>
+      </p:transition>
+    </mc:Fallback>
+  </mc:AlternateContent>
 </p:sldLayout>
 </file>
 
@@ -9016,7 +9195,7 @@
           <a:p>
             <a:fld id="{385EDE88-5D12-4E0B-86B8-96CC48680CD5}" type="datetime1">
               <a:rPr lang="en-US" smtClean="0"/>
-              <a:t>1/2/2021</a:t>
+              <a:t>1/4/2021</a:t>
             </a:fld>
             <a:endParaRPr lang="en-US"/>
           </a:p>
@@ -9074,6 +9253,18 @@
   <p:clrMapOvr>
     <a:masterClrMapping/>
   </p:clrMapOvr>
+  <mc:AlternateContent xmlns:mc="http://schemas.openxmlformats.org/markup-compatibility/2006" xmlns:p15="http://schemas.microsoft.com/office/powerpoint/2012/main">
+    <mc:Choice Requires="p15">
+      <p:transition xmlns:p14="http://schemas.microsoft.com/office/powerpoint/2010/main" spd="slow" p14:dur="1250">
+        <p15:prstTrans prst="peelOff"/>
+      </p:transition>
+    </mc:Choice>
+    <mc:Fallback xmlns="">
+      <p:transition spd="slow">
+        <p:fade/>
+      </p:transition>
+    </mc:Fallback>
+  </mc:AlternateContent>
 </p:sldLayout>
 </file>
 
@@ -9296,7 +9487,7 @@
           <a:p>
             <a:fld id="{1A5064E6-1AA0-4DA4-AF2E-267D28A9CDE4}" type="datetime1">
               <a:rPr lang="en-US" smtClean="0"/>
-              <a:t>1/2/2021</a:t>
+              <a:t>1/4/2021</a:t>
             </a:fld>
             <a:endParaRPr lang="en-US"/>
           </a:p>
@@ -9354,6 +9545,18 @@
   <p:clrMapOvr>
     <a:masterClrMapping/>
   </p:clrMapOvr>
+  <mc:AlternateContent xmlns:mc="http://schemas.openxmlformats.org/markup-compatibility/2006" xmlns:p15="http://schemas.microsoft.com/office/powerpoint/2012/main">
+    <mc:Choice Requires="p15">
+      <p:transition xmlns:p14="http://schemas.microsoft.com/office/powerpoint/2010/main" spd="slow" p14:dur="1250">
+        <p15:prstTrans prst="peelOff"/>
+      </p:transition>
+    </mc:Choice>
+    <mc:Fallback xmlns="">
+      <p:transition spd="slow">
+        <p:fade/>
+      </p:transition>
+    </mc:Fallback>
+  </mc:AlternateContent>
 </p:sldLayout>
 </file>
 
@@ -12373,7 +12576,7 @@
           <a:p>
             <a:fld id="{97D301C7-A48F-46B4-9988-324187293CA9}" type="datetime1">
               <a:rPr lang="en-US" smtClean="0"/>
-              <a:t>1/2/2021</a:t>
+              <a:t>1/4/2021</a:t>
             </a:fld>
             <a:endParaRPr lang="en-US"/>
           </a:p>
@@ -12484,6 +12687,18 @@
     <p:sldLayoutId id="2147483694" r:id="rId16"/>
     <p:sldLayoutId id="2147483695" r:id="rId17"/>
   </p:sldLayoutIdLst>
+  <mc:AlternateContent xmlns:mc="http://schemas.openxmlformats.org/markup-compatibility/2006" xmlns:p15="http://schemas.microsoft.com/office/powerpoint/2012/main">
+    <mc:Choice Requires="p15">
+      <p:transition xmlns:p14="http://schemas.microsoft.com/office/powerpoint/2010/main" spd="slow" p14:dur="1250">
+        <p15:prstTrans prst="peelOff"/>
+      </p:transition>
+    </mc:Choice>
+    <mc:Fallback xmlns="">
+      <p:transition spd="slow">
+        <p:fade/>
+      </p:transition>
+    </mc:Fallback>
+  </mc:AlternateContent>
   <p:hf hdr="0" ftr="0" dt="0"/>
   <p:txStyles>
     <p:titleStyle>
@@ -13088,6 +13303,18 @@
   <p:clrMapOvr>
     <a:masterClrMapping/>
   </p:clrMapOvr>
+  <mc:AlternateContent xmlns:mc="http://schemas.openxmlformats.org/markup-compatibility/2006" xmlns:p15="http://schemas.microsoft.com/office/powerpoint/2012/main">
+    <mc:Choice Requires="p15">
+      <p:transition xmlns:p14="http://schemas.microsoft.com/office/powerpoint/2010/main" spd="slow" p14:dur="1250">
+        <p15:prstTrans prst="peelOff"/>
+      </p:transition>
+    </mc:Choice>
+    <mc:Fallback xmlns="">
+      <p:transition spd="slow">
+        <p:fade/>
+      </p:transition>
+    </mc:Fallback>
+  </mc:AlternateContent>
 </p:sld>
 </file>
 
@@ -13124,7 +13351,12 @@
             <p:ph type="title"/>
           </p:nvPr>
         </p:nvSpPr>
-        <p:spPr/>
+        <p:spPr>
+          <a:xfrm>
+            <a:off x="1141412" y="335183"/>
+            <a:ext cx="9905998" cy="1478570"/>
+          </a:xfrm>
+        </p:spPr>
         <p:txBody>
           <a:bodyPr/>
           <a:lstStyle/>
@@ -13220,6 +13452,18 @@
   <p:clrMapOvr>
     <a:masterClrMapping/>
   </p:clrMapOvr>
+  <mc:AlternateContent xmlns:mc="http://schemas.openxmlformats.org/markup-compatibility/2006" xmlns:p15="http://schemas.microsoft.com/office/powerpoint/2012/main">
+    <mc:Choice Requires="p15">
+      <p:transition xmlns:p14="http://schemas.microsoft.com/office/powerpoint/2010/main" spd="slow" p14:dur="1250">
+        <p15:prstTrans prst="peelOff"/>
+      </p:transition>
+    </mc:Choice>
+    <mc:Fallback xmlns="">
+      <p:transition spd="slow">
+        <p:fade/>
+      </p:transition>
+    </mc:Fallback>
+  </mc:AlternateContent>
 </p:sld>
 </file>
 
@@ -13286,14 +13530,14 @@
           <p:nvPr>
             <p:extLst>
               <p:ext uri="{D42A27DB-BD31-4B8C-83A1-F6EECF244321}">
-                <p14:modId xmlns:p14="http://schemas.microsoft.com/office/powerpoint/2010/main" val="4046382893"/>
+                <p14:modId xmlns:p14="http://schemas.microsoft.com/office/powerpoint/2010/main" val="2013818318"/>
               </p:ext>
             </p:extLst>
           </p:nvPr>
         </p:nvGraphicFramePr>
         <p:xfrm>
-          <a:off x="573207" y="1255594"/>
-          <a:ext cx="10686196" cy="4654389"/>
+          <a:off x="752902" y="1438156"/>
+          <a:ext cx="10686196" cy="4627680"/>
         </p:xfrm>
         <a:graphic>
           <a:graphicData uri="http://schemas.openxmlformats.org/drawingml/2006/table">
@@ -13360,6 +13604,42 @@
                     </a:p>
                   </a:txBody>
                   <a:tcPr>
+                    <a:lnL w="12700" cap="flat" cmpd="sng" algn="ctr">
+                      <a:solidFill>
+                        <a:schemeClr val="tx1"/>
+                      </a:solidFill>
+                      <a:prstDash val="solid"/>
+                      <a:round/>
+                      <a:headEnd type="none" w="med" len="med"/>
+                      <a:tailEnd type="none" w="med" len="med"/>
+                    </a:lnL>
+                    <a:lnR w="12700" cap="flat" cmpd="sng" algn="ctr">
+                      <a:solidFill>
+                        <a:schemeClr val="tx1"/>
+                      </a:solidFill>
+                      <a:prstDash val="solid"/>
+                      <a:round/>
+                      <a:headEnd type="none" w="med" len="med"/>
+                      <a:tailEnd type="none" w="med" len="med"/>
+                    </a:lnR>
+                    <a:lnT w="12700" cap="flat" cmpd="sng" algn="ctr">
+                      <a:solidFill>
+                        <a:schemeClr val="tx1"/>
+                      </a:solidFill>
+                      <a:prstDash val="solid"/>
+                      <a:round/>
+                      <a:headEnd type="none" w="med" len="med"/>
+                      <a:tailEnd type="none" w="med" len="med"/>
+                    </a:lnT>
+                    <a:lnB w="12700" cap="flat" cmpd="sng" algn="ctr">
+                      <a:solidFill>
+                        <a:schemeClr val="tx1"/>
+                      </a:solidFill>
+                      <a:prstDash val="solid"/>
+                      <a:round/>
+                      <a:headEnd type="none" w="med" len="med"/>
+                      <a:tailEnd type="none" w="med" len="med"/>
+                    </a:lnB>
                     <a:solidFill>
                       <a:schemeClr val="bg2">
                         <a:lumMod val="40000"/>
@@ -13382,6 +13662,42 @@
                     </a:p>
                   </a:txBody>
                   <a:tcPr>
+                    <a:lnL w="12700" cap="flat" cmpd="sng" algn="ctr">
+                      <a:solidFill>
+                        <a:schemeClr val="tx1"/>
+                      </a:solidFill>
+                      <a:prstDash val="solid"/>
+                      <a:round/>
+                      <a:headEnd type="none" w="med" len="med"/>
+                      <a:tailEnd type="none" w="med" len="med"/>
+                    </a:lnL>
+                    <a:lnR w="12700" cap="flat" cmpd="sng" algn="ctr">
+                      <a:solidFill>
+                        <a:schemeClr val="tx1"/>
+                      </a:solidFill>
+                      <a:prstDash val="solid"/>
+                      <a:round/>
+                      <a:headEnd type="none" w="med" len="med"/>
+                      <a:tailEnd type="none" w="med" len="med"/>
+                    </a:lnR>
+                    <a:lnT w="12700" cap="flat" cmpd="sng" algn="ctr">
+                      <a:solidFill>
+                        <a:schemeClr val="tx1"/>
+                      </a:solidFill>
+                      <a:prstDash val="solid"/>
+                      <a:round/>
+                      <a:headEnd type="none" w="med" len="med"/>
+                      <a:tailEnd type="none" w="med" len="med"/>
+                    </a:lnT>
+                    <a:lnB w="12700" cap="flat" cmpd="sng" algn="ctr">
+                      <a:solidFill>
+                        <a:schemeClr val="tx1"/>
+                      </a:solidFill>
+                      <a:prstDash val="solid"/>
+                      <a:round/>
+                      <a:headEnd type="none" w="med" len="med"/>
+                      <a:tailEnd type="none" w="med" len="med"/>
+                    </a:lnB>
                     <a:solidFill>
                       <a:schemeClr val="bg2">
                         <a:lumMod val="40000"/>
@@ -13404,6 +13720,42 @@
                     </a:p>
                   </a:txBody>
                   <a:tcPr>
+                    <a:lnL w="12700" cap="flat" cmpd="sng" algn="ctr">
+                      <a:solidFill>
+                        <a:schemeClr val="tx1"/>
+                      </a:solidFill>
+                      <a:prstDash val="solid"/>
+                      <a:round/>
+                      <a:headEnd type="none" w="med" len="med"/>
+                      <a:tailEnd type="none" w="med" len="med"/>
+                    </a:lnL>
+                    <a:lnR w="12700" cap="flat" cmpd="sng" algn="ctr">
+                      <a:solidFill>
+                        <a:schemeClr val="tx1"/>
+                      </a:solidFill>
+                      <a:prstDash val="solid"/>
+                      <a:round/>
+                      <a:headEnd type="none" w="med" len="med"/>
+                      <a:tailEnd type="none" w="med" len="med"/>
+                    </a:lnR>
+                    <a:lnT w="12700" cap="flat" cmpd="sng" algn="ctr">
+                      <a:solidFill>
+                        <a:schemeClr val="tx1"/>
+                      </a:solidFill>
+                      <a:prstDash val="solid"/>
+                      <a:round/>
+                      <a:headEnd type="none" w="med" len="med"/>
+                      <a:tailEnd type="none" w="med" len="med"/>
+                    </a:lnT>
+                    <a:lnB w="12700" cap="flat" cmpd="sng" algn="ctr">
+                      <a:solidFill>
+                        <a:schemeClr val="tx1"/>
+                      </a:solidFill>
+                      <a:prstDash val="solid"/>
+                      <a:round/>
+                      <a:headEnd type="none" w="med" len="med"/>
+                      <a:tailEnd type="none" w="med" len="med"/>
+                    </a:lnB>
                     <a:solidFill>
                       <a:schemeClr val="bg2">
                         <a:lumMod val="40000"/>
@@ -13426,6 +13778,42 @@
                     </a:p>
                   </a:txBody>
                   <a:tcPr>
+                    <a:lnL w="12700" cap="flat" cmpd="sng" algn="ctr">
+                      <a:solidFill>
+                        <a:schemeClr val="tx1"/>
+                      </a:solidFill>
+                      <a:prstDash val="solid"/>
+                      <a:round/>
+                      <a:headEnd type="none" w="med" len="med"/>
+                      <a:tailEnd type="none" w="med" len="med"/>
+                    </a:lnL>
+                    <a:lnR w="12700" cap="flat" cmpd="sng" algn="ctr">
+                      <a:solidFill>
+                        <a:schemeClr val="tx1"/>
+                      </a:solidFill>
+                      <a:prstDash val="solid"/>
+                      <a:round/>
+                      <a:headEnd type="none" w="med" len="med"/>
+                      <a:tailEnd type="none" w="med" len="med"/>
+                    </a:lnR>
+                    <a:lnT w="12700" cap="flat" cmpd="sng" algn="ctr">
+                      <a:solidFill>
+                        <a:schemeClr val="tx1"/>
+                      </a:solidFill>
+                      <a:prstDash val="solid"/>
+                      <a:round/>
+                      <a:headEnd type="none" w="med" len="med"/>
+                      <a:tailEnd type="none" w="med" len="med"/>
+                    </a:lnT>
+                    <a:lnB w="12700" cap="flat" cmpd="sng" algn="ctr">
+                      <a:solidFill>
+                        <a:schemeClr val="tx1"/>
+                      </a:solidFill>
+                      <a:prstDash val="solid"/>
+                      <a:round/>
+                      <a:headEnd type="none" w="med" len="med"/>
+                      <a:tailEnd type="none" w="med" len="med"/>
+                    </a:lnB>
                     <a:solidFill>
                       <a:schemeClr val="bg2">
                         <a:lumMod val="40000"/>
@@ -13448,6 +13836,42 @@
                     </a:p>
                   </a:txBody>
                   <a:tcPr>
+                    <a:lnL w="12700" cap="flat" cmpd="sng" algn="ctr">
+                      <a:solidFill>
+                        <a:schemeClr val="tx1"/>
+                      </a:solidFill>
+                      <a:prstDash val="solid"/>
+                      <a:round/>
+                      <a:headEnd type="none" w="med" len="med"/>
+                      <a:tailEnd type="none" w="med" len="med"/>
+                    </a:lnL>
+                    <a:lnR w="12700" cap="flat" cmpd="sng" algn="ctr">
+                      <a:solidFill>
+                        <a:schemeClr val="tx1"/>
+                      </a:solidFill>
+                      <a:prstDash val="solid"/>
+                      <a:round/>
+                      <a:headEnd type="none" w="med" len="med"/>
+                      <a:tailEnd type="none" w="med" len="med"/>
+                    </a:lnR>
+                    <a:lnT w="12700" cap="flat" cmpd="sng" algn="ctr">
+                      <a:solidFill>
+                        <a:schemeClr val="tx1"/>
+                      </a:solidFill>
+                      <a:prstDash val="solid"/>
+                      <a:round/>
+                      <a:headEnd type="none" w="med" len="med"/>
+                      <a:tailEnd type="none" w="med" len="med"/>
+                    </a:lnT>
+                    <a:lnB w="12700" cap="flat" cmpd="sng" algn="ctr">
+                      <a:solidFill>
+                        <a:schemeClr val="tx1"/>
+                      </a:solidFill>
+                      <a:prstDash val="solid"/>
+                      <a:round/>
+                      <a:headEnd type="none" w="med" len="med"/>
+                      <a:tailEnd type="none" w="med" len="med"/>
+                    </a:lnB>
                     <a:solidFill>
                       <a:schemeClr val="bg2">
                         <a:lumMod val="40000"/>
@@ -13470,6 +13894,42 @@
                     </a:p>
                   </a:txBody>
                   <a:tcPr>
+                    <a:lnL w="12700" cap="flat" cmpd="sng" algn="ctr">
+                      <a:solidFill>
+                        <a:schemeClr val="tx1"/>
+                      </a:solidFill>
+                      <a:prstDash val="solid"/>
+                      <a:round/>
+                      <a:headEnd type="none" w="med" len="med"/>
+                      <a:tailEnd type="none" w="med" len="med"/>
+                    </a:lnL>
+                    <a:lnR w="12700" cap="flat" cmpd="sng" algn="ctr">
+                      <a:solidFill>
+                        <a:schemeClr val="tx1"/>
+                      </a:solidFill>
+                      <a:prstDash val="solid"/>
+                      <a:round/>
+                      <a:headEnd type="none" w="med" len="med"/>
+                      <a:tailEnd type="none" w="med" len="med"/>
+                    </a:lnR>
+                    <a:lnT w="12700" cap="flat" cmpd="sng" algn="ctr">
+                      <a:solidFill>
+                        <a:schemeClr val="tx1"/>
+                      </a:solidFill>
+                      <a:prstDash val="solid"/>
+                      <a:round/>
+                      <a:headEnd type="none" w="med" len="med"/>
+                      <a:tailEnd type="none" w="med" len="med"/>
+                    </a:lnT>
+                    <a:lnB w="12700" cap="flat" cmpd="sng" algn="ctr">
+                      <a:solidFill>
+                        <a:schemeClr val="tx1"/>
+                      </a:solidFill>
+                      <a:prstDash val="solid"/>
+                      <a:round/>
+                      <a:headEnd type="none" w="med" len="med"/>
+                      <a:tailEnd type="none" w="med" len="med"/>
+                    </a:lnB>
                     <a:solidFill>
                       <a:schemeClr val="bg2">
                         <a:lumMod val="40000"/>
@@ -13498,7 +13958,44 @@
                       <a:endParaRPr lang="en-US" dirty="0"/>
                     </a:p>
                   </a:txBody>
-                  <a:tcPr/>
+                  <a:tcPr>
+                    <a:lnL w="12700" cap="flat" cmpd="sng" algn="ctr">
+                      <a:solidFill>
+                        <a:schemeClr val="tx1"/>
+                      </a:solidFill>
+                      <a:prstDash val="solid"/>
+                      <a:round/>
+                      <a:headEnd type="none" w="med" len="med"/>
+                      <a:tailEnd type="none" w="med" len="med"/>
+                    </a:lnL>
+                    <a:lnR w="12700" cap="flat" cmpd="sng" algn="ctr">
+                      <a:solidFill>
+                        <a:schemeClr val="tx1"/>
+                      </a:solidFill>
+                      <a:prstDash val="solid"/>
+                      <a:round/>
+                      <a:headEnd type="none" w="med" len="med"/>
+                      <a:tailEnd type="none" w="med" len="med"/>
+                    </a:lnR>
+                    <a:lnT w="12700" cap="flat" cmpd="sng" algn="ctr">
+                      <a:solidFill>
+                        <a:schemeClr val="tx1"/>
+                      </a:solidFill>
+                      <a:prstDash val="solid"/>
+                      <a:round/>
+                      <a:headEnd type="none" w="med" len="med"/>
+                      <a:tailEnd type="none" w="med" len="med"/>
+                    </a:lnT>
+                    <a:lnB w="12700" cap="flat" cmpd="sng" algn="ctr">
+                      <a:solidFill>
+                        <a:schemeClr val="tx1"/>
+                      </a:solidFill>
+                      <a:prstDash val="solid"/>
+                      <a:round/>
+                      <a:headEnd type="none" w="med" len="med"/>
+                      <a:tailEnd type="none" w="med" len="med"/>
+                    </a:lnB>
+                  </a:tcPr>
                 </a:tc>
                 <a:tc>
                   <a:txBody>
@@ -13511,7 +14008,44 @@
                       </a:r>
                     </a:p>
                   </a:txBody>
-                  <a:tcPr/>
+                  <a:tcPr>
+                    <a:lnL w="12700" cap="flat" cmpd="sng" algn="ctr">
+                      <a:solidFill>
+                        <a:schemeClr val="tx1"/>
+                      </a:solidFill>
+                      <a:prstDash val="solid"/>
+                      <a:round/>
+                      <a:headEnd type="none" w="med" len="med"/>
+                      <a:tailEnd type="none" w="med" len="med"/>
+                    </a:lnL>
+                    <a:lnR w="12700" cap="flat" cmpd="sng" algn="ctr">
+                      <a:solidFill>
+                        <a:schemeClr val="tx1"/>
+                      </a:solidFill>
+                      <a:prstDash val="solid"/>
+                      <a:round/>
+                      <a:headEnd type="none" w="med" len="med"/>
+                      <a:tailEnd type="none" w="med" len="med"/>
+                    </a:lnR>
+                    <a:lnT w="12700" cap="flat" cmpd="sng" algn="ctr">
+                      <a:solidFill>
+                        <a:schemeClr val="tx1"/>
+                      </a:solidFill>
+                      <a:prstDash val="solid"/>
+                      <a:round/>
+                      <a:headEnd type="none" w="med" len="med"/>
+                      <a:tailEnd type="none" w="med" len="med"/>
+                    </a:lnT>
+                    <a:lnB w="12700" cap="flat" cmpd="sng" algn="ctr">
+                      <a:solidFill>
+                        <a:schemeClr val="tx1"/>
+                      </a:solidFill>
+                      <a:prstDash val="solid"/>
+                      <a:round/>
+                      <a:headEnd type="none" w="med" len="med"/>
+                      <a:tailEnd type="none" w="med" len="med"/>
+                    </a:lnB>
+                  </a:tcPr>
                 </a:tc>
                 <a:tc>
                   <a:txBody>
@@ -13525,7 +14059,44 @@
                       <a:endParaRPr lang="en-US" dirty="0"/>
                     </a:p>
                   </a:txBody>
-                  <a:tcPr/>
+                  <a:tcPr>
+                    <a:lnL w="12700" cap="flat" cmpd="sng" algn="ctr">
+                      <a:solidFill>
+                        <a:schemeClr val="tx1"/>
+                      </a:solidFill>
+                      <a:prstDash val="solid"/>
+                      <a:round/>
+                      <a:headEnd type="none" w="med" len="med"/>
+                      <a:tailEnd type="none" w="med" len="med"/>
+                    </a:lnL>
+                    <a:lnR w="12700" cap="flat" cmpd="sng" algn="ctr">
+                      <a:solidFill>
+                        <a:schemeClr val="tx1"/>
+                      </a:solidFill>
+                      <a:prstDash val="solid"/>
+                      <a:round/>
+                      <a:headEnd type="none" w="med" len="med"/>
+                      <a:tailEnd type="none" w="med" len="med"/>
+                    </a:lnR>
+                    <a:lnT w="12700" cap="flat" cmpd="sng" algn="ctr">
+                      <a:solidFill>
+                        <a:schemeClr val="tx1"/>
+                      </a:solidFill>
+                      <a:prstDash val="solid"/>
+                      <a:round/>
+                      <a:headEnd type="none" w="med" len="med"/>
+                      <a:tailEnd type="none" w="med" len="med"/>
+                    </a:lnT>
+                    <a:lnB w="12700" cap="flat" cmpd="sng" algn="ctr">
+                      <a:solidFill>
+                        <a:schemeClr val="tx1"/>
+                      </a:solidFill>
+                      <a:prstDash val="solid"/>
+                      <a:round/>
+                      <a:headEnd type="none" w="med" len="med"/>
+                      <a:tailEnd type="none" w="med" len="med"/>
+                    </a:lnB>
+                  </a:tcPr>
                 </a:tc>
                 <a:tc>
                   <a:txBody>
@@ -13539,7 +14110,44 @@
                       <a:endParaRPr lang="en-US" dirty="0"/>
                     </a:p>
                   </a:txBody>
-                  <a:tcPr/>
+                  <a:tcPr>
+                    <a:lnL w="12700" cap="flat" cmpd="sng" algn="ctr">
+                      <a:solidFill>
+                        <a:schemeClr val="tx1"/>
+                      </a:solidFill>
+                      <a:prstDash val="solid"/>
+                      <a:round/>
+                      <a:headEnd type="none" w="med" len="med"/>
+                      <a:tailEnd type="none" w="med" len="med"/>
+                    </a:lnL>
+                    <a:lnR w="12700" cap="flat" cmpd="sng" algn="ctr">
+                      <a:solidFill>
+                        <a:schemeClr val="tx1"/>
+                      </a:solidFill>
+                      <a:prstDash val="solid"/>
+                      <a:round/>
+                      <a:headEnd type="none" w="med" len="med"/>
+                      <a:tailEnd type="none" w="med" len="med"/>
+                    </a:lnR>
+                    <a:lnT w="12700" cap="flat" cmpd="sng" algn="ctr">
+                      <a:solidFill>
+                        <a:schemeClr val="tx1"/>
+                      </a:solidFill>
+                      <a:prstDash val="solid"/>
+                      <a:round/>
+                      <a:headEnd type="none" w="med" len="med"/>
+                      <a:tailEnd type="none" w="med" len="med"/>
+                    </a:lnT>
+                    <a:lnB w="12700" cap="flat" cmpd="sng" algn="ctr">
+                      <a:solidFill>
+                        <a:schemeClr val="tx1"/>
+                      </a:solidFill>
+                      <a:prstDash val="solid"/>
+                      <a:round/>
+                      <a:headEnd type="none" w="med" len="med"/>
+                      <a:tailEnd type="none" w="med" len="med"/>
+                    </a:lnB>
+                  </a:tcPr>
                 </a:tc>
                 <a:tc>
                   <a:txBody>
@@ -13549,7 +14157,44 @@
                       <a:endParaRPr lang="en-US" dirty="0"/>
                     </a:p>
                   </a:txBody>
-                  <a:tcPr/>
+                  <a:tcPr>
+                    <a:lnL w="12700" cap="flat" cmpd="sng" algn="ctr">
+                      <a:solidFill>
+                        <a:schemeClr val="tx1"/>
+                      </a:solidFill>
+                      <a:prstDash val="solid"/>
+                      <a:round/>
+                      <a:headEnd type="none" w="med" len="med"/>
+                      <a:tailEnd type="none" w="med" len="med"/>
+                    </a:lnL>
+                    <a:lnR w="12700" cap="flat" cmpd="sng" algn="ctr">
+                      <a:solidFill>
+                        <a:schemeClr val="tx1"/>
+                      </a:solidFill>
+                      <a:prstDash val="solid"/>
+                      <a:round/>
+                      <a:headEnd type="none" w="med" len="med"/>
+                      <a:tailEnd type="none" w="med" len="med"/>
+                    </a:lnR>
+                    <a:lnT w="12700" cap="flat" cmpd="sng" algn="ctr">
+                      <a:solidFill>
+                        <a:schemeClr val="tx1"/>
+                      </a:solidFill>
+                      <a:prstDash val="solid"/>
+                      <a:round/>
+                      <a:headEnd type="none" w="med" len="med"/>
+                      <a:tailEnd type="none" w="med" len="med"/>
+                    </a:lnT>
+                    <a:lnB w="12700" cap="flat" cmpd="sng" algn="ctr">
+                      <a:solidFill>
+                        <a:schemeClr val="tx1"/>
+                      </a:solidFill>
+                      <a:prstDash val="solid"/>
+                      <a:round/>
+                      <a:headEnd type="none" w="med" len="med"/>
+                      <a:tailEnd type="none" w="med" len="med"/>
+                    </a:lnB>
+                  </a:tcPr>
                 </a:tc>
                 <a:tc>
                   <a:txBody>
@@ -13557,12 +14202,52 @@
                     <a:lstStyle/>
                     <a:p>
                       <a:r>
-                        <a:rPr lang="en-US" dirty="0"/>
-                        <a:t>https://electricdiylab.com/how-to-make-arduino-mini-cnc-plotter-machine/</a:t>
+                        <a:rPr lang="en-US" dirty="0">
+                          <a:hlinkClick r:id="rId2"/>
+                        </a:rPr>
+                        <a:t>Click here</a:t>
                       </a:r>
+                      <a:endParaRPr lang="en-US" dirty="0"/>
                     </a:p>
                   </a:txBody>
-                  <a:tcPr/>
+                  <a:tcPr>
+                    <a:lnL w="12700" cap="flat" cmpd="sng" algn="ctr">
+                      <a:solidFill>
+                        <a:schemeClr val="tx1"/>
+                      </a:solidFill>
+                      <a:prstDash val="solid"/>
+                      <a:round/>
+                      <a:headEnd type="none" w="med" len="med"/>
+                      <a:tailEnd type="none" w="med" len="med"/>
+                    </a:lnL>
+                    <a:lnR w="12700" cap="flat" cmpd="sng" algn="ctr">
+                      <a:solidFill>
+                        <a:schemeClr val="tx1"/>
+                      </a:solidFill>
+                      <a:prstDash val="solid"/>
+                      <a:round/>
+                      <a:headEnd type="none" w="med" len="med"/>
+                      <a:tailEnd type="none" w="med" len="med"/>
+                    </a:lnR>
+                    <a:lnT w="12700" cap="flat" cmpd="sng" algn="ctr">
+                      <a:solidFill>
+                        <a:schemeClr val="tx1"/>
+                      </a:solidFill>
+                      <a:prstDash val="solid"/>
+                      <a:round/>
+                      <a:headEnd type="none" w="med" len="med"/>
+                      <a:tailEnd type="none" w="med" len="med"/>
+                    </a:lnT>
+                    <a:lnB w="12700" cap="flat" cmpd="sng" algn="ctr">
+                      <a:solidFill>
+                        <a:schemeClr val="tx1"/>
+                      </a:solidFill>
+                      <a:prstDash val="solid"/>
+                      <a:round/>
+                      <a:headEnd type="none" w="med" len="med"/>
+                      <a:tailEnd type="none" w="med" len="med"/>
+                    </a:lnB>
+                  </a:tcPr>
                 </a:tc>
                 <a:extLst>
                   <a:ext uri="{0D108BD9-81ED-4DB2-BD59-A6C34878D82A}">
@@ -13584,7 +14269,44 @@
                       <a:endParaRPr lang="en-US" dirty="0"/>
                     </a:p>
                   </a:txBody>
-                  <a:tcPr/>
+                  <a:tcPr>
+                    <a:lnL w="12700" cap="flat" cmpd="sng" algn="ctr">
+                      <a:solidFill>
+                        <a:schemeClr val="tx1"/>
+                      </a:solidFill>
+                      <a:prstDash val="solid"/>
+                      <a:round/>
+                      <a:headEnd type="none" w="med" len="med"/>
+                      <a:tailEnd type="none" w="med" len="med"/>
+                    </a:lnL>
+                    <a:lnR w="12700" cap="flat" cmpd="sng" algn="ctr">
+                      <a:solidFill>
+                        <a:schemeClr val="tx1"/>
+                      </a:solidFill>
+                      <a:prstDash val="solid"/>
+                      <a:round/>
+                      <a:headEnd type="none" w="med" len="med"/>
+                      <a:tailEnd type="none" w="med" len="med"/>
+                    </a:lnR>
+                    <a:lnT w="12700" cap="flat" cmpd="sng" algn="ctr">
+                      <a:solidFill>
+                        <a:schemeClr val="tx1"/>
+                      </a:solidFill>
+                      <a:prstDash val="solid"/>
+                      <a:round/>
+                      <a:headEnd type="none" w="med" len="med"/>
+                      <a:tailEnd type="none" w="med" len="med"/>
+                    </a:lnT>
+                    <a:lnB w="12700" cap="flat" cmpd="sng" algn="ctr">
+                      <a:solidFill>
+                        <a:schemeClr val="tx1"/>
+                      </a:solidFill>
+                      <a:prstDash val="solid"/>
+                      <a:round/>
+                      <a:headEnd type="none" w="med" len="med"/>
+                      <a:tailEnd type="none" w="med" len="med"/>
+                    </a:lnB>
+                  </a:tcPr>
                 </a:tc>
                 <a:tc>
                   <a:txBody>
@@ -13617,7 +14339,44 @@
                       <a:endParaRPr lang="en-US" dirty="0"/>
                     </a:p>
                   </a:txBody>
-                  <a:tcPr/>
+                  <a:tcPr>
+                    <a:lnL w="12700" cap="flat" cmpd="sng" algn="ctr">
+                      <a:solidFill>
+                        <a:schemeClr val="tx1"/>
+                      </a:solidFill>
+                      <a:prstDash val="solid"/>
+                      <a:round/>
+                      <a:headEnd type="none" w="med" len="med"/>
+                      <a:tailEnd type="none" w="med" len="med"/>
+                    </a:lnL>
+                    <a:lnR w="12700" cap="flat" cmpd="sng" algn="ctr">
+                      <a:solidFill>
+                        <a:schemeClr val="tx1"/>
+                      </a:solidFill>
+                      <a:prstDash val="solid"/>
+                      <a:round/>
+                      <a:headEnd type="none" w="med" len="med"/>
+                      <a:tailEnd type="none" w="med" len="med"/>
+                    </a:lnR>
+                    <a:lnT w="12700" cap="flat" cmpd="sng" algn="ctr">
+                      <a:solidFill>
+                        <a:schemeClr val="tx1"/>
+                      </a:solidFill>
+                      <a:prstDash val="solid"/>
+                      <a:round/>
+                      <a:headEnd type="none" w="med" len="med"/>
+                      <a:tailEnd type="none" w="med" len="med"/>
+                    </a:lnT>
+                    <a:lnB w="12700" cap="flat" cmpd="sng" algn="ctr">
+                      <a:solidFill>
+                        <a:schemeClr val="tx1"/>
+                      </a:solidFill>
+                      <a:prstDash val="solid"/>
+                      <a:round/>
+                      <a:headEnd type="none" w="med" len="med"/>
+                      <a:tailEnd type="none" w="med" len="med"/>
+                    </a:lnB>
+                  </a:tcPr>
                 </a:tc>
                 <a:tc>
                   <a:txBody>
@@ -13631,7 +14390,44 @@
                       <a:endParaRPr lang="en-US" dirty="0"/>
                     </a:p>
                   </a:txBody>
-                  <a:tcPr/>
+                  <a:tcPr>
+                    <a:lnL w="12700" cap="flat" cmpd="sng" algn="ctr">
+                      <a:solidFill>
+                        <a:schemeClr val="tx1"/>
+                      </a:solidFill>
+                      <a:prstDash val="solid"/>
+                      <a:round/>
+                      <a:headEnd type="none" w="med" len="med"/>
+                      <a:tailEnd type="none" w="med" len="med"/>
+                    </a:lnL>
+                    <a:lnR w="12700" cap="flat" cmpd="sng" algn="ctr">
+                      <a:solidFill>
+                        <a:schemeClr val="tx1"/>
+                      </a:solidFill>
+                      <a:prstDash val="solid"/>
+                      <a:round/>
+                      <a:headEnd type="none" w="med" len="med"/>
+                      <a:tailEnd type="none" w="med" len="med"/>
+                    </a:lnR>
+                    <a:lnT w="12700" cap="flat" cmpd="sng" algn="ctr">
+                      <a:solidFill>
+                        <a:schemeClr val="tx1"/>
+                      </a:solidFill>
+                      <a:prstDash val="solid"/>
+                      <a:round/>
+                      <a:headEnd type="none" w="med" len="med"/>
+                      <a:tailEnd type="none" w="med" len="med"/>
+                    </a:lnT>
+                    <a:lnB w="12700" cap="flat" cmpd="sng" algn="ctr">
+                      <a:solidFill>
+                        <a:schemeClr val="tx1"/>
+                      </a:solidFill>
+                      <a:prstDash val="solid"/>
+                      <a:round/>
+                      <a:headEnd type="none" w="med" len="med"/>
+                      <a:tailEnd type="none" w="med" len="med"/>
+                    </a:lnB>
+                  </a:tcPr>
                 </a:tc>
                 <a:tc>
                   <a:txBody>
@@ -13645,7 +14441,44 @@
                       <a:endParaRPr lang="en-US" dirty="0"/>
                     </a:p>
                   </a:txBody>
-                  <a:tcPr/>
+                  <a:tcPr>
+                    <a:lnL w="12700" cap="flat" cmpd="sng" algn="ctr">
+                      <a:solidFill>
+                        <a:schemeClr val="tx1"/>
+                      </a:solidFill>
+                      <a:prstDash val="solid"/>
+                      <a:round/>
+                      <a:headEnd type="none" w="med" len="med"/>
+                      <a:tailEnd type="none" w="med" len="med"/>
+                    </a:lnL>
+                    <a:lnR w="12700" cap="flat" cmpd="sng" algn="ctr">
+                      <a:solidFill>
+                        <a:schemeClr val="tx1"/>
+                      </a:solidFill>
+                      <a:prstDash val="solid"/>
+                      <a:round/>
+                      <a:headEnd type="none" w="med" len="med"/>
+                      <a:tailEnd type="none" w="med" len="med"/>
+                    </a:lnR>
+                    <a:lnT w="12700" cap="flat" cmpd="sng" algn="ctr">
+                      <a:solidFill>
+                        <a:schemeClr val="tx1"/>
+                      </a:solidFill>
+                      <a:prstDash val="solid"/>
+                      <a:round/>
+                      <a:headEnd type="none" w="med" len="med"/>
+                      <a:tailEnd type="none" w="med" len="med"/>
+                    </a:lnT>
+                    <a:lnB w="12700" cap="flat" cmpd="sng" algn="ctr">
+                      <a:solidFill>
+                        <a:schemeClr val="tx1"/>
+                      </a:solidFill>
+                      <a:prstDash val="solid"/>
+                      <a:round/>
+                      <a:headEnd type="none" w="med" len="med"/>
+                      <a:tailEnd type="none" w="med" len="med"/>
+                    </a:lnB>
+                  </a:tcPr>
                 </a:tc>
                 <a:tc>
                   <a:txBody>
@@ -13655,7 +14488,44 @@
                       <a:endParaRPr lang="en-US" dirty="0"/>
                     </a:p>
                   </a:txBody>
-                  <a:tcPr/>
+                  <a:tcPr>
+                    <a:lnL w="12700" cap="flat" cmpd="sng" algn="ctr">
+                      <a:solidFill>
+                        <a:schemeClr val="tx1"/>
+                      </a:solidFill>
+                      <a:prstDash val="solid"/>
+                      <a:round/>
+                      <a:headEnd type="none" w="med" len="med"/>
+                      <a:tailEnd type="none" w="med" len="med"/>
+                    </a:lnL>
+                    <a:lnR w="12700" cap="flat" cmpd="sng" algn="ctr">
+                      <a:solidFill>
+                        <a:schemeClr val="tx1"/>
+                      </a:solidFill>
+                      <a:prstDash val="solid"/>
+                      <a:round/>
+                      <a:headEnd type="none" w="med" len="med"/>
+                      <a:tailEnd type="none" w="med" len="med"/>
+                    </a:lnR>
+                    <a:lnT w="12700" cap="flat" cmpd="sng" algn="ctr">
+                      <a:solidFill>
+                        <a:schemeClr val="tx1"/>
+                      </a:solidFill>
+                      <a:prstDash val="solid"/>
+                      <a:round/>
+                      <a:headEnd type="none" w="med" len="med"/>
+                      <a:tailEnd type="none" w="med" len="med"/>
+                    </a:lnT>
+                    <a:lnB w="12700" cap="flat" cmpd="sng" algn="ctr">
+                      <a:solidFill>
+                        <a:schemeClr val="tx1"/>
+                      </a:solidFill>
+                      <a:prstDash val="solid"/>
+                      <a:round/>
+                      <a:headEnd type="none" w="med" len="med"/>
+                      <a:tailEnd type="none" w="med" len="med"/>
+                    </a:lnB>
+                  </a:tcPr>
                 </a:tc>
                 <a:tc>
                   <a:txBody>
@@ -13663,12 +14533,52 @@
                     <a:lstStyle/>
                     <a:p>
                       <a:r>
-                        <a:rPr lang="en-US" dirty="0"/>
-                        <a:t>https://lastminuteengineers.com/a4988-stepper-motor-driver-arduino-tutorial/</a:t>
+                        <a:rPr lang="en-US" dirty="0">
+                          <a:hlinkClick r:id="rId3"/>
+                        </a:rPr>
+                        <a:t>Click here</a:t>
                       </a:r>
+                      <a:endParaRPr lang="en-US" dirty="0"/>
                     </a:p>
                   </a:txBody>
-                  <a:tcPr/>
+                  <a:tcPr>
+                    <a:lnL w="12700" cap="flat" cmpd="sng" algn="ctr">
+                      <a:solidFill>
+                        <a:schemeClr val="tx1"/>
+                      </a:solidFill>
+                      <a:prstDash val="solid"/>
+                      <a:round/>
+                      <a:headEnd type="none" w="med" len="med"/>
+                      <a:tailEnd type="none" w="med" len="med"/>
+                    </a:lnL>
+                    <a:lnR w="12700" cap="flat" cmpd="sng" algn="ctr">
+                      <a:solidFill>
+                        <a:schemeClr val="tx1"/>
+                      </a:solidFill>
+                      <a:prstDash val="solid"/>
+                      <a:round/>
+                      <a:headEnd type="none" w="med" len="med"/>
+                      <a:tailEnd type="none" w="med" len="med"/>
+                    </a:lnR>
+                    <a:lnT w="12700" cap="flat" cmpd="sng" algn="ctr">
+                      <a:solidFill>
+                        <a:schemeClr val="tx1"/>
+                      </a:solidFill>
+                      <a:prstDash val="solid"/>
+                      <a:round/>
+                      <a:headEnd type="none" w="med" len="med"/>
+                      <a:tailEnd type="none" w="med" len="med"/>
+                    </a:lnT>
+                    <a:lnB w="12700" cap="flat" cmpd="sng" algn="ctr">
+                      <a:solidFill>
+                        <a:schemeClr val="tx1"/>
+                      </a:solidFill>
+                      <a:prstDash val="solid"/>
+                      <a:round/>
+                      <a:headEnd type="none" w="med" len="med"/>
+                      <a:tailEnd type="none" w="med" len="med"/>
+                    </a:lnB>
+                  </a:tcPr>
                 </a:tc>
                 <a:extLst>
                   <a:ext uri="{0D108BD9-81ED-4DB2-BD59-A6C34878D82A}">
@@ -13694,7 +14604,7 @@
         </p:nvSpPr>
         <p:spPr>
           <a:xfrm>
-            <a:off x="4161429" y="669999"/>
+            <a:off x="4058398" y="579846"/>
             <a:ext cx="3869142" cy="461665"/>
           </a:xfrm>
           <a:prstGeom prst="rect">
@@ -13727,6 +14637,18 @@
   <p:clrMapOvr>
     <a:masterClrMapping/>
   </p:clrMapOvr>
+  <mc:AlternateContent xmlns:mc="http://schemas.openxmlformats.org/markup-compatibility/2006" xmlns:p15="http://schemas.microsoft.com/office/powerpoint/2012/main">
+    <mc:Choice Requires="p15">
+      <p:transition xmlns:p14="http://schemas.microsoft.com/office/powerpoint/2010/main" spd="slow" p14:dur="1250">
+        <p15:prstTrans prst="peelOff"/>
+      </p:transition>
+    </mc:Choice>
+    <mc:Fallback xmlns="">
+      <p:transition spd="slow">
+        <p:fade/>
+      </p:transition>
+    </mc:Fallback>
+  </mc:AlternateContent>
 </p:sld>
 </file>
 
@@ -13762,14 +14684,14 @@
           <p:nvPr>
             <p:extLst>
               <p:ext uri="{D42A27DB-BD31-4B8C-83A1-F6EECF244321}">
-                <p14:modId xmlns:p14="http://schemas.microsoft.com/office/powerpoint/2010/main" val="2414766503"/>
+                <p14:modId xmlns:p14="http://schemas.microsoft.com/office/powerpoint/2010/main" val="3742573042"/>
               </p:ext>
             </p:extLst>
           </p:nvPr>
         </p:nvGraphicFramePr>
         <p:xfrm>
-          <a:off x="752902" y="137994"/>
-          <a:ext cx="10686196" cy="6684767"/>
+          <a:off x="921301" y="933620"/>
+          <a:ext cx="10610850" cy="5072940"/>
         </p:xfrm>
         <a:graphic>
           <a:graphicData uri="http://schemas.openxmlformats.org/drawingml/2006/table">
@@ -13778,42 +14700,42 @@
                 <a:tableStyleId>{0660B408-B3CF-4A94-85FC-2B1E0A45F4A2}</a:tableStyleId>
               </a:tblPr>
               <a:tblGrid>
-                <a:gridCol w="627796">
+                <a:gridCol w="623369">
                   <a:extLst>
                     <a:ext uri="{9D8B030D-6E8A-4147-A177-3AD203B41FA5}">
                       <a16:colId xmlns:a16="http://schemas.microsoft.com/office/drawing/2014/main" val="1754224045"/>
                     </a:ext>
                   </a:extLst>
                 </a:gridCol>
-                <a:gridCol w="2413054">
+                <a:gridCol w="2396040">
                   <a:extLst>
                     <a:ext uri="{9D8B030D-6E8A-4147-A177-3AD203B41FA5}">
                       <a16:colId xmlns:a16="http://schemas.microsoft.com/office/drawing/2014/main" val="2385718090"/>
                     </a:ext>
                   </a:extLst>
                 </a:gridCol>
-                <a:gridCol w="1845047">
+                <a:gridCol w="1832038">
                   <a:extLst>
                     <a:ext uri="{9D8B030D-6E8A-4147-A177-3AD203B41FA5}">
                       <a16:colId xmlns:a16="http://schemas.microsoft.com/office/drawing/2014/main" val="866317953"/>
                     </a:ext>
                   </a:extLst>
                 </a:gridCol>
-                <a:gridCol w="2101756">
+                <a:gridCol w="2086937">
                   <a:extLst>
                     <a:ext uri="{9D8B030D-6E8A-4147-A177-3AD203B41FA5}">
                       <a16:colId xmlns:a16="http://schemas.microsoft.com/office/drawing/2014/main" val="488851140"/>
                     </a:ext>
                   </a:extLst>
                 </a:gridCol>
-                <a:gridCol w="1932335">
+                <a:gridCol w="1918711">
                   <a:extLst>
                     <a:ext uri="{9D8B030D-6E8A-4147-A177-3AD203B41FA5}">
                       <a16:colId xmlns:a16="http://schemas.microsoft.com/office/drawing/2014/main" val="4193998565"/>
                     </a:ext>
                   </a:extLst>
                 </a:gridCol>
-                <a:gridCol w="1766208">
+                <a:gridCol w="1753755">
                   <a:extLst>
                     <a:ext uri="{9D8B030D-6E8A-4147-A177-3AD203B41FA5}">
                       <a16:colId xmlns:a16="http://schemas.microsoft.com/office/drawing/2014/main" val="769414471"/>
@@ -13821,146 +14743,7 @@
                   </a:extLst>
                 </a:gridCol>
               </a:tblGrid>
-              <a:tr h="649727">
-                <a:tc>
-                  <a:txBody>
-                    <a:bodyPr/>
-                    <a:lstStyle/>
-                    <a:p>
-                      <a:pPr algn="ctr"/>
-                      <a:r>
-                        <a:rPr lang="en-IN" dirty="0"/>
-                        <a:t>S. No.</a:t>
-                      </a:r>
-                      <a:endParaRPr lang="en-US" dirty="0"/>
-                    </a:p>
-                  </a:txBody>
-                  <a:tcPr>
-                    <a:solidFill>
-                      <a:schemeClr val="bg2">
-                        <a:lumMod val="40000"/>
-                        <a:lumOff val="60000"/>
-                      </a:schemeClr>
-                    </a:solidFill>
-                  </a:tcPr>
-                </a:tc>
-                <a:tc>
-                  <a:txBody>
-                    <a:bodyPr/>
-                    <a:lstStyle/>
-                    <a:p>
-                      <a:pPr algn="ctr"/>
-                      <a:r>
-                        <a:rPr lang="en-IN" dirty="0"/>
-                        <a:t>TITLE OF THE JOURNAL</a:t>
-                      </a:r>
-                      <a:endParaRPr lang="en-US" dirty="0"/>
-                    </a:p>
-                  </a:txBody>
-                  <a:tcPr>
-                    <a:solidFill>
-                      <a:schemeClr val="bg2">
-                        <a:lumMod val="40000"/>
-                        <a:lumOff val="60000"/>
-                      </a:schemeClr>
-                    </a:solidFill>
-                  </a:tcPr>
-                </a:tc>
-                <a:tc>
-                  <a:txBody>
-                    <a:bodyPr/>
-                    <a:lstStyle/>
-                    <a:p>
-                      <a:pPr algn="ctr"/>
-                      <a:r>
-                        <a:rPr lang="en-IN" dirty="0"/>
-                        <a:t>NAME OF THE AUTHOR</a:t>
-                      </a:r>
-                      <a:endParaRPr lang="en-US" dirty="0"/>
-                    </a:p>
-                  </a:txBody>
-                  <a:tcPr>
-                    <a:solidFill>
-                      <a:schemeClr val="bg2">
-                        <a:lumMod val="40000"/>
-                        <a:lumOff val="60000"/>
-                      </a:schemeClr>
-                    </a:solidFill>
-                  </a:tcPr>
-                </a:tc>
-                <a:tc>
-                  <a:txBody>
-                    <a:bodyPr/>
-                    <a:lstStyle/>
-                    <a:p>
-                      <a:pPr algn="ctr"/>
-                      <a:r>
-                        <a:rPr lang="en-IN" dirty="0"/>
-                        <a:t>YEAR OF PUBLICATION</a:t>
-                      </a:r>
-                      <a:endParaRPr lang="en-US" dirty="0"/>
-                    </a:p>
-                  </a:txBody>
-                  <a:tcPr>
-                    <a:solidFill>
-                      <a:schemeClr val="bg2">
-                        <a:lumMod val="40000"/>
-                        <a:lumOff val="60000"/>
-                      </a:schemeClr>
-                    </a:solidFill>
-                  </a:tcPr>
-                </a:tc>
-                <a:tc>
-                  <a:txBody>
-                    <a:bodyPr/>
-                    <a:lstStyle/>
-                    <a:p>
-                      <a:pPr algn="ctr"/>
-                      <a:r>
-                        <a:rPr lang="en-IN" dirty="0"/>
-                        <a:t>INFEREFENCE</a:t>
-                      </a:r>
-                      <a:endParaRPr lang="en-US" dirty="0"/>
-                    </a:p>
-                  </a:txBody>
-                  <a:tcPr>
-                    <a:solidFill>
-                      <a:schemeClr val="bg2">
-                        <a:lumMod val="40000"/>
-                        <a:lumOff val="60000"/>
-                      </a:schemeClr>
-                    </a:solidFill>
-                  </a:tcPr>
-                </a:tc>
-                <a:tc>
-                  <a:txBody>
-                    <a:bodyPr/>
-                    <a:lstStyle/>
-                    <a:p>
-                      <a:pPr algn="ctr"/>
-                      <a:r>
-                        <a:rPr lang="en-IN" dirty="0"/>
-                        <a:t>URL</a:t>
-                      </a:r>
-                      <a:endParaRPr lang="en-US" dirty="0"/>
-                    </a:p>
-                  </a:txBody>
-                  <a:tcPr>
-                    <a:solidFill>
-                      <a:schemeClr val="bg2">
-                        <a:lumMod val="40000"/>
-                        <a:lumOff val="60000"/>
-                      </a:schemeClr>
-                    </a:solidFill>
-                  </a:tcPr>
-                </a:tc>
-                <a:extLst>
-                  <a:ext uri="{0D108BD9-81ED-4DB2-BD59-A6C34878D82A}">
-                    <a16:rowId xmlns:a16="http://schemas.microsoft.com/office/drawing/2014/main" val="3277988775"/>
-                  </a:ext>
-                </a:extLst>
-              </a:tr>
-              <a:tr h="1992982">
+              <a:tr h="1577760">
                 <a:tc>
                   <a:txBody>
                     <a:bodyPr/>
@@ -13968,13 +14751,69 @@
                     <a:p>
                       <a:pPr algn="r"/>
                       <a:r>
-                        <a:rPr lang="en-IN" dirty="0"/>
+                        <a:rPr lang="en-IN" b="0" dirty="0">
+                          <a:solidFill>
+                            <a:schemeClr val="bg1"/>
+                          </a:solidFill>
+                        </a:rPr>
                         <a:t>3.</a:t>
                       </a:r>
-                      <a:endParaRPr lang="en-US" dirty="0"/>
+                      <a:endParaRPr lang="en-US" b="0" dirty="0">
+                        <a:solidFill>
+                          <a:schemeClr val="bg1"/>
+                        </a:solidFill>
+                      </a:endParaRPr>
                     </a:p>
                   </a:txBody>
-                  <a:tcPr/>
+                  <a:tcPr>
+                    <a:lnL w="12700" cap="flat" cmpd="sng" algn="ctr">
+                      <a:solidFill>
+                        <a:schemeClr val="tx1"/>
+                      </a:solidFill>
+                      <a:prstDash val="solid"/>
+                      <a:round/>
+                      <a:headEnd type="none" w="med" len="med"/>
+                      <a:tailEnd type="none" w="med" len="med"/>
+                    </a:lnL>
+                    <a:lnR w="12700" cap="flat" cmpd="sng" algn="ctr">
+                      <a:solidFill>
+                        <a:schemeClr val="tx1"/>
+                      </a:solidFill>
+                      <a:prstDash val="solid"/>
+                      <a:round/>
+                      <a:headEnd type="none" w="med" len="med"/>
+                      <a:tailEnd type="none" w="med" len="med"/>
+                    </a:lnR>
+                    <a:lnT w="12700" cap="flat" cmpd="sng" algn="ctr">
+                      <a:solidFill>
+                        <a:schemeClr val="tx1"/>
+                      </a:solidFill>
+                      <a:prstDash val="solid"/>
+                      <a:round/>
+                      <a:headEnd type="none" w="med" len="med"/>
+                      <a:tailEnd type="none" w="med" len="med"/>
+                    </a:lnT>
+                    <a:lnB w="12700" cap="flat" cmpd="sng" algn="ctr">
+                      <a:solidFill>
+                        <a:schemeClr val="tx1"/>
+                      </a:solidFill>
+                      <a:prstDash val="solid"/>
+                      <a:round/>
+                      <a:headEnd type="none" w="med" len="med"/>
+                      <a:tailEnd type="none" w="med" len="med"/>
+                    </a:lnB>
+                    <a:lnTlToBr w="12700" cmpd="sng">
+                      <a:noFill/>
+                      <a:prstDash val="solid"/>
+                    </a:lnTlToBr>
+                    <a:lnBlToTr w="12700" cmpd="sng">
+                      <a:noFill/>
+                      <a:prstDash val="solid"/>
+                    </a:lnBlToTr>
+                    <a:solidFill>
+                      <a:srgbClr val="EEF0F2"/>
+                    </a:solidFill>
+                  </a:tcPr>
                 </a:tc>
                 <a:tc>
                   <a:txBody>
@@ -14021,7 +14860,47 @@
                       </a:endParaRPr>
                     </a:p>
                   </a:txBody>
-                  <a:tcPr/>
+                  <a:tcPr>
+                    <a:lnL w="12700" cap="flat" cmpd="sng" algn="ctr">
+                      <a:solidFill>
+                        <a:schemeClr val="tx1"/>
+                      </a:solidFill>
+                      <a:prstDash val="solid"/>
+                      <a:round/>
+                      <a:headEnd type="none" w="med" len="med"/>
+                      <a:tailEnd type="none" w="med" len="med"/>
+                    </a:lnL>
+                    <a:lnR w="12700" cap="flat" cmpd="sng" algn="ctr">
+                      <a:solidFill>
+                        <a:schemeClr val="tx1"/>
+                      </a:solidFill>
+                      <a:prstDash val="solid"/>
+                      <a:round/>
+                      <a:headEnd type="none" w="med" len="med"/>
+                      <a:tailEnd type="none" w="med" len="med"/>
+                    </a:lnR>
+                    <a:lnT w="12700" cap="flat" cmpd="sng" algn="ctr">
+                      <a:solidFill>
+                        <a:schemeClr val="tx1"/>
+                      </a:solidFill>
+                      <a:prstDash val="solid"/>
+                      <a:round/>
+                      <a:headEnd type="none" w="med" len="med"/>
+                      <a:tailEnd type="none" w="med" len="med"/>
+                    </a:lnT>
+                    <a:lnB w="12700" cap="flat" cmpd="sng" algn="ctr">
+                      <a:solidFill>
+                        <a:schemeClr val="tx1"/>
+                      </a:solidFill>
+                      <a:prstDash val="solid"/>
+                      <a:round/>
+                      <a:headEnd type="none" w="med" len="med"/>
+                      <a:tailEnd type="none" w="med" len="med"/>
+                    </a:lnB>
+                    <a:solidFill>
+                      <a:srgbClr val="EEF0F2"/>
+                    </a:solidFill>
+                  </a:tcPr>
                 </a:tc>
                 <a:tc>
                   <a:txBody>
@@ -14029,13 +14908,61 @@
                     <a:lstStyle/>
                     <a:p>
                       <a:r>
-                        <a:rPr lang="en-IN" dirty="0"/>
+                        <a:rPr lang="en-IN" b="0" dirty="0">
+                          <a:solidFill>
+                            <a:schemeClr val="bg1"/>
+                          </a:solidFill>
+                        </a:rPr>
                         <a:t>NA</a:t>
                       </a:r>
-                      <a:endParaRPr lang="en-US" dirty="0"/>
+                      <a:endParaRPr lang="en-US" b="0" dirty="0">
+                        <a:solidFill>
+                          <a:schemeClr val="bg1"/>
+                        </a:solidFill>
+                      </a:endParaRPr>
                     </a:p>
                   </a:txBody>
-                  <a:tcPr/>
+                  <a:tcPr>
+                    <a:lnL w="12700" cap="flat" cmpd="sng" algn="ctr">
+                      <a:solidFill>
+                        <a:schemeClr val="tx1"/>
+                      </a:solidFill>
+                      <a:prstDash val="solid"/>
+                      <a:round/>
+                      <a:headEnd type="none" w="med" len="med"/>
+                      <a:tailEnd type="none" w="med" len="med"/>
+                    </a:lnL>
+                    <a:lnR w="12700" cap="flat" cmpd="sng" algn="ctr">
+                      <a:solidFill>
+                        <a:schemeClr val="tx1"/>
+                      </a:solidFill>
+                      <a:prstDash val="solid"/>
+                      <a:round/>
+                      <a:headEnd type="none" w="med" len="med"/>
+                      <a:tailEnd type="none" w="med" len="med"/>
+                    </a:lnR>
+                    <a:lnT w="12700" cap="flat" cmpd="sng" algn="ctr">
+                      <a:solidFill>
+                        <a:schemeClr val="tx1"/>
+                      </a:solidFill>
+                      <a:prstDash val="solid"/>
+                      <a:round/>
+                      <a:headEnd type="none" w="med" len="med"/>
+                      <a:tailEnd type="none" w="med" len="med"/>
+                    </a:lnT>
+                    <a:lnB w="12700" cap="flat" cmpd="sng" algn="ctr">
+                      <a:solidFill>
+                        <a:schemeClr val="tx1"/>
+                      </a:solidFill>
+                      <a:prstDash val="solid"/>
+                      <a:round/>
+                      <a:headEnd type="none" w="med" len="med"/>
+                      <a:tailEnd type="none" w="med" len="med"/>
+                    </a:lnB>
+                    <a:solidFill>
+                      <a:srgbClr val="EEF0F2"/>
+                    </a:solidFill>
+                  </a:tcPr>
                 </a:tc>
                 <a:tc>
                   <a:txBody>
@@ -14043,13 +14970,57 @@
                     <a:lstStyle/>
                     <a:p>
                       <a:r>
-                        <a:rPr lang="en-IN" dirty="0"/>
+                        <a:rPr lang="en-IN" b="0" dirty="0">
+                          <a:solidFill>
+                            <a:schemeClr val="bg1"/>
+                          </a:solidFill>
+                        </a:rPr>
                         <a:t>NA</a:t>
                       </a:r>
-                      <a:endParaRPr lang="en-US" dirty="0"/>
+                      <a:endParaRPr lang="en-US" b="0" dirty="0">
+                        <a:solidFill>
+                          <a:schemeClr val="bg1"/>
+                        </a:solidFill>
+                      </a:endParaRPr>
                     </a:p>
                   </a:txBody>
-                  <a:tcPr/>
+                  <a:tcPr>
+                    <a:lnL w="12700" cap="flat" cmpd="sng" algn="ctr">
+                      <a:solidFill>
+                        <a:schemeClr val="tx1"/>
+                      </a:solidFill>
+                      <a:prstDash val="solid"/>
+                      <a:round/>
+                      <a:headEnd type="none" w="med" len="med"/>
+                      <a:tailEnd type="none" w="med" len="med"/>
+                    </a:lnL>
+                    <a:lnR w="12700" cap="flat" cmpd="sng" algn="ctr">
+                      <a:solidFill>
+                        <a:schemeClr val="tx1"/>
+                      </a:solidFill>
+                      <a:prstDash val="solid"/>
+                      <a:round/>
+                      <a:headEnd type="none" w="med" len="med"/>
+                      <a:tailEnd type="none" w="med" len="med"/>
+                    </a:lnR>
+                    <a:lnT w="12700" cap="flat" cmpd="sng" algn="ctr">
+                      <a:noFill/>
+                      <a:prstDash val="solid"/>
+                      <a:round/>
+                      <a:headEnd type="none" w="med" len="med"/>
+                      <a:tailEnd type="none" w="med" len="med"/>
+                    </a:lnT>
+                    <a:lnB w="12700" cap="flat" cmpd="sng" algn="ctr">
+                      <a:noFill/>
+                      <a:prstDash val="solid"/>
+                      <a:round/>
+                      <a:headEnd type="none" w="med" len="med"/>
+                      <a:tailEnd type="none" w="med" len="med"/>
+                    </a:lnB>
+                    <a:solidFill>
+                      <a:srgbClr val="EEF0F2"/>
+                    </a:solidFill>
+                  </a:tcPr>
                 </a:tc>
                 <a:tc>
                   <a:txBody>
@@ -14059,7 +15030,47 @@
                       <a:endParaRPr lang="en-US" dirty="0"/>
                     </a:p>
                   </a:txBody>
-                  <a:tcPr/>
+                  <a:tcPr>
+                    <a:lnL w="12700" cap="flat" cmpd="sng" algn="ctr">
+                      <a:solidFill>
+                        <a:schemeClr val="tx1"/>
+                      </a:solidFill>
+                      <a:prstDash val="solid"/>
+                      <a:round/>
+                      <a:headEnd type="none" w="med" len="med"/>
+                      <a:tailEnd type="none" w="med" len="med"/>
+                    </a:lnL>
+                    <a:lnR w="12700" cap="flat" cmpd="sng" algn="ctr">
+                      <a:solidFill>
+                        <a:schemeClr val="tx1"/>
+                      </a:solidFill>
+                      <a:prstDash val="solid"/>
+                      <a:round/>
+                      <a:headEnd type="none" w="med" len="med"/>
+                      <a:tailEnd type="none" w="med" len="med"/>
+                    </a:lnR>
+                    <a:lnT w="12700" cap="flat" cmpd="sng" algn="ctr">
+                      <a:solidFill>
+                        <a:schemeClr val="tx1"/>
+                      </a:solidFill>
+                      <a:prstDash val="solid"/>
+                      <a:round/>
+                      <a:headEnd type="none" w="med" len="med"/>
+                      <a:tailEnd type="none" w="med" len="med"/>
+                    </a:lnT>
+                    <a:lnB w="12700" cap="flat" cmpd="sng" algn="ctr">
+                      <a:solidFill>
+                        <a:schemeClr val="tx1"/>
+                      </a:solidFill>
+                      <a:prstDash val="solid"/>
+                      <a:round/>
+                      <a:headEnd type="none" w="med" len="med"/>
+                      <a:tailEnd type="none" w="med" len="med"/>
+                    </a:lnB>
+                    <a:solidFill>
+                      <a:srgbClr val="EEF0F2"/>
+                    </a:solidFill>
+                  </a:tcPr>
                 </a:tc>
                 <a:tc>
                   <a:txBody>
@@ -14067,12 +15078,62 @@
                     <a:lstStyle/>
                     <a:p>
                       <a:r>
-                        <a:rPr lang="en-US" dirty="0"/>
-                        <a:t>https://www.electronics-tutorials.ws/blog/convert-atx-psu-to-bench-supply.html</a:t>
+                        <a:rPr lang="en-US" b="0" dirty="0">
+                          <a:solidFill>
+                            <a:schemeClr val="bg1"/>
+                          </a:solidFill>
+                          <a:hlinkClick r:id="rId2"/>
+                        </a:rPr>
+                        <a:t>Click here</a:t>
                       </a:r>
+                      <a:endParaRPr lang="en-US" b="0" dirty="0">
+                        <a:solidFill>
+                          <a:schemeClr val="bg1"/>
+                        </a:solidFill>
+                      </a:endParaRPr>
                     </a:p>
                   </a:txBody>
-                  <a:tcPr/>
+                  <a:tcPr>
+                    <a:lnL w="12700" cap="flat" cmpd="sng" algn="ctr">
+                      <a:solidFill>
+                        <a:schemeClr val="tx1"/>
+                      </a:solidFill>
+                      <a:prstDash val="solid"/>
+                      <a:round/>
+                      <a:headEnd type="none" w="med" len="med"/>
+                      <a:tailEnd type="none" w="med" len="med"/>
+                    </a:lnL>
+                    <a:lnR w="12700" cap="flat" cmpd="sng" algn="ctr">
+                      <a:solidFill>
+                        <a:schemeClr val="tx1"/>
+                      </a:solidFill>
+                      <a:prstDash val="solid"/>
+                      <a:round/>
+                      <a:headEnd type="none" w="med" len="med"/>
+                      <a:tailEnd type="none" w="med" len="med"/>
+                    </a:lnR>
+                    <a:lnT w="12700" cap="flat" cmpd="sng" algn="ctr">
+                      <a:solidFill>
+                        <a:schemeClr val="tx1"/>
+                      </a:solidFill>
+                      <a:prstDash val="solid"/>
+                      <a:round/>
+                      <a:headEnd type="none" w="med" len="med"/>
+                      <a:tailEnd type="none" w="med" len="med"/>
+                    </a:lnT>
+                    <a:lnB w="12700" cap="flat" cmpd="sng" algn="ctr">
+                      <a:solidFill>
+                        <a:schemeClr val="tx1"/>
+                      </a:solidFill>
+                      <a:prstDash val="solid"/>
+                      <a:round/>
+                      <a:headEnd type="none" w="med" len="med"/>
+                      <a:tailEnd type="none" w="med" len="med"/>
+                    </a:lnB>
+                    <a:solidFill>
+                      <a:srgbClr val="EEF0F2"/>
+                    </a:solidFill>
+                  </a:tcPr>
                 </a:tc>
                 <a:extLst>
                   <a:ext uri="{0D108BD9-81ED-4DB2-BD59-A6C34878D82A}">
@@ -14080,7 +15141,7 @@
                   </a:ext>
                 </a:extLst>
               </a:tr>
-              <a:tr h="1984971">
+              <a:tr h="1747590">
                 <a:tc>
                   <a:txBody>
                     <a:bodyPr/>
@@ -14094,7 +15155,44 @@
                       <a:endParaRPr lang="en-US" dirty="0"/>
                     </a:p>
                   </a:txBody>
-                  <a:tcPr/>
+                  <a:tcPr>
+                    <a:lnL w="12700" cap="flat" cmpd="sng" algn="ctr">
+                      <a:solidFill>
+                        <a:schemeClr val="tx1"/>
+                      </a:solidFill>
+                      <a:prstDash val="solid"/>
+                      <a:round/>
+                      <a:headEnd type="none" w="med" len="med"/>
+                      <a:tailEnd type="none" w="med" len="med"/>
+                    </a:lnL>
+                    <a:lnR w="12700" cap="flat" cmpd="sng" algn="ctr">
+                      <a:solidFill>
+                        <a:schemeClr val="tx1"/>
+                      </a:solidFill>
+                      <a:prstDash val="solid"/>
+                      <a:round/>
+                      <a:headEnd type="none" w="med" len="med"/>
+                      <a:tailEnd type="none" w="med" len="med"/>
+                    </a:lnR>
+                    <a:lnT w="12700" cap="flat" cmpd="sng" algn="ctr">
+                      <a:solidFill>
+                        <a:schemeClr val="tx1"/>
+                      </a:solidFill>
+                      <a:prstDash val="solid"/>
+                      <a:round/>
+                      <a:headEnd type="none" w="med" len="med"/>
+                      <a:tailEnd type="none" w="med" len="med"/>
+                    </a:lnT>
+                    <a:lnB w="12700" cap="flat" cmpd="sng" algn="ctr">
+                      <a:solidFill>
+                        <a:schemeClr val="tx1"/>
+                      </a:solidFill>
+                      <a:prstDash val="solid"/>
+                      <a:round/>
+                      <a:headEnd type="none" w="med" len="med"/>
+                      <a:tailEnd type="none" w="med" len="med"/>
+                    </a:lnB>
+                  </a:tcPr>
                 </a:tc>
                 <a:tc>
                   <a:txBody>
@@ -14110,7 +15208,35 @@
                       <a:endParaRPr lang="en-US" b="0" dirty="0"/>
                     </a:p>
                   </a:txBody>
-                  <a:tcPr/>
+                  <a:tcPr>
+                    <a:lnL w="12700" cap="flat" cmpd="sng" algn="ctr">
+                      <a:solidFill>
+                        <a:schemeClr val="tx1"/>
+                      </a:solidFill>
+                      <a:prstDash val="solid"/>
+                      <a:round/>
+                      <a:headEnd type="none" w="med" len="med"/>
+                      <a:tailEnd type="none" w="med" len="med"/>
+                    </a:lnL>
+                    <a:lnT w="12700" cap="flat" cmpd="sng" algn="ctr">
+                      <a:solidFill>
+                        <a:schemeClr val="tx1"/>
+                      </a:solidFill>
+                      <a:prstDash val="solid"/>
+                      <a:round/>
+                      <a:headEnd type="none" w="med" len="med"/>
+                      <a:tailEnd type="none" w="med" len="med"/>
+                    </a:lnT>
+                    <a:lnB w="12700" cap="flat" cmpd="sng" algn="ctr">
+                      <a:solidFill>
+                        <a:schemeClr val="tx1"/>
+                      </a:solidFill>
+                      <a:prstDash val="solid"/>
+                      <a:round/>
+                      <a:headEnd type="none" w="med" len="med"/>
+                      <a:tailEnd type="none" w="med" len="med"/>
+                    </a:lnB>
+                  </a:tcPr>
                 </a:tc>
                 <a:tc>
                   <a:txBody>
@@ -14124,7 +15250,35 @@
                       <a:endParaRPr lang="en-US" dirty="0"/>
                     </a:p>
                   </a:txBody>
-                  <a:tcPr/>
+                  <a:tcPr>
+                    <a:lnR w="12700" cap="flat" cmpd="sng" algn="ctr">
+                      <a:solidFill>
+                        <a:schemeClr val="tx1"/>
+                      </a:solidFill>
+                      <a:prstDash val="solid"/>
+                      <a:round/>
+                      <a:headEnd type="none" w="med" len="med"/>
+                      <a:tailEnd type="none" w="med" len="med"/>
+                    </a:lnR>
+                    <a:lnT w="12700" cap="flat" cmpd="sng" algn="ctr">
+                      <a:solidFill>
+                        <a:schemeClr val="tx1"/>
+                      </a:solidFill>
+                      <a:prstDash val="solid"/>
+                      <a:round/>
+                      <a:headEnd type="none" w="med" len="med"/>
+                      <a:tailEnd type="none" w="med" len="med"/>
+                    </a:lnT>
+                    <a:lnB w="12700" cap="flat" cmpd="sng" algn="ctr">
+                      <a:solidFill>
+                        <a:schemeClr val="tx1"/>
+                      </a:solidFill>
+                      <a:prstDash val="solid"/>
+                      <a:round/>
+                      <a:headEnd type="none" w="med" len="med"/>
+                      <a:tailEnd type="none" w="med" len="med"/>
+                    </a:lnB>
+                  </a:tcPr>
                 </a:tc>
                 <a:tc>
                   <a:txBody>
@@ -14138,7 +15292,42 @@
                       <a:endParaRPr lang="en-US" dirty="0"/>
                     </a:p>
                   </a:txBody>
-                  <a:tcPr/>
+                  <a:tcPr>
+                    <a:lnL w="12700" cap="flat" cmpd="sng" algn="ctr">
+                      <a:solidFill>
+                        <a:schemeClr val="tx1"/>
+                      </a:solidFill>
+                      <a:prstDash val="solid"/>
+                      <a:round/>
+                      <a:headEnd type="none" w="med" len="med"/>
+                      <a:tailEnd type="none" w="med" len="med"/>
+                    </a:lnL>
+                    <a:lnR w="12700" cap="flat" cmpd="sng" algn="ctr">
+                      <a:solidFill>
+                        <a:schemeClr val="tx1"/>
+                      </a:solidFill>
+                      <a:prstDash val="solid"/>
+                      <a:round/>
+                      <a:headEnd type="none" w="med" len="med"/>
+                      <a:tailEnd type="none" w="med" len="med"/>
+                    </a:lnR>
+                    <a:lnT w="12700" cap="flat" cmpd="sng" algn="ctr">
+                      <a:noFill/>
+                      <a:prstDash val="solid"/>
+                      <a:round/>
+                      <a:headEnd type="none" w="med" len="med"/>
+                      <a:tailEnd type="none" w="med" len="med"/>
+                    </a:lnT>
+                    <a:lnB w="12700" cap="flat" cmpd="sng" algn="ctr">
+                      <a:solidFill>
+                        <a:schemeClr val="tx1"/>
+                      </a:solidFill>
+                      <a:prstDash val="solid"/>
+                      <a:round/>
+                      <a:headEnd type="none" w="med" len="med"/>
+                      <a:tailEnd type="none" w="med" len="med"/>
+                    </a:lnB>
+                  </a:tcPr>
                 </a:tc>
                 <a:tc>
                   <a:txBody>
@@ -14148,7 +15337,44 @@
                       <a:endParaRPr lang="en-US" dirty="0"/>
                     </a:p>
                   </a:txBody>
-                  <a:tcPr/>
+                  <a:tcPr>
+                    <a:lnL w="12700" cap="flat" cmpd="sng" algn="ctr">
+                      <a:solidFill>
+                        <a:schemeClr val="tx1"/>
+                      </a:solidFill>
+                      <a:prstDash val="solid"/>
+                      <a:round/>
+                      <a:headEnd type="none" w="med" len="med"/>
+                      <a:tailEnd type="none" w="med" len="med"/>
+                    </a:lnL>
+                    <a:lnR w="12700" cap="flat" cmpd="sng" algn="ctr">
+                      <a:solidFill>
+                        <a:schemeClr val="tx1"/>
+                      </a:solidFill>
+                      <a:prstDash val="solid"/>
+                      <a:round/>
+                      <a:headEnd type="none" w="med" len="med"/>
+                      <a:tailEnd type="none" w="med" len="med"/>
+                    </a:lnR>
+                    <a:lnT w="12700" cap="flat" cmpd="sng" algn="ctr">
+                      <a:solidFill>
+                        <a:schemeClr val="tx1"/>
+                      </a:solidFill>
+                      <a:prstDash val="solid"/>
+                      <a:round/>
+                      <a:headEnd type="none" w="med" len="med"/>
+                      <a:tailEnd type="none" w="med" len="med"/>
+                    </a:lnT>
+                    <a:lnB w="12700" cap="flat" cmpd="sng" algn="ctr">
+                      <a:solidFill>
+                        <a:schemeClr val="tx1"/>
+                      </a:solidFill>
+                      <a:prstDash val="solid"/>
+                      <a:round/>
+                      <a:headEnd type="none" w="med" len="med"/>
+                      <a:tailEnd type="none" w="med" len="med"/>
+                    </a:lnB>
+                  </a:tcPr>
                 </a:tc>
                 <a:tc>
                   <a:txBody>
@@ -14156,12 +15382,65 @@
                     <a:lstStyle/>
                     <a:p>
                       <a:r>
-                        <a:rPr lang="en-US" dirty="0"/>
-                        <a:t>https://lastminuteengineers.com/l298n-dc-stepper-driver-arduino-tutorial/</a:t>
+                        <a:rPr lang="en-US" dirty="0">
+                          <a:solidFill>
+                            <a:schemeClr val="bg1">
+                              <a:alpha val="50000"/>
+                            </a:schemeClr>
+                          </a:solidFill>
+                          <a:effectLst/>
+                          <a:hlinkClick r:id="rId3"/>
+                        </a:rPr>
+                        <a:t>Click here</a:t>
                       </a:r>
+                      <a:endParaRPr lang="en-US" dirty="0">
+                        <a:solidFill>
+                          <a:schemeClr val="bg1">
+                            <a:alpha val="50000"/>
+                          </a:schemeClr>
+                        </a:solidFill>
+                        <a:effectLst/>
+                      </a:endParaRPr>
                     </a:p>
                   </a:txBody>
-                  <a:tcPr/>
+                  <a:tcPr>
+                    <a:lnL w="12700" cap="flat" cmpd="sng" algn="ctr">
+                      <a:solidFill>
+                        <a:schemeClr val="tx1"/>
+                      </a:solidFill>
+                      <a:prstDash val="solid"/>
+                      <a:round/>
+                      <a:headEnd type="none" w="med" len="med"/>
+                      <a:tailEnd type="none" w="med" len="med"/>
+                    </a:lnL>
+                    <a:lnR w="12700" cap="flat" cmpd="sng" algn="ctr">
+                      <a:solidFill>
+                        <a:schemeClr val="tx1"/>
+                      </a:solidFill>
+                      <a:prstDash val="solid"/>
+                      <a:round/>
+                      <a:headEnd type="none" w="med" len="med"/>
+                      <a:tailEnd type="none" w="med" len="med"/>
+                    </a:lnR>
+                    <a:lnT w="12700" cap="flat" cmpd="sng" algn="ctr">
+                      <a:solidFill>
+                        <a:schemeClr val="tx1"/>
+                      </a:solidFill>
+                      <a:prstDash val="solid"/>
+                      <a:round/>
+                      <a:headEnd type="none" w="med" len="med"/>
+                      <a:tailEnd type="none" w="med" len="med"/>
+                    </a:lnT>
+                    <a:lnB w="12700" cap="flat" cmpd="sng" algn="ctr">
+                      <a:solidFill>
+                        <a:schemeClr val="tx1"/>
+                      </a:solidFill>
+                      <a:prstDash val="solid"/>
+                      <a:round/>
+                      <a:headEnd type="none" w="med" len="med"/>
+                      <a:tailEnd type="none" w="med" len="med"/>
+                    </a:lnB>
+                  </a:tcPr>
                 </a:tc>
                 <a:extLst>
                   <a:ext uri="{0D108BD9-81ED-4DB2-BD59-A6C34878D82A}">
@@ -14169,7 +15448,7 @@
                   </a:ext>
                 </a:extLst>
               </a:tr>
-              <a:tr h="1984971">
+              <a:tr h="1747590">
                 <a:tc>
                   <a:txBody>
                     <a:bodyPr/>
@@ -14183,7 +15462,44 @@
                       <a:endParaRPr lang="en-US" dirty="0"/>
                     </a:p>
                   </a:txBody>
-                  <a:tcPr/>
+                  <a:tcPr>
+                    <a:lnL w="12700" cap="flat" cmpd="sng" algn="ctr">
+                      <a:solidFill>
+                        <a:schemeClr val="tx1"/>
+                      </a:solidFill>
+                      <a:prstDash val="solid"/>
+                      <a:round/>
+                      <a:headEnd type="none" w="med" len="med"/>
+                      <a:tailEnd type="none" w="med" len="med"/>
+                    </a:lnL>
+                    <a:lnR w="12700" cap="flat" cmpd="sng" algn="ctr">
+                      <a:solidFill>
+                        <a:schemeClr val="tx1"/>
+                      </a:solidFill>
+                      <a:prstDash val="solid"/>
+                      <a:round/>
+                      <a:headEnd type="none" w="med" len="med"/>
+                      <a:tailEnd type="none" w="med" len="med"/>
+                    </a:lnR>
+                    <a:lnT w="12700" cap="flat" cmpd="sng" algn="ctr">
+                      <a:solidFill>
+                        <a:schemeClr val="tx1"/>
+                      </a:solidFill>
+                      <a:prstDash val="solid"/>
+                      <a:round/>
+                      <a:headEnd type="none" w="med" len="med"/>
+                      <a:tailEnd type="none" w="med" len="med"/>
+                    </a:lnT>
+                    <a:lnB w="12700" cap="flat" cmpd="sng" algn="ctr">
+                      <a:solidFill>
+                        <a:schemeClr val="tx1"/>
+                      </a:solidFill>
+                      <a:prstDash val="solid"/>
+                      <a:round/>
+                      <a:headEnd type="none" w="med" len="med"/>
+                      <a:tailEnd type="none" w="med" len="med"/>
+                    </a:lnB>
+                  </a:tcPr>
                 </a:tc>
                 <a:tc>
                   <a:txBody>
@@ -14216,7 +15532,44 @@
                       <a:endParaRPr lang="en-US" b="0" dirty="0"/>
                     </a:p>
                   </a:txBody>
-                  <a:tcPr/>
+                  <a:tcPr>
+                    <a:lnL w="12700" cap="flat" cmpd="sng" algn="ctr">
+                      <a:solidFill>
+                        <a:schemeClr val="tx1"/>
+                      </a:solidFill>
+                      <a:prstDash val="solid"/>
+                      <a:round/>
+                      <a:headEnd type="none" w="med" len="med"/>
+                      <a:tailEnd type="none" w="med" len="med"/>
+                    </a:lnL>
+                    <a:lnR w="12700" cap="flat" cmpd="sng" algn="ctr">
+                      <a:solidFill>
+                        <a:schemeClr val="tx1"/>
+                      </a:solidFill>
+                      <a:prstDash val="solid"/>
+                      <a:round/>
+                      <a:headEnd type="none" w="med" len="med"/>
+                      <a:tailEnd type="none" w="med" len="med"/>
+                    </a:lnR>
+                    <a:lnT w="12700" cap="flat" cmpd="sng" algn="ctr">
+                      <a:solidFill>
+                        <a:schemeClr val="tx1"/>
+                      </a:solidFill>
+                      <a:prstDash val="solid"/>
+                      <a:round/>
+                      <a:headEnd type="none" w="med" len="med"/>
+                      <a:tailEnd type="none" w="med" len="med"/>
+                    </a:lnT>
+                    <a:lnB w="12700" cap="flat" cmpd="sng" algn="ctr">
+                      <a:solidFill>
+                        <a:schemeClr val="tx1"/>
+                      </a:solidFill>
+                      <a:prstDash val="solid"/>
+                      <a:round/>
+                      <a:headEnd type="none" w="med" len="med"/>
+                      <a:tailEnd type="none" w="med" len="med"/>
+                    </a:lnB>
+                  </a:tcPr>
                 </a:tc>
                 <a:tc>
                   <a:txBody>
@@ -14229,7 +15582,44 @@
                       </a:r>
                     </a:p>
                   </a:txBody>
-                  <a:tcPr/>
+                  <a:tcPr>
+                    <a:lnL w="12700" cap="flat" cmpd="sng" algn="ctr">
+                      <a:solidFill>
+                        <a:schemeClr val="tx1"/>
+                      </a:solidFill>
+                      <a:prstDash val="solid"/>
+                      <a:round/>
+                      <a:headEnd type="none" w="med" len="med"/>
+                      <a:tailEnd type="none" w="med" len="med"/>
+                    </a:lnL>
+                    <a:lnR w="12700" cap="flat" cmpd="sng" algn="ctr">
+                      <a:solidFill>
+                        <a:schemeClr val="tx1"/>
+                      </a:solidFill>
+                      <a:prstDash val="solid"/>
+                      <a:round/>
+                      <a:headEnd type="none" w="med" len="med"/>
+                      <a:tailEnd type="none" w="med" len="med"/>
+                    </a:lnR>
+                    <a:lnT w="12700" cap="flat" cmpd="sng" algn="ctr">
+                      <a:solidFill>
+                        <a:schemeClr val="tx1"/>
+                      </a:solidFill>
+                      <a:prstDash val="solid"/>
+                      <a:round/>
+                      <a:headEnd type="none" w="med" len="med"/>
+                      <a:tailEnd type="none" w="med" len="med"/>
+                    </a:lnT>
+                    <a:lnB w="12700" cap="flat" cmpd="sng" algn="ctr">
+                      <a:solidFill>
+                        <a:schemeClr val="tx1"/>
+                      </a:solidFill>
+                      <a:prstDash val="solid"/>
+                      <a:round/>
+                      <a:headEnd type="none" w="med" len="med"/>
+                      <a:tailEnd type="none" w="med" len="med"/>
+                    </a:lnB>
+                  </a:tcPr>
                 </a:tc>
                 <a:tc>
                   <a:txBody>
@@ -14243,7 +15633,44 @@
                       <a:endParaRPr lang="en-US" dirty="0"/>
                     </a:p>
                   </a:txBody>
-                  <a:tcPr/>
+                  <a:tcPr>
+                    <a:lnL w="12700" cap="flat" cmpd="sng" algn="ctr">
+                      <a:solidFill>
+                        <a:schemeClr val="tx1"/>
+                      </a:solidFill>
+                      <a:prstDash val="solid"/>
+                      <a:round/>
+                      <a:headEnd type="none" w="med" len="med"/>
+                      <a:tailEnd type="none" w="med" len="med"/>
+                    </a:lnL>
+                    <a:lnR w="12700" cap="flat" cmpd="sng" algn="ctr">
+                      <a:solidFill>
+                        <a:schemeClr val="tx1"/>
+                      </a:solidFill>
+                      <a:prstDash val="solid"/>
+                      <a:round/>
+                      <a:headEnd type="none" w="med" len="med"/>
+                      <a:tailEnd type="none" w="med" len="med"/>
+                    </a:lnR>
+                    <a:lnT w="12700" cap="flat" cmpd="sng" algn="ctr">
+                      <a:solidFill>
+                        <a:schemeClr val="tx1"/>
+                      </a:solidFill>
+                      <a:prstDash val="solid"/>
+                      <a:round/>
+                      <a:headEnd type="none" w="med" len="med"/>
+                      <a:tailEnd type="none" w="med" len="med"/>
+                    </a:lnT>
+                    <a:lnB w="12700" cap="flat" cmpd="sng" algn="ctr">
+                      <a:solidFill>
+                        <a:schemeClr val="tx1"/>
+                      </a:solidFill>
+                      <a:prstDash val="solid"/>
+                      <a:round/>
+                      <a:headEnd type="none" w="med" len="med"/>
+                      <a:tailEnd type="none" w="med" len="med"/>
+                    </a:lnB>
+                  </a:tcPr>
                 </a:tc>
                 <a:tc>
                   <a:txBody>
@@ -14253,7 +15680,44 @@
                       <a:endParaRPr lang="en-US" dirty="0"/>
                     </a:p>
                   </a:txBody>
-                  <a:tcPr/>
+                  <a:tcPr>
+                    <a:lnL w="12700" cap="flat" cmpd="sng" algn="ctr">
+                      <a:solidFill>
+                        <a:schemeClr val="tx1"/>
+                      </a:solidFill>
+                      <a:prstDash val="solid"/>
+                      <a:round/>
+                      <a:headEnd type="none" w="med" len="med"/>
+                      <a:tailEnd type="none" w="med" len="med"/>
+                    </a:lnL>
+                    <a:lnR w="12700" cap="flat" cmpd="sng" algn="ctr">
+                      <a:solidFill>
+                        <a:schemeClr val="tx1"/>
+                      </a:solidFill>
+                      <a:prstDash val="solid"/>
+                      <a:round/>
+                      <a:headEnd type="none" w="med" len="med"/>
+                      <a:tailEnd type="none" w="med" len="med"/>
+                    </a:lnR>
+                    <a:lnT w="12700" cap="flat" cmpd="sng" algn="ctr">
+                      <a:solidFill>
+                        <a:schemeClr val="tx1"/>
+                      </a:solidFill>
+                      <a:prstDash val="solid"/>
+                      <a:round/>
+                      <a:headEnd type="none" w="med" len="med"/>
+                      <a:tailEnd type="none" w="med" len="med"/>
+                    </a:lnT>
+                    <a:lnB w="12700" cap="flat" cmpd="sng" algn="ctr">
+                      <a:solidFill>
+                        <a:schemeClr val="tx1"/>
+                      </a:solidFill>
+                      <a:prstDash val="solid"/>
+                      <a:round/>
+                      <a:headEnd type="none" w="med" len="med"/>
+                      <a:tailEnd type="none" w="med" len="med"/>
+                    </a:lnB>
+                  </a:tcPr>
                 </a:tc>
                 <a:tc>
                   <a:txBody>
@@ -14261,12 +15725,52 @@
                     <a:lstStyle/>
                     <a:p>
                       <a:r>
-                        <a:rPr lang="en-US" dirty="0"/>
-                        <a:t>https://techtutorialsx.com/2017/12/02/esp32-esp8266-arduino-serial-communication-with-python/</a:t>
+                        <a:rPr lang="en-US" dirty="0">
+                          <a:hlinkClick r:id="rId4"/>
+                        </a:rPr>
+                        <a:t>Click here</a:t>
                       </a:r>
+                      <a:endParaRPr lang="en-US" dirty="0"/>
                     </a:p>
                   </a:txBody>
-                  <a:tcPr/>
+                  <a:tcPr>
+                    <a:lnL w="12700" cap="flat" cmpd="sng" algn="ctr">
+                      <a:solidFill>
+                        <a:schemeClr val="tx1"/>
+                      </a:solidFill>
+                      <a:prstDash val="solid"/>
+                      <a:round/>
+                      <a:headEnd type="none" w="med" len="med"/>
+                      <a:tailEnd type="none" w="med" len="med"/>
+                    </a:lnL>
+                    <a:lnR w="12700" cap="flat" cmpd="sng" algn="ctr">
+                      <a:solidFill>
+                        <a:schemeClr val="tx1"/>
+                      </a:solidFill>
+                      <a:prstDash val="solid"/>
+                      <a:round/>
+                      <a:headEnd type="none" w="med" len="med"/>
+                      <a:tailEnd type="none" w="med" len="med"/>
+                    </a:lnR>
+                    <a:lnT w="12700" cap="flat" cmpd="sng" algn="ctr">
+                      <a:solidFill>
+                        <a:schemeClr val="tx1"/>
+                      </a:solidFill>
+                      <a:prstDash val="solid"/>
+                      <a:round/>
+                      <a:headEnd type="none" w="med" len="med"/>
+                      <a:tailEnd type="none" w="med" len="med"/>
+                    </a:lnT>
+                    <a:lnB w="12700" cap="flat" cmpd="sng" algn="ctr">
+                      <a:solidFill>
+                        <a:schemeClr val="tx1"/>
+                      </a:solidFill>
+                      <a:prstDash val="solid"/>
+                      <a:round/>
+                      <a:headEnd type="none" w="med" len="med"/>
+                      <a:tailEnd type="none" w="med" len="med"/>
+                    </a:lnB>
+                  </a:tcPr>
                 </a:tc>
                 <a:extLst>
                   <a:ext uri="{0D108BD9-81ED-4DB2-BD59-A6C34878D82A}">
@@ -14288,153 +15792,22 @@
   <p:clrMapOvr>
     <a:masterClrMapping/>
   </p:clrMapOvr>
+  <mc:AlternateContent xmlns:mc="http://schemas.openxmlformats.org/markup-compatibility/2006" xmlns:p15="http://schemas.microsoft.com/office/powerpoint/2012/main">
+    <mc:Choice Requires="p15">
+      <p:transition xmlns:p14="http://schemas.microsoft.com/office/powerpoint/2010/main" spd="slow" p14:dur="1250">
+        <p15:prstTrans prst="peelOff"/>
+      </p:transition>
+    </mc:Choice>
+    <mc:Fallback xmlns="">
+      <p:transition spd="slow">
+        <p:fade/>
+      </p:transition>
+    </mc:Fallback>
+  </mc:AlternateContent>
 </p:sld>
 </file>
 
 <file path=ppt/slides/slide5.xml><?xml version="1.0" encoding="utf-8"?>
-<p:sld xmlns:a="http://schemas.openxmlformats.org/drawingml/2006/main" xmlns:r="http://schemas.openxmlformats.org/officeDocument/2006/relationships" xmlns:p="http://schemas.openxmlformats.org/presentationml/2006/main">
-  <p:cSld>
-    <p:spTree>
-      <p:nvGrpSpPr>
-        <p:cNvPr id="1" name=""/>
-        <p:cNvGrpSpPr/>
-        <p:nvPr/>
-      </p:nvGrpSpPr>
-      <p:grpSpPr>
-        <a:xfrm>
-          <a:off x="0" y="0"/>
-          <a:ext cx="0" cy="0"/>
-          <a:chOff x="0" y="0"/>
-          <a:chExt cx="0" cy="0"/>
-        </a:xfrm>
-      </p:grpSpPr>
-      <p:sp>
-        <p:nvSpPr>
-          <p:cNvPr id="2" name="Slide Number Placeholder 1">
-            <a:extLst>
-              <a:ext uri="{FF2B5EF4-FFF2-40B4-BE49-F238E27FC236}">
-                <a16:creationId xmlns:a16="http://schemas.microsoft.com/office/drawing/2014/main" id="{FF832A81-494B-4395-952C-9372D0ACB3E2}"/>
-              </a:ext>
-            </a:extLst>
-          </p:cNvPr>
-          <p:cNvSpPr>
-            <a:spLocks noGrp="1"/>
-          </p:cNvSpPr>
-          <p:nvPr>
-            <p:ph type="sldNum" sz="quarter" idx="12"/>
-          </p:nvPr>
-        </p:nvSpPr>
-        <p:spPr/>
-        <p:txBody>
-          <a:bodyPr/>
-          <a:lstStyle/>
-          <a:p>
-            <a:fld id="{B59B104B-9B6C-40D2-938C-E7EC2A71093E}" type="slidenum">
-              <a:rPr lang="en-US" smtClean="0"/>
-              <a:t>5</a:t>
-            </a:fld>
-            <a:endParaRPr lang="en-US"/>
-          </a:p>
-        </p:txBody>
-      </p:sp>
-      <p:sp>
-        <p:nvSpPr>
-          <p:cNvPr id="3" name="TextBox 2">
-            <a:extLst>
-              <a:ext uri="{FF2B5EF4-FFF2-40B4-BE49-F238E27FC236}">
-                <a16:creationId xmlns:a16="http://schemas.microsoft.com/office/drawing/2014/main" id="{5B80F6FD-A96F-4946-958C-E01C6A4688BC}"/>
-              </a:ext>
-            </a:extLst>
-          </p:cNvPr>
-          <p:cNvSpPr txBox="1"/>
-          <p:nvPr/>
-        </p:nvSpPr>
-        <p:spPr>
-          <a:xfrm>
-            <a:off x="942109" y="2971800"/>
-            <a:ext cx="11249891" cy="1754326"/>
-          </a:xfrm>
-          <a:prstGeom prst="rect">
-            <a:avLst/>
-          </a:prstGeom>
-          <a:noFill/>
-        </p:spPr>
-        <p:txBody>
-          <a:bodyPr wrap="square" rtlCol="0">
-            <a:spAutoFit/>
-          </a:bodyPr>
-          <a:lstStyle/>
-          <a:p>
-            <a:pPr marL="342900" indent="-342900">
-              <a:buAutoNum type="arabicPeriod"/>
-            </a:pPr>
-            <a:r>
-              <a:rPr lang="en-IN" dirty="0"/>
-              <a:t>Designing PCB file</a:t>
-            </a:r>
-          </a:p>
-          <a:p>
-            <a:pPr marL="342900" indent="-342900">
-              <a:buAutoNum type="arabicPeriod"/>
-            </a:pPr>
-            <a:r>
-              <a:rPr lang="en-IN" dirty="0"/>
-              <a:t>Generating CSV file</a:t>
-            </a:r>
-          </a:p>
-          <a:p>
-            <a:pPr marL="342900" indent="-342900">
-              <a:buAutoNum type="arabicPeriod"/>
-            </a:pPr>
-            <a:r>
-              <a:rPr lang="en-IN" dirty="0"/>
-              <a:t>Extracting soldering points  from CSV file using Python</a:t>
-            </a:r>
-          </a:p>
-          <a:p>
-            <a:pPr marL="342900" indent="-342900">
-              <a:buAutoNum type="arabicPeriod"/>
-            </a:pPr>
-            <a:r>
-              <a:rPr lang="en-IN" dirty="0"/>
-              <a:t>Calculating steps needed to traverse from one point to another using Python</a:t>
-            </a:r>
-          </a:p>
-          <a:p>
-            <a:pPr marL="342900" indent="-342900">
-              <a:buAutoNum type="arabicPeriod"/>
-            </a:pPr>
-            <a:r>
-              <a:rPr lang="en-IN" dirty="0"/>
-              <a:t> The calculated results  are sent to ESP32(via Bluetooth from PC)</a:t>
-            </a:r>
-          </a:p>
-          <a:p>
-            <a:pPr marL="342900" indent="-342900">
-              <a:buAutoNum type="arabicPeriod"/>
-            </a:pPr>
-            <a:r>
-              <a:rPr lang="en-IN" dirty="0"/>
-              <a:t> ESP32 receives the command wirelessly and controls the actuators</a:t>
-            </a:r>
-            <a:endParaRPr lang="en-US" dirty="0"/>
-          </a:p>
-        </p:txBody>
-      </p:sp>
-    </p:spTree>
-    <p:extLst>
-      <p:ext uri="{BB962C8B-B14F-4D97-AF65-F5344CB8AC3E}">
-        <p14:creationId xmlns:p14="http://schemas.microsoft.com/office/powerpoint/2010/main" val="1755296599"/>
-      </p:ext>
-    </p:extLst>
-  </p:cSld>
-  <p:clrMapOvr>
-    <a:masterClrMapping/>
-  </p:clrMapOvr>
-</p:sld>
-</file>
-
-<file path=ppt/slides/slide6.xml><?xml version="1.0" encoding="utf-8"?>
 <p:sld xmlns:a="http://schemas.openxmlformats.org/drawingml/2006/main" xmlns:r="http://schemas.openxmlformats.org/officeDocument/2006/relationships" xmlns:p="http://schemas.openxmlformats.org/presentationml/2006/main">
   <p:cSld>
     <p:spTree>
@@ -14474,7 +15847,7 @@
           <a:p>
             <a:fld id="{B59B104B-9B6C-40D2-938C-E7EC2A71093E}" type="slidenum">
               <a:rPr lang="en-US" smtClean="0"/>
-              <a:t>6</a:t>
+              <a:t>5</a:t>
             </a:fld>
             <a:endParaRPr lang="en-US"/>
           </a:p>
@@ -15115,6 +16488,51 @@
           </a:p>
         </p:txBody>
       </p:sp>
+      <p:sp>
+        <p:nvSpPr>
+          <p:cNvPr id="3" name="Rectangle 2"/>
+          <p:cNvSpPr/>
+          <p:nvPr/>
+        </p:nvSpPr>
+        <p:spPr>
+          <a:xfrm>
+            <a:off x="2281842" y="3008414"/>
+            <a:ext cx="7406444" cy="769441"/>
+          </a:xfrm>
+          <a:prstGeom prst="rect">
+            <a:avLst/>
+          </a:prstGeom>
+          <a:noFill/>
+        </p:spPr>
+        <p:txBody>
+          <a:bodyPr wrap="square" lIns="91440" tIns="45720" rIns="91440" bIns="45720">
+            <a:spAutoFit/>
+          </a:bodyPr>
+          <a:lstStyle/>
+          <a:p>
+            <a:pPr algn="ctr"/>
+            <a:r>
+              <a:rPr lang="en-US" sz="4400" b="1" dirty="0">
+                <a:ln w="6600">
+                  <a:solidFill>
+                    <a:schemeClr val="accent2"/>
+                  </a:solidFill>
+                  <a:prstDash val="solid"/>
+                </a:ln>
+                <a:solidFill>
+                  <a:srgbClr val="FFFFFF"/>
+                </a:solidFill>
+                <a:effectLst>
+                  <a:outerShdw dist="38100" dir="2700000" algn="tl" rotWithShape="0">
+                    <a:schemeClr val="accent2"/>
+                  </a:outerShdw>
+                </a:effectLst>
+              </a:rPr>
+              <a:t>BLOCK DIAGRAM</a:t>
+            </a:r>
+          </a:p>
+        </p:txBody>
+      </p:sp>
     </p:spTree>
     <p:extLst>
       <p:ext uri="{BB962C8B-B14F-4D97-AF65-F5344CB8AC3E}">
@@ -15125,13 +16543,697 @@
   <p:clrMapOvr>
     <a:masterClrMapping/>
   </p:clrMapOvr>
+  <mc:AlternateContent xmlns:mc="http://schemas.openxmlformats.org/markup-compatibility/2006" xmlns:p15="http://schemas.microsoft.com/office/powerpoint/2012/main">
+    <mc:Choice Requires="p15">
+      <p:transition xmlns:p14="http://schemas.microsoft.com/office/powerpoint/2010/main" spd="slow" p14:dur="1250">
+        <p15:prstTrans prst="peelOff"/>
+      </p:transition>
+    </mc:Choice>
+    <mc:Fallback xmlns="">
+      <p:transition spd="slow">
+        <p:fade/>
+      </p:transition>
+    </mc:Fallback>
+  </mc:AlternateContent>
+  <p:timing>
+    <p:tnLst>
+      <p:par>
+        <p:cTn id="1" dur="indefinite" restart="never" nodeType="tmRoot">
+          <p:childTnLst>
+            <p:seq concurrent="1" nextAc="seek">
+              <p:cTn id="2" dur="indefinite" nodeType="mainSeq">
+                <p:childTnLst>
+                  <p:par>
+                    <p:cTn id="3" fill="hold">
+                      <p:stCondLst>
+                        <p:cond delay="indefinite"/>
+                      </p:stCondLst>
+                      <p:childTnLst>
+                        <p:par>
+                          <p:cTn id="4" fill="hold">
+                            <p:stCondLst>
+                              <p:cond delay="0"/>
+                            </p:stCondLst>
+                            <p:childTnLst>
+                              <p:par>
+                                <p:cTn id="5" presetID="1" presetClass="exit" presetSubtype="0" fill="hold" grpId="0" nodeType="clickEffect">
+                                  <p:stCondLst>
+                                    <p:cond delay="0"/>
+                                  </p:stCondLst>
+                                  <p:childTnLst>
+                                    <p:set>
+                                      <p:cBhvr>
+                                        <p:cTn id="6" dur="1" fill="hold">
+                                          <p:stCondLst>
+                                            <p:cond delay="0"/>
+                                          </p:stCondLst>
+                                        </p:cTn>
+                                        <p:tgtEl>
+                                          <p:spTgt spid="3"/>
+                                        </p:tgtEl>
+                                        <p:attrNameLst>
+                                          <p:attrName>style.visibility</p:attrName>
+                                        </p:attrNameLst>
+                                      </p:cBhvr>
+                                      <p:to>
+                                        <p:strVal val="hidden"/>
+                                      </p:to>
+                                    </p:set>
+                                  </p:childTnLst>
+                                </p:cTn>
+                              </p:par>
+                            </p:childTnLst>
+                          </p:cTn>
+                        </p:par>
+                      </p:childTnLst>
+                    </p:cTn>
+                  </p:par>
+                  <p:par>
+                    <p:cTn id="7" fill="hold">
+                      <p:stCondLst>
+                        <p:cond delay="indefinite"/>
+                      </p:stCondLst>
+                      <p:childTnLst>
+                        <p:par>
+                          <p:cTn id="8" fill="hold">
+                            <p:stCondLst>
+                              <p:cond delay="0"/>
+                            </p:stCondLst>
+                            <p:childTnLst>
+                              <p:par>
+                                <p:cTn id="9" presetID="10" presetClass="entr" presetSubtype="0" fill="hold" grpId="0" nodeType="clickEffect">
+                                  <p:stCondLst>
+                                    <p:cond delay="0"/>
+                                  </p:stCondLst>
+                                  <p:childTnLst>
+                                    <p:set>
+                                      <p:cBhvr>
+                                        <p:cTn id="10" dur="1" fill="hold">
+                                          <p:stCondLst>
+                                            <p:cond delay="0"/>
+                                          </p:stCondLst>
+                                        </p:cTn>
+                                        <p:tgtEl>
+                                          <p:spTgt spid="5"/>
+                                        </p:tgtEl>
+                                        <p:attrNameLst>
+                                          <p:attrName>style.visibility</p:attrName>
+                                        </p:attrNameLst>
+                                      </p:cBhvr>
+                                      <p:to>
+                                        <p:strVal val="visible"/>
+                                      </p:to>
+                                    </p:set>
+                                    <p:animEffect transition="in" filter="fade">
+                                      <p:cBhvr>
+                                        <p:cTn id="11" dur="500"/>
+                                        <p:tgtEl>
+                                          <p:spTgt spid="5"/>
+                                        </p:tgtEl>
+                                      </p:cBhvr>
+                                    </p:animEffect>
+                                  </p:childTnLst>
+                                </p:cTn>
+                              </p:par>
+                            </p:childTnLst>
+                          </p:cTn>
+                        </p:par>
+                      </p:childTnLst>
+                    </p:cTn>
+                  </p:par>
+                  <p:par>
+                    <p:cTn id="12" fill="hold">
+                      <p:stCondLst>
+                        <p:cond delay="indefinite"/>
+                      </p:stCondLst>
+                      <p:childTnLst>
+                        <p:par>
+                          <p:cTn id="13" fill="hold">
+                            <p:stCondLst>
+                              <p:cond delay="0"/>
+                            </p:stCondLst>
+                            <p:childTnLst>
+                              <p:par>
+                                <p:cTn id="14" presetID="10" presetClass="entr" presetSubtype="0" fill="hold" grpId="0" nodeType="clickEffect">
+                                  <p:stCondLst>
+                                    <p:cond delay="0"/>
+                                  </p:stCondLst>
+                                  <p:childTnLst>
+                                    <p:set>
+                                      <p:cBhvr>
+                                        <p:cTn id="15" dur="1" fill="hold">
+                                          <p:stCondLst>
+                                            <p:cond delay="0"/>
+                                          </p:stCondLst>
+                                        </p:cTn>
+                                        <p:tgtEl>
+                                          <p:spTgt spid="25"/>
+                                        </p:tgtEl>
+                                        <p:attrNameLst>
+                                          <p:attrName>style.visibility</p:attrName>
+                                        </p:attrNameLst>
+                                      </p:cBhvr>
+                                      <p:to>
+                                        <p:strVal val="visible"/>
+                                      </p:to>
+                                    </p:set>
+                                    <p:animEffect transition="in" filter="fade">
+                                      <p:cBhvr>
+                                        <p:cTn id="16" dur="500"/>
+                                        <p:tgtEl>
+                                          <p:spTgt spid="25"/>
+                                        </p:tgtEl>
+                                      </p:cBhvr>
+                                    </p:animEffect>
+                                  </p:childTnLst>
+                                </p:cTn>
+                              </p:par>
+                            </p:childTnLst>
+                          </p:cTn>
+                        </p:par>
+                      </p:childTnLst>
+                    </p:cTn>
+                  </p:par>
+                  <p:par>
+                    <p:cTn id="17" fill="hold">
+                      <p:stCondLst>
+                        <p:cond delay="indefinite"/>
+                      </p:stCondLst>
+                      <p:childTnLst>
+                        <p:par>
+                          <p:cTn id="18" fill="hold">
+                            <p:stCondLst>
+                              <p:cond delay="0"/>
+                            </p:stCondLst>
+                            <p:childTnLst>
+                              <p:par>
+                                <p:cTn id="19" presetID="10" presetClass="entr" presetSubtype="0" fill="hold" grpId="0" nodeType="clickEffect">
+                                  <p:stCondLst>
+                                    <p:cond delay="0"/>
+                                  </p:stCondLst>
+                                  <p:childTnLst>
+                                    <p:set>
+                                      <p:cBhvr>
+                                        <p:cTn id="20" dur="1" fill="hold">
+                                          <p:stCondLst>
+                                            <p:cond delay="0"/>
+                                          </p:stCondLst>
+                                        </p:cTn>
+                                        <p:tgtEl>
+                                          <p:spTgt spid="13"/>
+                                        </p:tgtEl>
+                                        <p:attrNameLst>
+                                          <p:attrName>style.visibility</p:attrName>
+                                        </p:attrNameLst>
+                                      </p:cBhvr>
+                                      <p:to>
+                                        <p:strVal val="visible"/>
+                                      </p:to>
+                                    </p:set>
+                                    <p:animEffect transition="in" filter="fade">
+                                      <p:cBhvr>
+                                        <p:cTn id="21" dur="500"/>
+                                        <p:tgtEl>
+                                          <p:spTgt spid="13"/>
+                                        </p:tgtEl>
+                                      </p:cBhvr>
+                                    </p:animEffect>
+                                  </p:childTnLst>
+                                </p:cTn>
+                              </p:par>
+                            </p:childTnLst>
+                          </p:cTn>
+                        </p:par>
+                      </p:childTnLst>
+                    </p:cTn>
+                  </p:par>
+                  <p:par>
+                    <p:cTn id="22" fill="hold">
+                      <p:stCondLst>
+                        <p:cond delay="indefinite"/>
+                      </p:stCondLst>
+                      <p:childTnLst>
+                        <p:par>
+                          <p:cTn id="23" fill="hold">
+                            <p:stCondLst>
+                              <p:cond delay="0"/>
+                            </p:stCondLst>
+                            <p:childTnLst>
+                              <p:par>
+                                <p:cTn id="24" presetID="10" presetClass="entr" presetSubtype="0" fill="hold" grpId="0" nodeType="clickEffect">
+                                  <p:stCondLst>
+                                    <p:cond delay="0"/>
+                                  </p:stCondLst>
+                                  <p:childTnLst>
+                                    <p:set>
+                                      <p:cBhvr>
+                                        <p:cTn id="25" dur="1" fill="hold">
+                                          <p:stCondLst>
+                                            <p:cond delay="0"/>
+                                          </p:stCondLst>
+                                        </p:cTn>
+                                        <p:tgtEl>
+                                          <p:spTgt spid="21"/>
+                                        </p:tgtEl>
+                                        <p:attrNameLst>
+                                          <p:attrName>style.visibility</p:attrName>
+                                        </p:attrNameLst>
+                                      </p:cBhvr>
+                                      <p:to>
+                                        <p:strVal val="visible"/>
+                                      </p:to>
+                                    </p:set>
+                                    <p:animEffect transition="in" filter="fade">
+                                      <p:cBhvr>
+                                        <p:cTn id="26" dur="500"/>
+                                        <p:tgtEl>
+                                          <p:spTgt spid="21"/>
+                                        </p:tgtEl>
+                                      </p:cBhvr>
+                                    </p:animEffect>
+                                  </p:childTnLst>
+                                </p:cTn>
+                              </p:par>
+                            </p:childTnLst>
+                          </p:cTn>
+                        </p:par>
+                      </p:childTnLst>
+                    </p:cTn>
+                  </p:par>
+                  <p:par>
+                    <p:cTn id="27" fill="hold">
+                      <p:stCondLst>
+                        <p:cond delay="indefinite"/>
+                      </p:stCondLst>
+                      <p:childTnLst>
+                        <p:par>
+                          <p:cTn id="28" fill="hold">
+                            <p:stCondLst>
+                              <p:cond delay="0"/>
+                            </p:stCondLst>
+                            <p:childTnLst>
+                              <p:par>
+                                <p:cTn id="29" presetID="10" presetClass="entr" presetSubtype="0" fill="hold" grpId="0" nodeType="clickEffect">
+                                  <p:stCondLst>
+                                    <p:cond delay="0"/>
+                                  </p:stCondLst>
+                                  <p:childTnLst>
+                                    <p:set>
+                                      <p:cBhvr>
+                                        <p:cTn id="30" dur="1" fill="hold">
+                                          <p:stCondLst>
+                                            <p:cond delay="0"/>
+                                          </p:stCondLst>
+                                        </p:cTn>
+                                        <p:tgtEl>
+                                          <p:spTgt spid="16"/>
+                                        </p:tgtEl>
+                                        <p:attrNameLst>
+                                          <p:attrName>style.visibility</p:attrName>
+                                        </p:attrNameLst>
+                                      </p:cBhvr>
+                                      <p:to>
+                                        <p:strVal val="visible"/>
+                                      </p:to>
+                                    </p:set>
+                                    <p:animEffect transition="in" filter="fade">
+                                      <p:cBhvr>
+                                        <p:cTn id="31" dur="500"/>
+                                        <p:tgtEl>
+                                          <p:spTgt spid="16"/>
+                                        </p:tgtEl>
+                                      </p:cBhvr>
+                                    </p:animEffect>
+                                  </p:childTnLst>
+                                </p:cTn>
+                              </p:par>
+                            </p:childTnLst>
+                          </p:cTn>
+                        </p:par>
+                      </p:childTnLst>
+                    </p:cTn>
+                  </p:par>
+                  <p:par>
+                    <p:cTn id="32" fill="hold">
+                      <p:stCondLst>
+                        <p:cond delay="indefinite"/>
+                      </p:stCondLst>
+                      <p:childTnLst>
+                        <p:par>
+                          <p:cTn id="33" fill="hold">
+                            <p:stCondLst>
+                              <p:cond delay="0"/>
+                            </p:stCondLst>
+                            <p:childTnLst>
+                              <p:par>
+                                <p:cTn id="34" presetID="10" presetClass="entr" presetSubtype="0" fill="hold" grpId="0" nodeType="clickEffect">
+                                  <p:stCondLst>
+                                    <p:cond delay="0"/>
+                                  </p:stCondLst>
+                                  <p:childTnLst>
+                                    <p:set>
+                                      <p:cBhvr>
+                                        <p:cTn id="35" dur="1" fill="hold">
+                                          <p:stCondLst>
+                                            <p:cond delay="0"/>
+                                          </p:stCondLst>
+                                        </p:cTn>
+                                        <p:tgtEl>
+                                          <p:spTgt spid="22"/>
+                                        </p:tgtEl>
+                                        <p:attrNameLst>
+                                          <p:attrName>style.visibility</p:attrName>
+                                        </p:attrNameLst>
+                                      </p:cBhvr>
+                                      <p:to>
+                                        <p:strVal val="visible"/>
+                                      </p:to>
+                                    </p:set>
+                                    <p:animEffect transition="in" filter="fade">
+                                      <p:cBhvr>
+                                        <p:cTn id="36" dur="500"/>
+                                        <p:tgtEl>
+                                          <p:spTgt spid="22"/>
+                                        </p:tgtEl>
+                                      </p:cBhvr>
+                                    </p:animEffect>
+                                  </p:childTnLst>
+                                </p:cTn>
+                              </p:par>
+                            </p:childTnLst>
+                          </p:cTn>
+                        </p:par>
+                      </p:childTnLst>
+                    </p:cTn>
+                  </p:par>
+                  <p:par>
+                    <p:cTn id="37" fill="hold">
+                      <p:stCondLst>
+                        <p:cond delay="indefinite"/>
+                      </p:stCondLst>
+                      <p:childTnLst>
+                        <p:par>
+                          <p:cTn id="38" fill="hold">
+                            <p:stCondLst>
+                              <p:cond delay="0"/>
+                            </p:stCondLst>
+                            <p:childTnLst>
+                              <p:par>
+                                <p:cTn id="39" presetID="10" presetClass="entr" presetSubtype="0" fill="hold" grpId="0" nodeType="clickEffect">
+                                  <p:stCondLst>
+                                    <p:cond delay="0"/>
+                                  </p:stCondLst>
+                                  <p:childTnLst>
+                                    <p:set>
+                                      <p:cBhvr>
+                                        <p:cTn id="40" dur="1" fill="hold">
+                                          <p:stCondLst>
+                                            <p:cond delay="0"/>
+                                          </p:stCondLst>
+                                        </p:cTn>
+                                        <p:tgtEl>
+                                          <p:spTgt spid="15"/>
+                                        </p:tgtEl>
+                                        <p:attrNameLst>
+                                          <p:attrName>style.visibility</p:attrName>
+                                        </p:attrNameLst>
+                                      </p:cBhvr>
+                                      <p:to>
+                                        <p:strVal val="visible"/>
+                                      </p:to>
+                                    </p:set>
+                                    <p:animEffect transition="in" filter="fade">
+                                      <p:cBhvr>
+                                        <p:cTn id="41" dur="500"/>
+                                        <p:tgtEl>
+                                          <p:spTgt spid="15"/>
+                                        </p:tgtEl>
+                                      </p:cBhvr>
+                                    </p:animEffect>
+                                  </p:childTnLst>
+                                </p:cTn>
+                              </p:par>
+                            </p:childTnLst>
+                          </p:cTn>
+                        </p:par>
+                      </p:childTnLst>
+                    </p:cTn>
+                  </p:par>
+                  <p:par>
+                    <p:cTn id="42" fill="hold">
+                      <p:stCondLst>
+                        <p:cond delay="indefinite"/>
+                      </p:stCondLst>
+                      <p:childTnLst>
+                        <p:par>
+                          <p:cTn id="43" fill="hold">
+                            <p:stCondLst>
+                              <p:cond delay="0"/>
+                            </p:stCondLst>
+                            <p:childTnLst>
+                              <p:par>
+                                <p:cTn id="44" presetID="10" presetClass="entr" presetSubtype="0" fill="hold" grpId="0" nodeType="clickEffect">
+                                  <p:stCondLst>
+                                    <p:cond delay="0"/>
+                                  </p:stCondLst>
+                                  <p:childTnLst>
+                                    <p:set>
+                                      <p:cBhvr>
+                                        <p:cTn id="45" dur="1" fill="hold">
+                                          <p:stCondLst>
+                                            <p:cond delay="0"/>
+                                          </p:stCondLst>
+                                        </p:cTn>
+                                        <p:tgtEl>
+                                          <p:spTgt spid="24"/>
+                                        </p:tgtEl>
+                                        <p:attrNameLst>
+                                          <p:attrName>style.visibility</p:attrName>
+                                        </p:attrNameLst>
+                                      </p:cBhvr>
+                                      <p:to>
+                                        <p:strVal val="visible"/>
+                                      </p:to>
+                                    </p:set>
+                                    <p:animEffect transition="in" filter="fade">
+                                      <p:cBhvr>
+                                        <p:cTn id="46" dur="500"/>
+                                        <p:tgtEl>
+                                          <p:spTgt spid="24"/>
+                                        </p:tgtEl>
+                                      </p:cBhvr>
+                                    </p:animEffect>
+                                  </p:childTnLst>
+                                </p:cTn>
+                              </p:par>
+                            </p:childTnLst>
+                          </p:cTn>
+                        </p:par>
+                      </p:childTnLst>
+                    </p:cTn>
+                  </p:par>
+                  <p:par>
+                    <p:cTn id="47" fill="hold">
+                      <p:stCondLst>
+                        <p:cond delay="indefinite"/>
+                      </p:stCondLst>
+                      <p:childTnLst>
+                        <p:par>
+                          <p:cTn id="48" fill="hold">
+                            <p:stCondLst>
+                              <p:cond delay="0"/>
+                            </p:stCondLst>
+                            <p:childTnLst>
+                              <p:par>
+                                <p:cTn id="49" presetID="10" presetClass="entr" presetSubtype="0" fill="hold" grpId="0" nodeType="clickEffect">
+                                  <p:stCondLst>
+                                    <p:cond delay="0"/>
+                                  </p:stCondLst>
+                                  <p:childTnLst>
+                                    <p:set>
+                                      <p:cBhvr>
+                                        <p:cTn id="50" dur="1" fill="hold">
+                                          <p:stCondLst>
+                                            <p:cond delay="0"/>
+                                          </p:stCondLst>
+                                        </p:cTn>
+                                        <p:tgtEl>
+                                          <p:spTgt spid="17"/>
+                                        </p:tgtEl>
+                                        <p:attrNameLst>
+                                          <p:attrName>style.visibility</p:attrName>
+                                        </p:attrNameLst>
+                                      </p:cBhvr>
+                                      <p:to>
+                                        <p:strVal val="visible"/>
+                                      </p:to>
+                                    </p:set>
+                                    <p:animEffect transition="in" filter="fade">
+                                      <p:cBhvr>
+                                        <p:cTn id="51" dur="500"/>
+                                        <p:tgtEl>
+                                          <p:spTgt spid="17"/>
+                                        </p:tgtEl>
+                                      </p:cBhvr>
+                                    </p:animEffect>
+                                  </p:childTnLst>
+                                </p:cTn>
+                              </p:par>
+                            </p:childTnLst>
+                          </p:cTn>
+                        </p:par>
+                      </p:childTnLst>
+                    </p:cTn>
+                  </p:par>
+                  <p:par>
+                    <p:cTn id="52" fill="hold">
+                      <p:stCondLst>
+                        <p:cond delay="indefinite"/>
+                      </p:stCondLst>
+                      <p:childTnLst>
+                        <p:par>
+                          <p:cTn id="53" fill="hold">
+                            <p:stCondLst>
+                              <p:cond delay="0"/>
+                            </p:stCondLst>
+                            <p:childTnLst>
+                              <p:par>
+                                <p:cTn id="54" presetID="10" presetClass="entr" presetSubtype="0" fill="hold" grpId="0" nodeType="clickEffect">
+                                  <p:stCondLst>
+                                    <p:cond delay="0"/>
+                                  </p:stCondLst>
+                                  <p:childTnLst>
+                                    <p:set>
+                                      <p:cBhvr>
+                                        <p:cTn id="55" dur="1" fill="hold">
+                                          <p:stCondLst>
+                                            <p:cond delay="0"/>
+                                          </p:stCondLst>
+                                        </p:cTn>
+                                        <p:tgtEl>
+                                          <p:spTgt spid="23"/>
+                                        </p:tgtEl>
+                                        <p:attrNameLst>
+                                          <p:attrName>style.visibility</p:attrName>
+                                        </p:attrNameLst>
+                                      </p:cBhvr>
+                                      <p:to>
+                                        <p:strVal val="visible"/>
+                                      </p:to>
+                                    </p:set>
+                                    <p:animEffect transition="in" filter="fade">
+                                      <p:cBhvr>
+                                        <p:cTn id="56" dur="500"/>
+                                        <p:tgtEl>
+                                          <p:spTgt spid="23"/>
+                                        </p:tgtEl>
+                                      </p:cBhvr>
+                                    </p:animEffect>
+                                  </p:childTnLst>
+                                </p:cTn>
+                              </p:par>
+                            </p:childTnLst>
+                          </p:cTn>
+                        </p:par>
+                      </p:childTnLst>
+                    </p:cTn>
+                  </p:par>
+                  <p:par>
+                    <p:cTn id="57" fill="hold">
+                      <p:stCondLst>
+                        <p:cond delay="indefinite"/>
+                      </p:stCondLst>
+                      <p:childTnLst>
+                        <p:par>
+                          <p:cTn id="58" fill="hold">
+                            <p:stCondLst>
+                              <p:cond delay="0"/>
+                            </p:stCondLst>
+                            <p:childTnLst>
+                              <p:par>
+                                <p:cTn id="59" presetID="10" presetClass="entr" presetSubtype="0" fill="hold" grpId="0" nodeType="clickEffect">
+                                  <p:stCondLst>
+                                    <p:cond delay="0"/>
+                                  </p:stCondLst>
+                                  <p:childTnLst>
+                                    <p:set>
+                                      <p:cBhvr>
+                                        <p:cTn id="60" dur="1" fill="hold">
+                                          <p:stCondLst>
+                                            <p:cond delay="0"/>
+                                          </p:stCondLst>
+                                        </p:cTn>
+                                        <p:tgtEl>
+                                          <p:spTgt spid="14"/>
+                                        </p:tgtEl>
+                                        <p:attrNameLst>
+                                          <p:attrName>style.visibility</p:attrName>
+                                        </p:attrNameLst>
+                                      </p:cBhvr>
+                                      <p:to>
+                                        <p:strVal val="visible"/>
+                                      </p:to>
+                                    </p:set>
+                                    <p:animEffect transition="in" filter="fade">
+                                      <p:cBhvr>
+                                        <p:cTn id="61" dur="500"/>
+                                        <p:tgtEl>
+                                          <p:spTgt spid="14"/>
+                                        </p:tgtEl>
+                                      </p:cBhvr>
+                                    </p:animEffect>
+                                  </p:childTnLst>
+                                </p:cTn>
+                              </p:par>
+                            </p:childTnLst>
+                          </p:cTn>
+                        </p:par>
+                      </p:childTnLst>
+                    </p:cTn>
+                  </p:par>
+                </p:childTnLst>
+              </p:cTn>
+              <p:prevCondLst>
+                <p:cond evt="onPrev" delay="0">
+                  <p:tgtEl>
+                    <p:sldTgt/>
+                  </p:tgtEl>
+                </p:cond>
+              </p:prevCondLst>
+              <p:nextCondLst>
+                <p:cond evt="onNext" delay="0">
+                  <p:tgtEl>
+                    <p:sldTgt/>
+                  </p:tgtEl>
+                </p:cond>
+              </p:nextCondLst>
+            </p:seq>
+          </p:childTnLst>
+        </p:cTn>
+      </p:par>
+    </p:tnLst>
+    <p:bldLst>
+      <p:bldP spid="5" grpId="0" animBg="1"/>
+      <p:bldP spid="13" grpId="0" animBg="1"/>
+      <p:bldP spid="14" grpId="0" animBg="1"/>
+      <p:bldP spid="15" grpId="0" animBg="1"/>
+      <p:bldP spid="16" grpId="0" animBg="1"/>
+      <p:bldP spid="17" grpId="0" animBg="1"/>
+      <p:bldP spid="21" grpId="0" animBg="1"/>
+      <p:bldP spid="22" grpId="0" animBg="1"/>
+      <p:bldP spid="23" grpId="0" animBg="1"/>
+      <p:bldP spid="24" grpId="0" animBg="1"/>
+      <p:bldP spid="25" grpId="0" animBg="1"/>
+      <p:bldP spid="3" grpId="0"/>
+    </p:bldLst>
+  </p:timing>
 </p:sld>
 </file>
 
 <file path=ppt/theme/theme1.xml><?xml version="1.0" encoding="utf-8"?>
 <a:theme xmlns:a="http://schemas.openxmlformats.org/drawingml/2006/main" name="Circuit">
   <a:themeElements>
-    <a:clrScheme name="Slipstream">
+    <a:clrScheme name="Custom 2">
       <a:dk1>
         <a:sysClr val="windowText" lastClr="000000"/>
       </a:dk1>
@@ -15163,10 +17265,10 @@
         <a:srgbClr val="F14124"/>
       </a:accent6>
       <a:hlink>
-        <a:srgbClr val="56C7AA"/>
+        <a:srgbClr val="FF0000"/>
       </a:hlink>
       <a:folHlink>
-        <a:srgbClr val="59A8D1"/>
+        <a:srgbClr val="000000"/>
       </a:folHlink>
     </a:clrScheme>
     <a:fontScheme name="Tw Cen MT-Rockwell">

</xml_diff>

<commit_message>
removed the slide that block diagram contents in list form
</commit_message>
<xml_diff>
--- a/automated_soldering_machine.pptx
+++ b/automated_soldering_machine.pptx
@@ -5,15 +5,14 @@
     <p:sldMasterId id="2147483678" r:id="rId1"/>
   </p:sldMasterIdLst>
   <p:notesMasterIdLst>
-    <p:notesMasterId r:id="rId8"/>
+    <p:notesMasterId r:id="rId7"/>
   </p:notesMasterIdLst>
   <p:sldIdLst>
     <p:sldId id="256" r:id="rId2"/>
     <p:sldId id="257" r:id="rId3"/>
     <p:sldId id="258" r:id="rId4"/>
     <p:sldId id="259" r:id="rId5"/>
-    <p:sldId id="260" r:id="rId6"/>
-    <p:sldId id="261" r:id="rId7"/>
+    <p:sldId id="261" r:id="rId6"/>
   </p:sldIdLst>
   <p:sldSz cx="12192000" cy="6858000"/>
   <p:notesSz cx="6858000" cy="9144000"/>
@@ -202,7 +201,7 @@
           <a:p>
             <a:fld id="{6B1ABE9E-7FB6-47FC-BE31-5609706269A3}" type="datetimeFigureOut">
               <a:rPr lang="en-US" smtClean="0"/>
-              <a:t>1/3/2021</a:t>
+              <a:t>1/4/2021</a:t>
             </a:fld>
             <a:endParaRPr lang="en-US"/>
           </a:p>
@@ -519,7 +518,7 @@
           <a:noFill/>
           <a:extLst>
             <a:ext uri="{909E8E84-426E-40dd-AFC4-6F175D3DCCD1}">
-              <a14:hiddenFill xmlns:a14="http://schemas.microsoft.com/office/drawing/2010/main" xmlns="">
+              <a14:hiddenFill xmlns="" xmlns:a14="http://schemas.microsoft.com/office/drawing/2010/main">
                 <a:solidFill>
                   <a:srgbClr val="FFFFFF"/>
                 </a:solidFill>
@@ -579,7 +578,7 @@
             </a:ln>
             <a:extLst>
               <a:ext uri="{91240B29-F687-4f45-9708-019B960494DF}">
-                <a14:hiddenLine xmlns:a14="http://schemas.microsoft.com/office/drawing/2010/main" xmlns="" w="9525">
+                <a14:hiddenLine xmlns="" xmlns:a14="http://schemas.microsoft.com/office/drawing/2010/main" w="9525">
                   <a:solidFill>
                     <a:srgbClr val="000000"/>
                   </a:solidFill>
@@ -669,7 +668,7 @@
             </a:ln>
             <a:extLst>
               <a:ext uri="{91240B29-F687-4f45-9708-019B960494DF}">
-                <a14:hiddenLine xmlns:a14="http://schemas.microsoft.com/office/drawing/2010/main" xmlns="" w="9525">
+                <a14:hiddenLine xmlns="" xmlns:a14="http://schemas.microsoft.com/office/drawing/2010/main" w="9525">
                   <a:solidFill>
                     <a:srgbClr val="000000"/>
                   </a:solidFill>
@@ -759,7 +758,7 @@
             </a:ln>
             <a:extLst>
               <a:ext uri="{91240B29-F687-4f45-9708-019B960494DF}">
-                <a14:hiddenLine xmlns:a14="http://schemas.microsoft.com/office/drawing/2010/main" xmlns="" w="9525">
+                <a14:hiddenLine xmlns="" xmlns:a14="http://schemas.microsoft.com/office/drawing/2010/main" w="9525">
                   <a:solidFill>
                     <a:srgbClr val="000000"/>
                   </a:solidFill>
@@ -793,7 +792,7 @@
             </a:ln>
             <a:extLst>
               <a:ext uri="{91240B29-F687-4f45-9708-019B960494DF}">
-                <a14:hiddenLine xmlns:a14="http://schemas.microsoft.com/office/drawing/2010/main" xmlns="" w="9525">
+                <a14:hiddenLine xmlns="" xmlns:a14="http://schemas.microsoft.com/office/drawing/2010/main" w="9525">
                   <a:solidFill>
                     <a:srgbClr val="000000"/>
                   </a:solidFill>
@@ -883,7 +882,7 @@
             </a:ln>
             <a:extLst>
               <a:ext uri="{91240B29-F687-4f45-9708-019B960494DF}">
-                <a14:hiddenLine xmlns:a14="http://schemas.microsoft.com/office/drawing/2010/main" xmlns="" w="9525">
+                <a14:hiddenLine xmlns="" xmlns:a14="http://schemas.microsoft.com/office/drawing/2010/main" w="9525">
                   <a:solidFill>
                     <a:srgbClr val="000000"/>
                   </a:solidFill>
@@ -945,7 +944,7 @@
             </a:ln>
             <a:extLst>
               <a:ext uri="{91240B29-F687-4f45-9708-019B960494DF}">
-                <a14:hiddenLine xmlns:a14="http://schemas.microsoft.com/office/drawing/2010/main" xmlns="" w="9525">
+                <a14:hiddenLine xmlns="" xmlns:a14="http://schemas.microsoft.com/office/drawing/2010/main" w="9525">
                   <a:solidFill>
                     <a:srgbClr val="000000"/>
                   </a:solidFill>
@@ -1007,7 +1006,7 @@
             </a:ln>
             <a:extLst>
               <a:ext uri="{91240B29-F687-4f45-9708-019B960494DF}">
-                <a14:hiddenLine xmlns:a14="http://schemas.microsoft.com/office/drawing/2010/main" xmlns="" w="9525">
+                <a14:hiddenLine xmlns="" xmlns:a14="http://schemas.microsoft.com/office/drawing/2010/main" w="9525">
                   <a:solidFill>
                     <a:srgbClr val="000000"/>
                   </a:solidFill>
@@ -1097,7 +1096,7 @@
             </a:ln>
             <a:extLst>
               <a:ext uri="{91240B29-F687-4f45-9708-019B960494DF}">
-                <a14:hiddenLine xmlns:a14="http://schemas.microsoft.com/office/drawing/2010/main" xmlns="" w="9525">
+                <a14:hiddenLine xmlns="" xmlns:a14="http://schemas.microsoft.com/office/drawing/2010/main" w="9525">
                   <a:solidFill>
                     <a:srgbClr val="000000"/>
                   </a:solidFill>
@@ -1159,7 +1158,7 @@
             </a:ln>
             <a:extLst>
               <a:ext uri="{91240B29-F687-4f45-9708-019B960494DF}">
-                <a14:hiddenLine xmlns:a14="http://schemas.microsoft.com/office/drawing/2010/main" xmlns="" w="9525">
+                <a14:hiddenLine xmlns="" xmlns:a14="http://schemas.microsoft.com/office/drawing/2010/main" w="9525">
                   <a:solidFill>
                     <a:srgbClr val="000000"/>
                   </a:solidFill>
@@ -1221,7 +1220,7 @@
             </a:ln>
             <a:extLst>
               <a:ext uri="{91240B29-F687-4f45-9708-019B960494DF}">
-                <a14:hiddenLine xmlns:a14="http://schemas.microsoft.com/office/drawing/2010/main" xmlns="" w="9525">
+                <a14:hiddenLine xmlns="" xmlns:a14="http://schemas.microsoft.com/office/drawing/2010/main" w="9525">
                   <a:solidFill>
                     <a:srgbClr val="000000"/>
                   </a:solidFill>
@@ -1311,7 +1310,7 @@
             </a:ln>
             <a:extLst>
               <a:ext uri="{91240B29-F687-4f45-9708-019B960494DF}">
-                <a14:hiddenLine xmlns:a14="http://schemas.microsoft.com/office/drawing/2010/main" xmlns="" w="9525">
+                <a14:hiddenLine xmlns="" xmlns:a14="http://schemas.microsoft.com/office/drawing/2010/main" w="9525">
                   <a:solidFill>
                     <a:srgbClr val="000000"/>
                   </a:solidFill>
@@ -1401,7 +1400,7 @@
             </a:ln>
             <a:extLst>
               <a:ext uri="{91240B29-F687-4f45-9708-019B960494DF}">
-                <a14:hiddenLine xmlns:a14="http://schemas.microsoft.com/office/drawing/2010/main" xmlns="" w="9525">
+                <a14:hiddenLine xmlns="" xmlns:a14="http://schemas.microsoft.com/office/drawing/2010/main" w="9525">
                   <a:solidFill>
                     <a:srgbClr val="000000"/>
                   </a:solidFill>
@@ -1463,7 +1462,7 @@
             </a:ln>
             <a:extLst>
               <a:ext uri="{91240B29-F687-4f45-9708-019B960494DF}">
-                <a14:hiddenLine xmlns:a14="http://schemas.microsoft.com/office/drawing/2010/main" xmlns="" w="9525">
+                <a14:hiddenLine xmlns="" xmlns:a14="http://schemas.microsoft.com/office/drawing/2010/main" w="9525">
                   <a:solidFill>
                     <a:srgbClr val="000000"/>
                   </a:solidFill>
@@ -1573,7 +1572,7 @@
             </a:ln>
             <a:extLst>
               <a:ext uri="{91240B29-F687-4f45-9708-019B960494DF}">
-                <a14:hiddenLine xmlns:a14="http://schemas.microsoft.com/office/drawing/2010/main" xmlns="" w="9525">
+                <a14:hiddenLine xmlns="" xmlns:a14="http://schemas.microsoft.com/office/drawing/2010/main" w="9525">
                   <a:solidFill>
                     <a:srgbClr val="000000"/>
                   </a:solidFill>
@@ -1635,7 +1634,7 @@
             </a:ln>
             <a:extLst>
               <a:ext uri="{91240B29-F687-4f45-9708-019B960494DF}">
-                <a14:hiddenLine xmlns:a14="http://schemas.microsoft.com/office/drawing/2010/main" xmlns="" w="9525">
+                <a14:hiddenLine xmlns="" xmlns:a14="http://schemas.microsoft.com/office/drawing/2010/main" w="9525">
                   <a:solidFill>
                     <a:srgbClr val="000000"/>
                   </a:solidFill>
@@ -1725,7 +1724,7 @@
             </a:ln>
             <a:extLst>
               <a:ext uri="{91240B29-F687-4f45-9708-019B960494DF}">
-                <a14:hiddenLine xmlns:a14="http://schemas.microsoft.com/office/drawing/2010/main" xmlns="" w="9525">
+                <a14:hiddenLine xmlns="" xmlns:a14="http://schemas.microsoft.com/office/drawing/2010/main" w="9525">
                   <a:solidFill>
                     <a:srgbClr val="000000"/>
                   </a:solidFill>
@@ -1815,7 +1814,7 @@
             </a:ln>
             <a:extLst>
               <a:ext uri="{91240B29-F687-4f45-9708-019B960494DF}">
-                <a14:hiddenLine xmlns:a14="http://schemas.microsoft.com/office/drawing/2010/main" xmlns="" w="9525">
+                <a14:hiddenLine xmlns="" xmlns:a14="http://schemas.microsoft.com/office/drawing/2010/main" w="9525">
                   <a:solidFill>
                     <a:srgbClr val="000000"/>
                   </a:solidFill>
@@ -1877,7 +1876,7 @@
             </a:ln>
             <a:extLst>
               <a:ext uri="{91240B29-F687-4f45-9708-019B960494DF}">
-                <a14:hiddenLine xmlns:a14="http://schemas.microsoft.com/office/drawing/2010/main" xmlns="" w="9525">
+                <a14:hiddenLine xmlns="" xmlns:a14="http://schemas.microsoft.com/office/drawing/2010/main" w="9525">
                   <a:solidFill>
                     <a:srgbClr val="000000"/>
                   </a:solidFill>
@@ -1967,7 +1966,7 @@
             </a:ln>
             <a:extLst>
               <a:ext uri="{91240B29-F687-4f45-9708-019B960494DF}">
-                <a14:hiddenLine xmlns:a14="http://schemas.microsoft.com/office/drawing/2010/main" xmlns="" w="9525">
+                <a14:hiddenLine xmlns="" xmlns:a14="http://schemas.microsoft.com/office/drawing/2010/main" w="9525">
                   <a:solidFill>
                     <a:srgbClr val="000000"/>
                   </a:solidFill>
@@ -2057,7 +2056,7 @@
             </a:ln>
             <a:extLst>
               <a:ext uri="{91240B29-F687-4f45-9708-019B960494DF}">
-                <a14:hiddenLine xmlns:a14="http://schemas.microsoft.com/office/drawing/2010/main" xmlns="" w="9525">
+                <a14:hiddenLine xmlns="" xmlns:a14="http://schemas.microsoft.com/office/drawing/2010/main" w="9525">
                   <a:solidFill>
                     <a:srgbClr val="000000"/>
                   </a:solidFill>
@@ -2113,7 +2112,7 @@
             </a:ln>
             <a:extLst>
               <a:ext uri="{91240B29-F687-4f45-9708-019B960494DF}">
-                <a14:hiddenLine xmlns:a14="http://schemas.microsoft.com/office/drawing/2010/main" xmlns="" w="9525">
+                <a14:hiddenLine xmlns="" xmlns:a14="http://schemas.microsoft.com/office/drawing/2010/main" w="9525">
                   <a:solidFill>
                     <a:srgbClr val="000000"/>
                   </a:solidFill>
@@ -2203,7 +2202,7 @@
             </a:ln>
             <a:extLst>
               <a:ext uri="{91240B29-F687-4f45-9708-019B960494DF}">
-                <a14:hiddenLine xmlns:a14="http://schemas.microsoft.com/office/drawing/2010/main" xmlns="" w="9525">
+                <a14:hiddenLine xmlns="" xmlns:a14="http://schemas.microsoft.com/office/drawing/2010/main" w="9525">
                   <a:solidFill>
                     <a:srgbClr val="000000"/>
                   </a:solidFill>
@@ -2259,7 +2258,7 @@
             </a:ln>
             <a:extLst>
               <a:ext uri="{91240B29-F687-4f45-9708-019B960494DF}">
-                <a14:hiddenLine xmlns:a14="http://schemas.microsoft.com/office/drawing/2010/main" xmlns="" w="9525">
+                <a14:hiddenLine xmlns="" xmlns:a14="http://schemas.microsoft.com/office/drawing/2010/main" w="9525">
                   <a:solidFill>
                     <a:srgbClr val="000000"/>
                   </a:solidFill>
@@ -2349,7 +2348,7 @@
             </a:ln>
             <a:extLst>
               <a:ext uri="{91240B29-F687-4f45-9708-019B960494DF}">
-                <a14:hiddenLine xmlns:a14="http://schemas.microsoft.com/office/drawing/2010/main" xmlns="" w="9525">
+                <a14:hiddenLine xmlns="" xmlns:a14="http://schemas.microsoft.com/office/drawing/2010/main" w="9525">
                   <a:solidFill>
                     <a:srgbClr val="000000"/>
                   </a:solidFill>
@@ -2417,7 +2416,7 @@
             </a:ln>
             <a:extLst>
               <a:ext uri="{91240B29-F687-4f45-9708-019B960494DF}">
-                <a14:hiddenLine xmlns:a14="http://schemas.microsoft.com/office/drawing/2010/main" xmlns="" w="9525">
+                <a14:hiddenLine xmlns="" xmlns:a14="http://schemas.microsoft.com/office/drawing/2010/main" w="9525">
                   <a:solidFill>
                     <a:srgbClr val="000000"/>
                   </a:solidFill>
@@ -2507,7 +2506,7 @@
             </a:ln>
             <a:extLst>
               <a:ext uri="{91240B29-F687-4f45-9708-019B960494DF}">
-                <a14:hiddenLine xmlns:a14="http://schemas.microsoft.com/office/drawing/2010/main" xmlns="" w="9525">
+                <a14:hiddenLine xmlns="" xmlns:a14="http://schemas.microsoft.com/office/drawing/2010/main" w="9525">
                   <a:solidFill>
                     <a:srgbClr val="000000"/>
                   </a:solidFill>
@@ -2575,7 +2574,7 @@
             </a:ln>
             <a:extLst>
               <a:ext uri="{91240B29-F687-4f45-9708-019B960494DF}">
-                <a14:hiddenLine xmlns:a14="http://schemas.microsoft.com/office/drawing/2010/main" xmlns="" w="9525">
+                <a14:hiddenLine xmlns="" xmlns:a14="http://schemas.microsoft.com/office/drawing/2010/main" w="9525">
                   <a:solidFill>
                     <a:srgbClr val="000000"/>
                   </a:solidFill>
@@ -2665,7 +2664,7 @@
             </a:ln>
             <a:extLst>
               <a:ext uri="{91240B29-F687-4f45-9708-019B960494DF}">
-                <a14:hiddenLine xmlns:a14="http://schemas.microsoft.com/office/drawing/2010/main" xmlns="" w="9525">
+                <a14:hiddenLine xmlns="" xmlns:a14="http://schemas.microsoft.com/office/drawing/2010/main" w="9525">
                   <a:solidFill>
                     <a:srgbClr val="000000"/>
                   </a:solidFill>
@@ -2699,7 +2698,7 @@
             </a:ln>
             <a:extLst>
               <a:ext uri="{91240B29-F687-4f45-9708-019B960494DF}">
-                <a14:hiddenLine xmlns:a14="http://schemas.microsoft.com/office/drawing/2010/main" xmlns="" w="9525">
+                <a14:hiddenLine xmlns="" xmlns:a14="http://schemas.microsoft.com/office/drawing/2010/main" w="9525">
                   <a:solidFill>
                     <a:srgbClr val="000000"/>
                   </a:solidFill>
@@ -2789,7 +2788,7 @@
             </a:ln>
             <a:extLst>
               <a:ext uri="{91240B29-F687-4f45-9708-019B960494DF}">
-                <a14:hiddenLine xmlns:a14="http://schemas.microsoft.com/office/drawing/2010/main" xmlns="" w="9525">
+                <a14:hiddenLine xmlns="" xmlns:a14="http://schemas.microsoft.com/office/drawing/2010/main" w="9525">
                   <a:solidFill>
                     <a:srgbClr val="000000"/>
                   </a:solidFill>
@@ -2851,7 +2850,7 @@
             </a:ln>
             <a:extLst>
               <a:ext uri="{91240B29-F687-4f45-9708-019B960494DF}">
-                <a14:hiddenLine xmlns:a14="http://schemas.microsoft.com/office/drawing/2010/main" xmlns="" w="9525">
+                <a14:hiddenLine xmlns="" xmlns:a14="http://schemas.microsoft.com/office/drawing/2010/main" w="9525">
                   <a:solidFill>
                     <a:srgbClr val="000000"/>
                   </a:solidFill>
@@ -2913,7 +2912,7 @@
             </a:ln>
             <a:extLst>
               <a:ext uri="{91240B29-F687-4f45-9708-019B960494DF}">
-                <a14:hiddenLine xmlns:a14="http://schemas.microsoft.com/office/drawing/2010/main" xmlns="" w="9525">
+                <a14:hiddenLine xmlns="" xmlns:a14="http://schemas.microsoft.com/office/drawing/2010/main" w="9525">
                   <a:solidFill>
                     <a:srgbClr val="000000"/>
                   </a:solidFill>
@@ -3003,7 +3002,7 @@
             </a:ln>
             <a:extLst>
               <a:ext uri="{91240B29-F687-4f45-9708-019B960494DF}">
-                <a14:hiddenLine xmlns:a14="http://schemas.microsoft.com/office/drawing/2010/main" xmlns="" w="9525">
+                <a14:hiddenLine xmlns="" xmlns:a14="http://schemas.microsoft.com/office/drawing/2010/main" w="9525">
                   <a:solidFill>
                     <a:srgbClr val="000000"/>
                   </a:solidFill>
@@ -3071,7 +3070,7 @@
             </a:ln>
             <a:extLst>
               <a:ext uri="{91240B29-F687-4f45-9708-019B960494DF}">
-                <a14:hiddenLine xmlns:a14="http://schemas.microsoft.com/office/drawing/2010/main" xmlns="" w="9525">
+                <a14:hiddenLine xmlns="" xmlns:a14="http://schemas.microsoft.com/office/drawing/2010/main" w="9525">
                   <a:solidFill>
                     <a:srgbClr val="000000"/>
                   </a:solidFill>
@@ -3133,7 +3132,7 @@
             </a:ln>
             <a:extLst>
               <a:ext uri="{91240B29-F687-4f45-9708-019B960494DF}">
-                <a14:hiddenLine xmlns:a14="http://schemas.microsoft.com/office/drawing/2010/main" xmlns="" w="9525">
+                <a14:hiddenLine xmlns="" xmlns:a14="http://schemas.microsoft.com/office/drawing/2010/main" w="9525">
                   <a:solidFill>
                     <a:srgbClr val="000000"/>
                   </a:solidFill>
@@ -3223,7 +3222,7 @@
             </a:ln>
             <a:extLst>
               <a:ext uri="{91240B29-F687-4f45-9708-019B960494DF}">
-                <a14:hiddenLine xmlns:a14="http://schemas.microsoft.com/office/drawing/2010/main" xmlns="" w="9525">
+                <a14:hiddenLine xmlns="" xmlns:a14="http://schemas.microsoft.com/office/drawing/2010/main" w="9525">
                   <a:solidFill>
                     <a:srgbClr val="000000"/>
                   </a:solidFill>
@@ -3285,7 +3284,7 @@
             </a:ln>
             <a:extLst>
               <a:ext uri="{91240B29-F687-4f45-9708-019B960494DF}">
-                <a14:hiddenLine xmlns:a14="http://schemas.microsoft.com/office/drawing/2010/main" xmlns="" w="9525">
+                <a14:hiddenLine xmlns="" xmlns:a14="http://schemas.microsoft.com/office/drawing/2010/main" w="9525">
                   <a:solidFill>
                     <a:srgbClr val="000000"/>
                   </a:solidFill>
@@ -3375,7 +3374,7 @@
             </a:ln>
             <a:extLst>
               <a:ext uri="{91240B29-F687-4f45-9708-019B960494DF}">
-                <a14:hiddenLine xmlns:a14="http://schemas.microsoft.com/office/drawing/2010/main" xmlns="" w="9525">
+                <a14:hiddenLine xmlns="" xmlns:a14="http://schemas.microsoft.com/office/drawing/2010/main" w="9525">
                   <a:solidFill>
                     <a:srgbClr val="000000"/>
                   </a:solidFill>
@@ -3437,7 +3436,7 @@
             </a:ln>
             <a:extLst>
               <a:ext uri="{91240B29-F687-4f45-9708-019B960494DF}">
-                <a14:hiddenLine xmlns:a14="http://schemas.microsoft.com/office/drawing/2010/main" xmlns="" w="9525">
+                <a14:hiddenLine xmlns="" xmlns:a14="http://schemas.microsoft.com/office/drawing/2010/main" w="9525">
                   <a:solidFill>
                     <a:srgbClr val="000000"/>
                   </a:solidFill>
@@ -3527,7 +3526,7 @@
             </a:ln>
             <a:extLst>
               <a:ext uri="{91240B29-F687-4f45-9708-019B960494DF}">
-                <a14:hiddenLine xmlns:a14="http://schemas.microsoft.com/office/drawing/2010/main" xmlns="" w="9525">
+                <a14:hiddenLine xmlns="" xmlns:a14="http://schemas.microsoft.com/office/drawing/2010/main" w="9525">
                   <a:solidFill>
                     <a:srgbClr val="000000"/>
                   </a:solidFill>
@@ -3561,7 +3560,7 @@
             </a:ln>
             <a:extLst>
               <a:ext uri="{91240B29-F687-4f45-9708-019B960494DF}">
-                <a14:hiddenLine xmlns:a14="http://schemas.microsoft.com/office/drawing/2010/main" xmlns="" w="9525">
+                <a14:hiddenLine xmlns="" xmlns:a14="http://schemas.microsoft.com/office/drawing/2010/main" w="9525">
                   <a:solidFill>
                     <a:srgbClr val="000000"/>
                   </a:solidFill>
@@ -3626,7 +3625,7 @@
             </a:ln>
             <a:extLst>
               <a:ext uri="{91240B29-F687-4f45-9708-019B960494DF}">
-                <a14:hiddenLine xmlns:a14="http://schemas.microsoft.com/office/drawing/2010/main" xmlns="" w="9525">
+                <a14:hiddenLine xmlns="" xmlns:a14="http://schemas.microsoft.com/office/drawing/2010/main" w="9525">
                   <a:solidFill>
                     <a:srgbClr val="000000"/>
                   </a:solidFill>
@@ -3716,7 +3715,7 @@
             </a:ln>
             <a:extLst>
               <a:ext uri="{91240B29-F687-4f45-9708-019B960494DF}">
-                <a14:hiddenLine xmlns:a14="http://schemas.microsoft.com/office/drawing/2010/main" xmlns="" w="9525">
+                <a14:hiddenLine xmlns="" xmlns:a14="http://schemas.microsoft.com/office/drawing/2010/main" w="9525">
                   <a:solidFill>
                     <a:srgbClr val="000000"/>
                   </a:solidFill>
@@ -3778,7 +3777,7 @@
             </a:ln>
             <a:extLst>
               <a:ext uri="{91240B29-F687-4f45-9708-019B960494DF}">
-                <a14:hiddenLine xmlns:a14="http://schemas.microsoft.com/office/drawing/2010/main" xmlns="" w="9525">
+                <a14:hiddenLine xmlns="" xmlns:a14="http://schemas.microsoft.com/office/drawing/2010/main" w="9525">
                   <a:solidFill>
                     <a:srgbClr val="000000"/>
                   </a:solidFill>
@@ -3868,7 +3867,7 @@
             </a:ln>
             <a:extLst>
               <a:ext uri="{91240B29-F687-4f45-9708-019B960494DF}">
-                <a14:hiddenLine xmlns:a14="http://schemas.microsoft.com/office/drawing/2010/main" xmlns="" w="9525">
+                <a14:hiddenLine xmlns="" xmlns:a14="http://schemas.microsoft.com/office/drawing/2010/main" w="9525">
                   <a:solidFill>
                     <a:srgbClr val="000000"/>
                   </a:solidFill>
@@ -3958,7 +3957,7 @@
             </a:ln>
             <a:extLst>
               <a:ext uri="{91240B29-F687-4f45-9708-019B960494DF}">
-                <a14:hiddenLine xmlns:a14="http://schemas.microsoft.com/office/drawing/2010/main" xmlns="" w="9525">
+                <a14:hiddenLine xmlns="" xmlns:a14="http://schemas.microsoft.com/office/drawing/2010/main" w="9525">
                   <a:solidFill>
                     <a:srgbClr val="000000"/>
                   </a:solidFill>
@@ -4023,7 +4022,7 @@
             </a:ln>
             <a:extLst>
               <a:ext uri="{91240B29-F687-4f45-9708-019B960494DF}">
-                <a14:hiddenLine xmlns:a14="http://schemas.microsoft.com/office/drawing/2010/main" xmlns="" w="9525">
+                <a14:hiddenLine xmlns="" xmlns:a14="http://schemas.microsoft.com/office/drawing/2010/main" w="9525">
                   <a:solidFill>
                     <a:srgbClr val="000000"/>
                   </a:solidFill>
@@ -4085,7 +4084,7 @@
             </a:ln>
             <a:extLst>
               <a:ext uri="{91240B29-F687-4f45-9708-019B960494DF}">
-                <a14:hiddenLine xmlns:a14="http://schemas.microsoft.com/office/drawing/2010/main" xmlns="" w="9525">
+                <a14:hiddenLine xmlns="" xmlns:a14="http://schemas.microsoft.com/office/drawing/2010/main" w="9525">
                   <a:solidFill>
                     <a:srgbClr val="000000"/>
                   </a:solidFill>
@@ -4175,7 +4174,7 @@
             </a:ln>
             <a:extLst>
               <a:ext uri="{91240B29-F687-4f45-9708-019B960494DF}">
-                <a14:hiddenLine xmlns:a14="http://schemas.microsoft.com/office/drawing/2010/main" xmlns="" w="9525">
+                <a14:hiddenLine xmlns="" xmlns:a14="http://schemas.microsoft.com/office/drawing/2010/main" w="9525">
                   <a:solidFill>
                     <a:srgbClr val="000000"/>
                   </a:solidFill>
@@ -4265,7 +4264,7 @@
             </a:ln>
             <a:extLst>
               <a:ext uri="{91240B29-F687-4f45-9708-019B960494DF}">
-                <a14:hiddenLine xmlns:a14="http://schemas.microsoft.com/office/drawing/2010/main" xmlns="" w="9525">
+                <a14:hiddenLine xmlns="" xmlns:a14="http://schemas.microsoft.com/office/drawing/2010/main" w="9525">
                   <a:solidFill>
                     <a:srgbClr val="000000"/>
                   </a:solidFill>
@@ -4327,7 +4326,7 @@
             </a:ln>
             <a:extLst>
               <a:ext uri="{91240B29-F687-4f45-9708-019B960494DF}">
-                <a14:hiddenLine xmlns:a14="http://schemas.microsoft.com/office/drawing/2010/main" xmlns="" w="9525">
+                <a14:hiddenLine xmlns="" xmlns:a14="http://schemas.microsoft.com/office/drawing/2010/main" w="9525">
                   <a:solidFill>
                     <a:srgbClr val="000000"/>
                   </a:solidFill>
@@ -4447,7 +4446,7 @@
             </a:ln>
             <a:extLst>
               <a:ext uri="{91240B29-F687-4f45-9708-019B960494DF}">
-                <a14:hiddenLine xmlns:a14="http://schemas.microsoft.com/office/drawing/2010/main" xmlns="" w="9525">
+                <a14:hiddenLine xmlns="" xmlns:a14="http://schemas.microsoft.com/office/drawing/2010/main" w="9525">
                   <a:solidFill>
                     <a:srgbClr val="000000"/>
                   </a:solidFill>
@@ -4515,7 +4514,7 @@
             </a:ln>
             <a:extLst>
               <a:ext uri="{91240B29-F687-4f45-9708-019B960494DF}">
-                <a14:hiddenLine xmlns:a14="http://schemas.microsoft.com/office/drawing/2010/main" xmlns="" w="9525">
+                <a14:hiddenLine xmlns="" xmlns:a14="http://schemas.microsoft.com/office/drawing/2010/main" w="9525">
                   <a:solidFill>
                     <a:srgbClr val="000000"/>
                   </a:solidFill>
@@ -4605,7 +4604,7 @@
             </a:ln>
             <a:extLst>
               <a:ext uri="{91240B29-F687-4f45-9708-019B960494DF}">
-                <a14:hiddenLine xmlns:a14="http://schemas.microsoft.com/office/drawing/2010/main" xmlns="" w="9525">
+                <a14:hiddenLine xmlns="" xmlns:a14="http://schemas.microsoft.com/office/drawing/2010/main" w="9525">
                   <a:solidFill>
                     <a:srgbClr val="000000"/>
                   </a:solidFill>
@@ -4745,7 +4744,7 @@
           <a:p>
             <a:fld id="{9453E4B6-66BA-4B33-AFCD-F6084AE9AFDC}" type="datetime1">
               <a:rPr lang="en-US" smtClean="0"/>
-              <a:t>1/3/2021</a:t>
+              <a:t>1/4/2021</a:t>
             </a:fld>
             <a:endParaRPr lang="en-US"/>
           </a:p>
@@ -4813,13 +4812,13 @@
   <p:clrMapOvr>
     <a:masterClrMapping/>
   </p:clrMapOvr>
-  <mc:AlternateContent xmlns:mc="http://schemas.openxmlformats.org/markup-compatibility/2006">
-    <mc:Choice xmlns:p15="http://schemas.microsoft.com/office/powerpoint/2012/main" Requires="p15">
+  <mc:AlternateContent xmlns:mc="http://schemas.openxmlformats.org/markup-compatibility/2006" xmlns:p15="http://schemas.microsoft.com/office/powerpoint/2012/main">
+    <mc:Choice Requires="p15">
       <p:transition xmlns:p14="http://schemas.microsoft.com/office/powerpoint/2010/main" spd="slow" p14:dur="1250">
         <p15:prstTrans prst="peelOff"/>
       </p:transition>
     </mc:Choice>
-    <mc:Fallback>
+    <mc:Fallback xmlns="">
       <p:transition spd="slow">
         <p:fade/>
       </p:transition>
@@ -5024,7 +5023,7 @@
           <a:p>
             <a:fld id="{3B030C01-3367-43BF-937D-3893ADD9B9F8}" type="datetime1">
               <a:rPr lang="en-US" smtClean="0"/>
-              <a:t>1/3/2021</a:t>
+              <a:t>1/4/2021</a:t>
             </a:fld>
             <a:endParaRPr lang="en-US"/>
           </a:p>
@@ -5082,13 +5081,13 @@
   <p:clrMapOvr>
     <a:masterClrMapping/>
   </p:clrMapOvr>
-  <mc:AlternateContent xmlns:mc="http://schemas.openxmlformats.org/markup-compatibility/2006">
-    <mc:Choice xmlns:p15="http://schemas.microsoft.com/office/powerpoint/2012/main" Requires="p15">
+  <mc:AlternateContent xmlns:mc="http://schemas.openxmlformats.org/markup-compatibility/2006" xmlns:p15="http://schemas.microsoft.com/office/powerpoint/2012/main">
+    <mc:Choice Requires="p15">
       <p:transition xmlns:p14="http://schemas.microsoft.com/office/powerpoint/2010/main" spd="slow" p14:dur="1250">
         <p15:prstTrans prst="peelOff"/>
       </p:transition>
     </mc:Choice>
-    <mc:Fallback>
+    <mc:Fallback xmlns="">
       <p:transition spd="slow">
         <p:fade/>
       </p:transition>
@@ -5232,7 +5231,7 @@
           <a:p>
             <a:fld id="{7B0B9D8B-653D-4DAC-8F28-9C1357B30687}" type="datetime1">
               <a:rPr lang="en-US" smtClean="0"/>
-              <a:t>1/3/2021</a:t>
+              <a:t>1/4/2021</a:t>
             </a:fld>
             <a:endParaRPr lang="en-US"/>
           </a:p>
@@ -5290,13 +5289,13 @@
   <p:clrMapOvr>
     <a:masterClrMapping/>
   </p:clrMapOvr>
-  <mc:AlternateContent xmlns:mc="http://schemas.openxmlformats.org/markup-compatibility/2006">
-    <mc:Choice xmlns:p15="http://schemas.microsoft.com/office/powerpoint/2012/main" Requires="p15">
+  <mc:AlternateContent xmlns:mc="http://schemas.openxmlformats.org/markup-compatibility/2006" xmlns:p15="http://schemas.microsoft.com/office/powerpoint/2012/main">
+    <mc:Choice Requires="p15">
       <p:transition xmlns:p14="http://schemas.microsoft.com/office/powerpoint/2010/main" spd="slow" p14:dur="1250">
         <p15:prstTrans prst="peelOff"/>
       </p:transition>
     </mc:Choice>
-    <mc:Fallback>
+    <mc:Fallback xmlns="">
       <p:transition spd="slow">
         <p:fade/>
       </p:transition>
@@ -5507,7 +5506,7 @@
           <a:p>
             <a:fld id="{3E0B0587-B13D-4CE2-ABF3-D82ACC0FE76B}" type="datetime1">
               <a:rPr lang="en-US" smtClean="0"/>
-              <a:t>1/3/2021</a:t>
+              <a:t>1/4/2021</a:t>
             </a:fld>
             <a:endParaRPr lang="en-US"/>
           </a:p>
@@ -5803,13 +5802,13 @@
   <p:clrMapOvr>
     <a:masterClrMapping/>
   </p:clrMapOvr>
-  <mc:AlternateContent xmlns:mc="http://schemas.openxmlformats.org/markup-compatibility/2006">
-    <mc:Choice xmlns:p15="http://schemas.microsoft.com/office/powerpoint/2012/main" Requires="p15">
+  <mc:AlternateContent xmlns:mc="http://schemas.openxmlformats.org/markup-compatibility/2006" xmlns:p15="http://schemas.microsoft.com/office/powerpoint/2012/main">
+    <mc:Choice Requires="p15">
       <p:transition xmlns:p14="http://schemas.microsoft.com/office/powerpoint/2010/main" spd="slow" p14:dur="1250">
         <p15:prstTrans prst="peelOff"/>
       </p:transition>
     </mc:Choice>
-    <mc:Fallback>
+    <mc:Fallback xmlns="">
       <p:transition spd="slow">
         <p:fade/>
       </p:transition>
@@ -5953,7 +5952,7 @@
           <a:p>
             <a:fld id="{71639C8D-F100-4198-BC96-24268D604A86}" type="datetime1">
               <a:rPr lang="en-US" smtClean="0"/>
-              <a:t>1/3/2021</a:t>
+              <a:t>1/4/2021</a:t>
             </a:fld>
             <a:endParaRPr lang="en-US"/>
           </a:p>
@@ -6011,13 +6010,13 @@
   <p:clrMapOvr>
     <a:masterClrMapping/>
   </p:clrMapOvr>
-  <mc:AlternateContent xmlns:mc="http://schemas.openxmlformats.org/markup-compatibility/2006">
-    <mc:Choice xmlns:p15="http://schemas.microsoft.com/office/powerpoint/2012/main" Requires="p15">
+  <mc:AlternateContent xmlns:mc="http://schemas.openxmlformats.org/markup-compatibility/2006" xmlns:p15="http://schemas.microsoft.com/office/powerpoint/2012/main">
+    <mc:Choice Requires="p15">
       <p:transition xmlns:p14="http://schemas.microsoft.com/office/powerpoint/2010/main" spd="slow" p14:dur="1250">
         <p15:prstTrans prst="peelOff"/>
       </p:transition>
     </mc:Choice>
-    <mc:Fallback>
+    <mc:Fallback xmlns="">
       <p:transition spd="slow">
         <p:fade/>
       </p:transition>
@@ -6511,7 +6510,7 @@
           <a:p>
             <a:fld id="{FFAF4433-B36B-42B9-9129-BFBD1397BF4E}" type="datetime1">
               <a:rPr lang="en-US" smtClean="0"/>
-              <a:t>1/3/2021</a:t>
+              <a:t>1/4/2021</a:t>
             </a:fld>
             <a:endParaRPr lang="en-US"/>
           </a:p>
@@ -6569,13 +6568,13 @@
   <p:clrMapOvr>
     <a:masterClrMapping/>
   </p:clrMapOvr>
-  <mc:AlternateContent xmlns:mc="http://schemas.openxmlformats.org/markup-compatibility/2006">
-    <mc:Choice xmlns:p15="http://schemas.microsoft.com/office/powerpoint/2012/main" Requires="p15">
+  <mc:AlternateContent xmlns:mc="http://schemas.openxmlformats.org/markup-compatibility/2006" xmlns:p15="http://schemas.microsoft.com/office/powerpoint/2012/main">
+    <mc:Choice Requires="p15">
       <p:transition xmlns:p14="http://schemas.microsoft.com/office/powerpoint/2010/main" spd="slow" p14:dur="1250">
         <p15:prstTrans prst="peelOff"/>
       </p:transition>
     </mc:Choice>
-    <mc:Fallback>
+    <mc:Fallback xmlns="">
       <p:transition spd="slow">
         <p:fade/>
       </p:transition>
@@ -7243,7 +7242,7 @@
           <a:p>
             <a:fld id="{0456F42E-3AD5-45F5-AA4E-60673CE0A094}" type="datetime1">
               <a:rPr lang="en-US" smtClean="0"/>
-              <a:t>1/3/2021</a:t>
+              <a:t>1/4/2021</a:t>
             </a:fld>
             <a:endParaRPr lang="en-US"/>
           </a:p>
@@ -7301,13 +7300,13 @@
   <p:clrMapOvr>
     <a:masterClrMapping/>
   </p:clrMapOvr>
-  <mc:AlternateContent xmlns:mc="http://schemas.openxmlformats.org/markup-compatibility/2006">
-    <mc:Choice xmlns:p15="http://schemas.microsoft.com/office/powerpoint/2012/main" Requires="p15">
+  <mc:AlternateContent xmlns:mc="http://schemas.openxmlformats.org/markup-compatibility/2006" xmlns:p15="http://schemas.microsoft.com/office/powerpoint/2012/main">
+    <mc:Choice Requires="p15">
       <p:transition xmlns:p14="http://schemas.microsoft.com/office/powerpoint/2010/main" spd="slow" p14:dur="1250">
         <p15:prstTrans prst="peelOff"/>
       </p:transition>
     </mc:Choice>
-    <mc:Fallback>
+    <mc:Fallback xmlns="">
       <p:transition spd="slow">
         <p:fade/>
       </p:transition>
@@ -7425,7 +7424,7 @@
           <a:p>
             <a:fld id="{96682EAD-E4E4-4F29-8F62-A2DBB9B02D15}" type="datetime1">
               <a:rPr lang="en-US" smtClean="0"/>
-              <a:t>1/3/2021</a:t>
+              <a:t>1/4/2021</a:t>
             </a:fld>
             <a:endParaRPr lang="en-US"/>
           </a:p>
@@ -7483,13 +7482,13 @@
   <p:clrMapOvr>
     <a:masterClrMapping/>
   </p:clrMapOvr>
-  <mc:AlternateContent xmlns:mc="http://schemas.openxmlformats.org/markup-compatibility/2006">
-    <mc:Choice xmlns:p15="http://schemas.microsoft.com/office/powerpoint/2012/main" Requires="p15">
+  <mc:AlternateContent xmlns:mc="http://schemas.openxmlformats.org/markup-compatibility/2006" xmlns:p15="http://schemas.microsoft.com/office/powerpoint/2012/main">
+    <mc:Choice Requires="p15">
       <p:transition xmlns:p14="http://schemas.microsoft.com/office/powerpoint/2010/main" spd="slow" p14:dur="1250">
         <p15:prstTrans prst="peelOff"/>
       </p:transition>
     </mc:Choice>
-    <mc:Fallback>
+    <mc:Fallback xmlns="">
       <p:transition spd="slow">
         <p:fade/>
       </p:transition>
@@ -7617,7 +7616,7 @@
           <a:p>
             <a:fld id="{1D971B33-70FD-4CFB-BAAD-1813DAEC74FB}" type="datetime1">
               <a:rPr lang="en-US" smtClean="0"/>
-              <a:t>1/3/2021</a:t>
+              <a:t>1/4/2021</a:t>
             </a:fld>
             <a:endParaRPr lang="en-US"/>
           </a:p>
@@ -7675,13 +7674,13 @@
   <p:clrMapOvr>
     <a:masterClrMapping/>
   </p:clrMapOvr>
-  <mc:AlternateContent xmlns:mc="http://schemas.openxmlformats.org/markup-compatibility/2006">
-    <mc:Choice xmlns:p15="http://schemas.microsoft.com/office/powerpoint/2012/main" Requires="p15">
+  <mc:AlternateContent xmlns:mc="http://schemas.openxmlformats.org/markup-compatibility/2006" xmlns:p15="http://schemas.microsoft.com/office/powerpoint/2012/main">
+    <mc:Choice Requires="p15">
       <p:transition xmlns:p14="http://schemas.microsoft.com/office/powerpoint/2010/main" spd="slow" p14:dur="1250">
         <p15:prstTrans prst="peelOff"/>
       </p:transition>
     </mc:Choice>
-    <mc:Fallback>
+    <mc:Fallback xmlns="">
       <p:transition spd="slow">
         <p:fade/>
       </p:transition>
@@ -7799,7 +7798,7 @@
           <a:p>
             <a:fld id="{7DC7A930-E568-44E6-84ED-3BB4016E0373}" type="datetime1">
               <a:rPr lang="en-US" smtClean="0"/>
-              <a:t>1/3/2021</a:t>
+              <a:t>1/4/2021</a:t>
             </a:fld>
             <a:endParaRPr lang="en-US"/>
           </a:p>
@@ -7857,13 +7856,13 @@
   <p:clrMapOvr>
     <a:masterClrMapping/>
   </p:clrMapOvr>
-  <mc:AlternateContent xmlns:mc="http://schemas.openxmlformats.org/markup-compatibility/2006">
-    <mc:Choice xmlns:p15="http://schemas.microsoft.com/office/powerpoint/2012/main" Requires="p15">
+  <mc:AlternateContent xmlns:mc="http://schemas.openxmlformats.org/markup-compatibility/2006" xmlns:p15="http://schemas.microsoft.com/office/powerpoint/2012/main">
+    <mc:Choice Requires="p15">
       <p:transition xmlns:p14="http://schemas.microsoft.com/office/powerpoint/2010/main" spd="slow" p14:dur="1250">
         <p15:prstTrans prst="peelOff"/>
       </p:transition>
     </mc:Choice>
-    <mc:Fallback>
+    <mc:Fallback xmlns="">
       <p:transition spd="slow">
         <p:fade/>
       </p:transition>
@@ -8061,7 +8060,7 @@
           <a:p>
             <a:fld id="{14DF841F-E273-470C-888B-487BE062E0B0}" type="datetime1">
               <a:rPr lang="en-US" smtClean="0"/>
-              <a:t>1/3/2021</a:t>
+              <a:t>1/4/2021</a:t>
             </a:fld>
             <a:endParaRPr lang="en-US"/>
           </a:p>
@@ -8119,13 +8118,13 @@
   <p:clrMapOvr>
     <a:masterClrMapping/>
   </p:clrMapOvr>
-  <mc:AlternateContent xmlns:mc="http://schemas.openxmlformats.org/markup-compatibility/2006">
-    <mc:Choice xmlns:p15="http://schemas.microsoft.com/office/powerpoint/2012/main" Requires="p15">
+  <mc:AlternateContent xmlns:mc="http://schemas.openxmlformats.org/markup-compatibility/2006" xmlns:p15="http://schemas.microsoft.com/office/powerpoint/2012/main">
+    <mc:Choice Requires="p15">
       <p:transition xmlns:p14="http://schemas.microsoft.com/office/powerpoint/2010/main" spd="slow" p14:dur="1250">
         <p15:prstTrans prst="peelOff"/>
       </p:transition>
     </mc:Choice>
-    <mc:Fallback>
+    <mc:Fallback xmlns="">
       <p:transition spd="slow">
         <p:fade/>
       </p:transition>
@@ -8305,7 +8304,7 @@
           <a:p>
             <a:fld id="{7976C994-3276-415C-8876-D8A57D02FBEA}" type="datetime1">
               <a:rPr lang="en-US" smtClean="0"/>
-              <a:t>1/3/2021</a:t>
+              <a:t>1/4/2021</a:t>
             </a:fld>
             <a:endParaRPr lang="en-US"/>
           </a:p>
@@ -8363,13 +8362,13 @@
   <p:clrMapOvr>
     <a:masterClrMapping/>
   </p:clrMapOvr>
-  <mc:AlternateContent xmlns:mc="http://schemas.openxmlformats.org/markup-compatibility/2006">
-    <mc:Choice xmlns:p15="http://schemas.microsoft.com/office/powerpoint/2012/main" Requires="p15">
+  <mc:AlternateContent xmlns:mc="http://schemas.openxmlformats.org/markup-compatibility/2006" xmlns:p15="http://schemas.microsoft.com/office/powerpoint/2012/main">
+    <mc:Choice Requires="p15">
       <p:transition xmlns:p14="http://schemas.microsoft.com/office/powerpoint/2010/main" spd="slow" p14:dur="1250">
         <p15:prstTrans prst="peelOff"/>
       </p:transition>
     </mc:Choice>
-    <mc:Fallback>
+    <mc:Fallback xmlns="">
       <p:transition spd="slow">
         <p:fade/>
       </p:transition>
@@ -8698,7 +8697,7 @@
           <a:p>
             <a:fld id="{957CF569-10E6-499B-B10A-368AE7881220}" type="datetime1">
               <a:rPr lang="en-US" smtClean="0"/>
-              <a:t>1/3/2021</a:t>
+              <a:t>1/4/2021</a:t>
             </a:fld>
             <a:endParaRPr lang="en-US"/>
           </a:p>
@@ -8756,13 +8755,13 @@
   <p:clrMapOvr>
     <a:masterClrMapping/>
   </p:clrMapOvr>
-  <mc:AlternateContent xmlns:mc="http://schemas.openxmlformats.org/markup-compatibility/2006">
-    <mc:Choice xmlns:p15="http://schemas.microsoft.com/office/powerpoint/2012/main" Requires="p15">
+  <mc:AlternateContent xmlns:mc="http://schemas.openxmlformats.org/markup-compatibility/2006" xmlns:p15="http://schemas.microsoft.com/office/powerpoint/2012/main">
+    <mc:Choice Requires="p15">
       <p:transition xmlns:p14="http://schemas.microsoft.com/office/powerpoint/2010/main" spd="slow" p14:dur="1250">
         <p15:prstTrans prst="peelOff"/>
       </p:transition>
     </mc:Choice>
-    <mc:Fallback>
+    <mc:Fallback xmlns="">
       <p:transition spd="slow">
         <p:fade/>
       </p:transition>
@@ -8828,7 +8827,7 @@
           <a:p>
             <a:fld id="{2B558DD0-02EC-4237-86A7-F584E5F12E9D}" type="datetime1">
               <a:rPr lang="en-US" smtClean="0"/>
-              <a:t>1/3/2021</a:t>
+              <a:t>1/4/2021</a:t>
             </a:fld>
             <a:endParaRPr lang="en-US"/>
           </a:p>
@@ -8886,13 +8885,13 @@
   <p:clrMapOvr>
     <a:masterClrMapping/>
   </p:clrMapOvr>
-  <mc:AlternateContent xmlns:mc="http://schemas.openxmlformats.org/markup-compatibility/2006">
-    <mc:Choice xmlns:p15="http://schemas.microsoft.com/office/powerpoint/2012/main" Requires="p15">
+  <mc:AlternateContent xmlns:mc="http://schemas.openxmlformats.org/markup-compatibility/2006" xmlns:p15="http://schemas.microsoft.com/office/powerpoint/2012/main">
+    <mc:Choice Requires="p15">
       <p:transition xmlns:p14="http://schemas.microsoft.com/office/powerpoint/2010/main" spd="slow" p14:dur="1250">
         <p15:prstTrans prst="peelOff"/>
       </p:transition>
     </mc:Choice>
-    <mc:Fallback>
+    <mc:Fallback xmlns="">
       <p:transition spd="slow">
         <p:fade/>
       </p:transition>
@@ -8935,7 +8934,7 @@
           <a:p>
             <a:fld id="{6CDF8AA9-4674-4D39-A1B3-0222990FE499}" type="datetime1">
               <a:rPr lang="en-US" smtClean="0"/>
-              <a:t>1/3/2021</a:t>
+              <a:t>1/4/2021</a:t>
             </a:fld>
             <a:endParaRPr lang="en-US"/>
           </a:p>
@@ -8993,13 +8992,13 @@
   <p:clrMapOvr>
     <a:masterClrMapping/>
   </p:clrMapOvr>
-  <mc:AlternateContent xmlns:mc="http://schemas.openxmlformats.org/markup-compatibility/2006">
-    <mc:Choice xmlns:p15="http://schemas.microsoft.com/office/powerpoint/2012/main" Requires="p15">
+  <mc:AlternateContent xmlns:mc="http://schemas.openxmlformats.org/markup-compatibility/2006" xmlns:p15="http://schemas.microsoft.com/office/powerpoint/2012/main">
+    <mc:Choice Requires="p15">
       <p:transition xmlns:p14="http://schemas.microsoft.com/office/powerpoint/2010/main" spd="slow" p14:dur="1250">
         <p15:prstTrans prst="peelOff"/>
       </p:transition>
     </mc:Choice>
-    <mc:Fallback>
+    <mc:Fallback xmlns="">
       <p:transition spd="slow">
         <p:fade/>
       </p:transition>
@@ -9196,7 +9195,7 @@
           <a:p>
             <a:fld id="{385EDE88-5D12-4E0B-86B8-96CC48680CD5}" type="datetime1">
               <a:rPr lang="en-US" smtClean="0"/>
-              <a:t>1/3/2021</a:t>
+              <a:t>1/4/2021</a:t>
             </a:fld>
             <a:endParaRPr lang="en-US"/>
           </a:p>
@@ -9254,13 +9253,13 @@
   <p:clrMapOvr>
     <a:masterClrMapping/>
   </p:clrMapOvr>
-  <mc:AlternateContent xmlns:mc="http://schemas.openxmlformats.org/markup-compatibility/2006">
-    <mc:Choice xmlns:p15="http://schemas.microsoft.com/office/powerpoint/2012/main" Requires="p15">
+  <mc:AlternateContent xmlns:mc="http://schemas.openxmlformats.org/markup-compatibility/2006" xmlns:p15="http://schemas.microsoft.com/office/powerpoint/2012/main">
+    <mc:Choice Requires="p15">
       <p:transition xmlns:p14="http://schemas.microsoft.com/office/powerpoint/2010/main" spd="slow" p14:dur="1250">
         <p15:prstTrans prst="peelOff"/>
       </p:transition>
     </mc:Choice>
-    <mc:Fallback>
+    <mc:Fallback xmlns="">
       <p:transition spd="slow">
         <p:fade/>
       </p:transition>
@@ -9488,7 +9487,7 @@
           <a:p>
             <a:fld id="{1A5064E6-1AA0-4DA4-AF2E-267D28A9CDE4}" type="datetime1">
               <a:rPr lang="en-US" smtClean="0"/>
-              <a:t>1/3/2021</a:t>
+              <a:t>1/4/2021</a:t>
             </a:fld>
             <a:endParaRPr lang="en-US"/>
           </a:p>
@@ -9546,13 +9545,13 @@
   <p:clrMapOvr>
     <a:masterClrMapping/>
   </p:clrMapOvr>
-  <mc:AlternateContent xmlns:mc="http://schemas.openxmlformats.org/markup-compatibility/2006">
-    <mc:Choice xmlns:p15="http://schemas.microsoft.com/office/powerpoint/2012/main" Requires="p15">
+  <mc:AlternateContent xmlns:mc="http://schemas.openxmlformats.org/markup-compatibility/2006" xmlns:p15="http://schemas.microsoft.com/office/powerpoint/2012/main">
+    <mc:Choice Requires="p15">
       <p:transition xmlns:p14="http://schemas.microsoft.com/office/powerpoint/2010/main" spd="slow" p14:dur="1250">
         <p15:prstTrans prst="peelOff"/>
       </p:transition>
     </mc:Choice>
-    <mc:Fallback>
+    <mc:Fallback xmlns="">
       <p:transition spd="slow">
         <p:fade/>
       </p:transition>
@@ -9616,7 +9615,7 @@
           <a:noFill/>
           <a:extLst>
             <a:ext uri="{909E8E84-426E-40dd-AFC4-6F175D3DCCD1}">
-              <a14:hiddenFill xmlns:a14="http://schemas.microsoft.com/office/drawing/2010/main" xmlns="">
+              <a14:hiddenFill xmlns="" xmlns:a14="http://schemas.microsoft.com/office/drawing/2010/main">
                 <a:solidFill>
                   <a:srgbClr val="FFFFFF"/>
                 </a:solidFill>
@@ -9690,7 +9689,7 @@
               </a:ln>
               <a:extLst>
                 <a:ext uri="{91240B29-F687-4f45-9708-019B960494DF}">
-                  <a14:hiddenLine xmlns:a14="http://schemas.microsoft.com/office/drawing/2010/main" xmlns="" w="9525">
+                  <a14:hiddenLine xmlns="" xmlns:a14="http://schemas.microsoft.com/office/drawing/2010/main" w="9525">
                     <a:solidFill>
                       <a:srgbClr val="000000"/>
                     </a:solidFill>
@@ -9780,7 +9779,7 @@
               </a:ln>
               <a:extLst>
                 <a:ext uri="{91240B29-F687-4f45-9708-019B960494DF}">
-                  <a14:hiddenLine xmlns:a14="http://schemas.microsoft.com/office/drawing/2010/main" xmlns="" w="9525">
+                  <a14:hiddenLine xmlns="" xmlns:a14="http://schemas.microsoft.com/office/drawing/2010/main" w="9525">
                     <a:solidFill>
                       <a:srgbClr val="000000"/>
                     </a:solidFill>
@@ -9870,7 +9869,7 @@
               </a:ln>
               <a:extLst>
                 <a:ext uri="{91240B29-F687-4f45-9708-019B960494DF}">
-                  <a14:hiddenLine xmlns:a14="http://schemas.microsoft.com/office/drawing/2010/main" xmlns="" w="9525">
+                  <a14:hiddenLine xmlns="" xmlns:a14="http://schemas.microsoft.com/office/drawing/2010/main" w="9525">
                     <a:solidFill>
                       <a:srgbClr val="000000"/>
                     </a:solidFill>
@@ -9932,7 +9931,7 @@
               </a:ln>
               <a:extLst>
                 <a:ext uri="{91240B29-F687-4f45-9708-019B960494DF}">
-                  <a14:hiddenLine xmlns:a14="http://schemas.microsoft.com/office/drawing/2010/main" xmlns="" w="9525">
+                  <a14:hiddenLine xmlns="" xmlns:a14="http://schemas.microsoft.com/office/drawing/2010/main" w="9525">
                     <a:solidFill>
                       <a:srgbClr val="000000"/>
                     </a:solidFill>
@@ -10022,7 +10021,7 @@
               </a:ln>
               <a:extLst>
                 <a:ext uri="{91240B29-F687-4f45-9708-019B960494DF}">
-                  <a14:hiddenLine xmlns:a14="http://schemas.microsoft.com/office/drawing/2010/main" xmlns="" w="9525">
+                  <a14:hiddenLine xmlns="" xmlns:a14="http://schemas.microsoft.com/office/drawing/2010/main" w="9525">
                     <a:solidFill>
                       <a:srgbClr val="000000"/>
                     </a:solidFill>
@@ -10084,7 +10083,7 @@
               </a:ln>
               <a:extLst>
                 <a:ext uri="{91240B29-F687-4f45-9708-019B960494DF}">
-                  <a14:hiddenLine xmlns:a14="http://schemas.microsoft.com/office/drawing/2010/main" xmlns="" w="9525">
+                  <a14:hiddenLine xmlns="" xmlns:a14="http://schemas.microsoft.com/office/drawing/2010/main" w="9525">
                     <a:solidFill>
                       <a:srgbClr val="000000"/>
                     </a:solidFill>
@@ -10146,7 +10145,7 @@
               </a:ln>
               <a:extLst>
                 <a:ext uri="{91240B29-F687-4f45-9708-019B960494DF}">
-                  <a14:hiddenLine xmlns:a14="http://schemas.microsoft.com/office/drawing/2010/main" xmlns="" w="9525">
+                  <a14:hiddenLine xmlns="" xmlns:a14="http://schemas.microsoft.com/office/drawing/2010/main" w="9525">
                     <a:solidFill>
                       <a:srgbClr val="000000"/>
                     </a:solidFill>
@@ -10236,7 +10235,7 @@
               </a:ln>
               <a:extLst>
                 <a:ext uri="{91240B29-F687-4f45-9708-019B960494DF}">
-                  <a14:hiddenLine xmlns:a14="http://schemas.microsoft.com/office/drawing/2010/main" xmlns="" w="9525">
+                  <a14:hiddenLine xmlns="" xmlns:a14="http://schemas.microsoft.com/office/drawing/2010/main" w="9525">
                     <a:solidFill>
                       <a:srgbClr val="000000"/>
                     </a:solidFill>
@@ -10326,7 +10325,7 @@
               </a:ln>
               <a:extLst>
                 <a:ext uri="{91240B29-F687-4f45-9708-019B960494DF}">
-                  <a14:hiddenLine xmlns:a14="http://schemas.microsoft.com/office/drawing/2010/main" xmlns="" w="9525">
+                  <a14:hiddenLine xmlns="" xmlns:a14="http://schemas.microsoft.com/office/drawing/2010/main" w="9525">
                     <a:solidFill>
                       <a:srgbClr val="000000"/>
                     </a:solidFill>
@@ -10388,7 +10387,7 @@
               </a:ln>
               <a:extLst>
                 <a:ext uri="{91240B29-F687-4f45-9708-019B960494DF}">
-                  <a14:hiddenLine xmlns:a14="http://schemas.microsoft.com/office/drawing/2010/main" xmlns="" w="9525">
+                  <a14:hiddenLine xmlns="" xmlns:a14="http://schemas.microsoft.com/office/drawing/2010/main" w="9525">
                     <a:solidFill>
                       <a:srgbClr val="000000"/>
                     </a:solidFill>
@@ -10498,7 +10497,7 @@
               </a:ln>
               <a:extLst>
                 <a:ext uri="{91240B29-F687-4f45-9708-019B960494DF}">
-                  <a14:hiddenLine xmlns:a14="http://schemas.microsoft.com/office/drawing/2010/main" xmlns="" w="9525">
+                  <a14:hiddenLine xmlns="" xmlns:a14="http://schemas.microsoft.com/office/drawing/2010/main" w="9525">
                     <a:solidFill>
                       <a:srgbClr val="000000"/>
                     </a:solidFill>
@@ -10582,7 +10581,7 @@
               </a:ln>
               <a:extLst>
                 <a:ext uri="{91240B29-F687-4f45-9708-019B960494DF}">
-                  <a14:hiddenLine xmlns:a14="http://schemas.microsoft.com/office/drawing/2010/main" xmlns="" w="9525">
+                  <a14:hiddenLine xmlns="" xmlns:a14="http://schemas.microsoft.com/office/drawing/2010/main" w="9525">
                     <a:solidFill>
                       <a:srgbClr val="000000"/>
                     </a:solidFill>
@@ -10644,7 +10643,7 @@
               </a:ln>
               <a:extLst>
                 <a:ext uri="{91240B29-F687-4f45-9708-019B960494DF}">
-                  <a14:hiddenLine xmlns:a14="http://schemas.microsoft.com/office/drawing/2010/main" xmlns="" w="9525">
+                  <a14:hiddenLine xmlns="" xmlns:a14="http://schemas.microsoft.com/office/drawing/2010/main" w="9525">
                     <a:solidFill>
                       <a:srgbClr val="000000"/>
                     </a:solidFill>
@@ -10706,7 +10705,7 @@
               </a:ln>
               <a:extLst>
                 <a:ext uri="{91240B29-F687-4f45-9708-019B960494DF}">
-                  <a14:hiddenLine xmlns:a14="http://schemas.microsoft.com/office/drawing/2010/main" xmlns="" w="9525">
+                  <a14:hiddenLine xmlns="" xmlns:a14="http://schemas.microsoft.com/office/drawing/2010/main" w="9525">
                     <a:solidFill>
                       <a:srgbClr val="000000"/>
                     </a:solidFill>
@@ -10796,7 +10795,7 @@
               </a:ln>
               <a:extLst>
                 <a:ext uri="{91240B29-F687-4f45-9708-019B960494DF}">
-                  <a14:hiddenLine xmlns:a14="http://schemas.microsoft.com/office/drawing/2010/main" xmlns="" w="9525">
+                  <a14:hiddenLine xmlns="" xmlns:a14="http://schemas.microsoft.com/office/drawing/2010/main" w="9525">
                     <a:solidFill>
                       <a:srgbClr val="000000"/>
                     </a:solidFill>
@@ -10830,7 +10829,7 @@
               </a:ln>
               <a:extLst>
                 <a:ext uri="{91240B29-F687-4f45-9708-019B960494DF}">
-                  <a14:hiddenLine xmlns:a14="http://schemas.microsoft.com/office/drawing/2010/main" xmlns="" w="9525">
+                  <a14:hiddenLine xmlns="" xmlns:a14="http://schemas.microsoft.com/office/drawing/2010/main" w="9525">
                     <a:solidFill>
                       <a:srgbClr val="000000"/>
                     </a:solidFill>
@@ -10895,7 +10894,7 @@
               </a:ln>
               <a:extLst>
                 <a:ext uri="{91240B29-F687-4f45-9708-019B960494DF}">
-                  <a14:hiddenLine xmlns:a14="http://schemas.microsoft.com/office/drawing/2010/main" xmlns="" w="9525">
+                  <a14:hiddenLine xmlns="" xmlns:a14="http://schemas.microsoft.com/office/drawing/2010/main" w="9525">
                     <a:solidFill>
                       <a:srgbClr val="000000"/>
                     </a:solidFill>
@@ -10985,7 +10984,7 @@
               </a:ln>
               <a:extLst>
                 <a:ext uri="{91240B29-F687-4f45-9708-019B960494DF}">
-                  <a14:hiddenLine xmlns:a14="http://schemas.microsoft.com/office/drawing/2010/main" xmlns="" w="9525">
+                  <a14:hiddenLine xmlns="" xmlns:a14="http://schemas.microsoft.com/office/drawing/2010/main" w="9525">
                     <a:solidFill>
                       <a:srgbClr val="000000"/>
                     </a:solidFill>
@@ -11047,7 +11046,7 @@
               </a:ln>
               <a:extLst>
                 <a:ext uri="{91240B29-F687-4f45-9708-019B960494DF}">
-                  <a14:hiddenLine xmlns:a14="http://schemas.microsoft.com/office/drawing/2010/main" xmlns="" w="9525">
+                  <a14:hiddenLine xmlns="" xmlns:a14="http://schemas.microsoft.com/office/drawing/2010/main" w="9525">
                     <a:solidFill>
                       <a:srgbClr val="000000"/>
                     </a:solidFill>
@@ -11137,7 +11136,7 @@
               </a:ln>
               <a:extLst>
                 <a:ext uri="{91240B29-F687-4f45-9708-019B960494DF}">
-                  <a14:hiddenLine xmlns:a14="http://schemas.microsoft.com/office/drawing/2010/main" xmlns="" w="9525">
+                  <a14:hiddenLine xmlns="" xmlns:a14="http://schemas.microsoft.com/office/drawing/2010/main" w="9525">
                     <a:solidFill>
                       <a:srgbClr val="000000"/>
                     </a:solidFill>
@@ -11202,7 +11201,7 @@
               </a:ln>
               <a:extLst>
                 <a:ext uri="{91240B29-F687-4f45-9708-019B960494DF}">
-                  <a14:hiddenLine xmlns:a14="http://schemas.microsoft.com/office/drawing/2010/main" xmlns="" w="9525">
+                  <a14:hiddenLine xmlns="" xmlns:a14="http://schemas.microsoft.com/office/drawing/2010/main" w="9525">
                     <a:solidFill>
                       <a:srgbClr val="000000"/>
                     </a:solidFill>
@@ -11264,7 +11263,7 @@
               </a:ln>
               <a:extLst>
                 <a:ext uri="{91240B29-F687-4f45-9708-019B960494DF}">
-                  <a14:hiddenLine xmlns:a14="http://schemas.microsoft.com/office/drawing/2010/main" xmlns="" w="9525">
+                  <a14:hiddenLine xmlns="" xmlns:a14="http://schemas.microsoft.com/office/drawing/2010/main" w="9525">
                     <a:solidFill>
                       <a:srgbClr val="000000"/>
                     </a:solidFill>
@@ -11354,7 +11353,7 @@
               </a:ln>
               <a:extLst>
                 <a:ext uri="{91240B29-F687-4f45-9708-019B960494DF}">
-                  <a14:hiddenLine xmlns:a14="http://schemas.microsoft.com/office/drawing/2010/main" xmlns="" w="9525">
+                  <a14:hiddenLine xmlns="" xmlns:a14="http://schemas.microsoft.com/office/drawing/2010/main" w="9525">
                     <a:solidFill>
                       <a:srgbClr val="000000"/>
                     </a:solidFill>
@@ -11444,7 +11443,7 @@
               </a:ln>
               <a:extLst>
                 <a:ext uri="{91240B29-F687-4f45-9708-019B960494DF}">
-                  <a14:hiddenLine xmlns:a14="http://schemas.microsoft.com/office/drawing/2010/main" xmlns="" w="9525">
+                  <a14:hiddenLine xmlns="" xmlns:a14="http://schemas.microsoft.com/office/drawing/2010/main" w="9525">
                     <a:solidFill>
                       <a:srgbClr val="000000"/>
                     </a:solidFill>
@@ -11509,7 +11508,7 @@
               </a:ln>
               <a:extLst>
                 <a:ext uri="{91240B29-F687-4f45-9708-019B960494DF}">
-                  <a14:hiddenLine xmlns:a14="http://schemas.microsoft.com/office/drawing/2010/main" xmlns="" w="9525">
+                  <a14:hiddenLine xmlns="" xmlns:a14="http://schemas.microsoft.com/office/drawing/2010/main" w="9525">
                     <a:solidFill>
                       <a:srgbClr val="000000"/>
                     </a:solidFill>
@@ -11629,7 +11628,7 @@
               </a:ln>
               <a:extLst>
                 <a:ext uri="{91240B29-F687-4f45-9708-019B960494DF}">
-                  <a14:hiddenLine xmlns:a14="http://schemas.microsoft.com/office/drawing/2010/main" xmlns="" w="9525">
+                  <a14:hiddenLine xmlns="" xmlns:a14="http://schemas.microsoft.com/office/drawing/2010/main" w="9525">
                     <a:solidFill>
                       <a:srgbClr val="000000"/>
                     </a:solidFill>
@@ -11727,7 +11726,7 @@
               </a:ln>
               <a:extLst>
                 <a:ext uri="{91240B29-F687-4f45-9708-019B960494DF}">
-                  <a14:hiddenLine xmlns:a14="http://schemas.microsoft.com/office/drawing/2010/main" xmlns="" w="9525">
+                  <a14:hiddenLine xmlns="" xmlns:a14="http://schemas.microsoft.com/office/drawing/2010/main" w="9525">
                     <a:solidFill>
                       <a:srgbClr val="000000"/>
                     </a:solidFill>
@@ -11842,7 +11841,7 @@
               </a:ln>
               <a:extLst>
                 <a:ext uri="{91240B29-F687-4f45-9708-019B960494DF}">
-                  <a14:hiddenLine xmlns:a14="http://schemas.microsoft.com/office/drawing/2010/main" xmlns="" w="9525">
+                  <a14:hiddenLine xmlns="" xmlns:a14="http://schemas.microsoft.com/office/drawing/2010/main" w="9525">
                     <a:solidFill>
                       <a:srgbClr val="000000"/>
                     </a:solidFill>
@@ -11932,7 +11931,7 @@
               </a:ln>
               <a:extLst>
                 <a:ext uri="{91240B29-F687-4f45-9708-019B960494DF}">
-                  <a14:hiddenLine xmlns:a14="http://schemas.microsoft.com/office/drawing/2010/main" xmlns="" w="9525">
+                  <a14:hiddenLine xmlns="" xmlns:a14="http://schemas.microsoft.com/office/drawing/2010/main" w="9525">
                     <a:solidFill>
                       <a:srgbClr val="000000"/>
                     </a:solidFill>
@@ -11997,7 +11996,7 @@
               </a:ln>
               <a:extLst>
                 <a:ext uri="{91240B29-F687-4f45-9708-019B960494DF}">
-                  <a14:hiddenLine xmlns:a14="http://schemas.microsoft.com/office/drawing/2010/main" xmlns="" w="9525">
+                  <a14:hiddenLine xmlns="" xmlns:a14="http://schemas.microsoft.com/office/drawing/2010/main" w="9525">
                     <a:solidFill>
                       <a:srgbClr val="000000"/>
                     </a:solidFill>
@@ -12087,7 +12086,7 @@
               </a:ln>
               <a:extLst>
                 <a:ext uri="{91240B29-F687-4f45-9708-019B960494DF}">
-                  <a14:hiddenLine xmlns:a14="http://schemas.microsoft.com/office/drawing/2010/main" xmlns="" w="9525">
+                  <a14:hiddenLine xmlns="" xmlns:a14="http://schemas.microsoft.com/office/drawing/2010/main" w="9525">
                     <a:solidFill>
                       <a:srgbClr val="000000"/>
                     </a:solidFill>
@@ -12155,7 +12154,7 @@
               </a:ln>
               <a:extLst>
                 <a:ext uri="{91240B29-F687-4f45-9708-019B960494DF}">
-                  <a14:hiddenLine xmlns:a14="http://schemas.microsoft.com/office/drawing/2010/main" xmlns="" w="9525">
+                  <a14:hiddenLine xmlns="" xmlns:a14="http://schemas.microsoft.com/office/drawing/2010/main" w="9525">
                     <a:solidFill>
                       <a:srgbClr val="000000"/>
                     </a:solidFill>
@@ -12245,7 +12244,7 @@
               </a:ln>
               <a:extLst>
                 <a:ext uri="{91240B29-F687-4f45-9708-019B960494DF}">
-                  <a14:hiddenLine xmlns:a14="http://schemas.microsoft.com/office/drawing/2010/main" xmlns="" w="9525">
+                  <a14:hiddenLine xmlns="" xmlns:a14="http://schemas.microsoft.com/office/drawing/2010/main" w="9525">
                     <a:solidFill>
                       <a:srgbClr val="000000"/>
                     </a:solidFill>
@@ -12313,7 +12312,7 @@
               </a:ln>
               <a:extLst>
                 <a:ext uri="{91240B29-F687-4f45-9708-019B960494DF}">
-                  <a14:hiddenLine xmlns:a14="http://schemas.microsoft.com/office/drawing/2010/main" xmlns="" w="9525">
+                  <a14:hiddenLine xmlns="" xmlns:a14="http://schemas.microsoft.com/office/drawing/2010/main" w="9525">
                     <a:solidFill>
                       <a:srgbClr val="000000"/>
                     </a:solidFill>
@@ -12403,7 +12402,7 @@
               </a:ln>
               <a:extLst>
                 <a:ext uri="{91240B29-F687-4f45-9708-019B960494DF}">
-                  <a14:hiddenLine xmlns:a14="http://schemas.microsoft.com/office/drawing/2010/main" xmlns="" w="9525">
+                  <a14:hiddenLine xmlns="" xmlns:a14="http://schemas.microsoft.com/office/drawing/2010/main" w="9525">
                     <a:solidFill>
                       <a:srgbClr val="000000"/>
                     </a:solidFill>
@@ -12437,7 +12436,7 @@
               </a:ln>
               <a:extLst>
                 <a:ext uri="{91240B29-F687-4f45-9708-019B960494DF}">
-                  <a14:hiddenLine xmlns:a14="http://schemas.microsoft.com/office/drawing/2010/main" xmlns="" w="9525">
+                  <a14:hiddenLine xmlns="" xmlns:a14="http://schemas.microsoft.com/office/drawing/2010/main" w="9525">
                     <a:solidFill>
                       <a:srgbClr val="000000"/>
                     </a:solidFill>
@@ -12577,7 +12576,7 @@
           <a:p>
             <a:fld id="{97D301C7-A48F-46B4-9988-324187293CA9}" type="datetime1">
               <a:rPr lang="en-US" smtClean="0"/>
-              <a:t>1/3/2021</a:t>
+              <a:t>1/4/2021</a:t>
             </a:fld>
             <a:endParaRPr lang="en-US"/>
           </a:p>
@@ -12688,13 +12687,13 @@
     <p:sldLayoutId id="2147483694" r:id="rId16"/>
     <p:sldLayoutId id="2147483695" r:id="rId17"/>
   </p:sldLayoutIdLst>
-  <mc:AlternateContent xmlns:mc="http://schemas.openxmlformats.org/markup-compatibility/2006">
-    <mc:Choice xmlns:p15="http://schemas.microsoft.com/office/powerpoint/2012/main" Requires="p15">
+  <mc:AlternateContent xmlns:mc="http://schemas.openxmlformats.org/markup-compatibility/2006" xmlns:p15="http://schemas.microsoft.com/office/powerpoint/2012/main">
+    <mc:Choice Requires="p15">
       <p:transition xmlns:p14="http://schemas.microsoft.com/office/powerpoint/2010/main" spd="slow" p14:dur="1250">
         <p15:prstTrans prst="peelOff"/>
       </p:transition>
     </mc:Choice>
-    <mc:Fallback>
+    <mc:Fallback xmlns="">
       <p:transition spd="slow">
         <p:fade/>
       </p:transition>
@@ -13304,25 +13303,18 @@
   <p:clrMapOvr>
     <a:masterClrMapping/>
   </p:clrMapOvr>
-  <mc:AlternateContent xmlns:mc="http://schemas.openxmlformats.org/markup-compatibility/2006">
-    <mc:Choice xmlns:p15="http://schemas.microsoft.com/office/powerpoint/2012/main" Requires="p15">
+  <mc:AlternateContent xmlns:mc="http://schemas.openxmlformats.org/markup-compatibility/2006" xmlns:p15="http://schemas.microsoft.com/office/powerpoint/2012/main">
+    <mc:Choice Requires="p15">
       <p:transition xmlns:p14="http://schemas.microsoft.com/office/powerpoint/2010/main" spd="slow" p14:dur="1250">
         <p15:prstTrans prst="peelOff"/>
       </p:transition>
     </mc:Choice>
-    <mc:Fallback>
+    <mc:Fallback xmlns="">
       <p:transition spd="slow">
         <p:fade/>
       </p:transition>
     </mc:Fallback>
   </mc:AlternateContent>
-  <p:timing>
-    <p:tnLst>
-      <p:par>
-        <p:cTn id="1" dur="indefinite" restart="never" nodeType="tmRoot"/>
-      </p:par>
-    </p:tnLst>
-  </p:timing>
 </p:sld>
 </file>
 
@@ -13460,25 +13452,18 @@
   <p:clrMapOvr>
     <a:masterClrMapping/>
   </p:clrMapOvr>
-  <mc:AlternateContent xmlns:mc="http://schemas.openxmlformats.org/markup-compatibility/2006">
-    <mc:Choice xmlns:p15="http://schemas.microsoft.com/office/powerpoint/2012/main" Requires="p15">
+  <mc:AlternateContent xmlns:mc="http://schemas.openxmlformats.org/markup-compatibility/2006" xmlns:p15="http://schemas.microsoft.com/office/powerpoint/2012/main">
+    <mc:Choice Requires="p15">
       <p:transition xmlns:p14="http://schemas.microsoft.com/office/powerpoint/2010/main" spd="slow" p14:dur="1250">
         <p15:prstTrans prst="peelOff"/>
       </p:transition>
     </mc:Choice>
-    <mc:Fallback>
+    <mc:Fallback xmlns="">
       <p:transition spd="slow">
         <p:fade/>
       </p:transition>
     </mc:Fallback>
   </mc:AlternateContent>
-  <p:timing>
-    <p:tnLst>
-      <p:par>
-        <p:cTn id="1" dur="indefinite" restart="never" nodeType="tmRoot"/>
-      </p:par>
-    </p:tnLst>
-  </p:timing>
 </p:sld>
 </file>
 
@@ -14217,7 +14202,7 @@
                     <a:lstStyle/>
                     <a:p>
                       <a:r>
-                        <a:rPr lang="en-US" dirty="0" smtClean="0">
+                        <a:rPr lang="en-US" dirty="0">
                           <a:hlinkClick r:id="rId2"/>
                         </a:rPr>
                         <a:t>Click here</a:t>
@@ -14548,7 +14533,7 @@
                     <a:lstStyle/>
                     <a:p>
                       <a:r>
-                        <a:rPr lang="en-US" dirty="0" smtClean="0">
+                        <a:rPr lang="en-US" dirty="0">
                           <a:hlinkClick r:id="rId3"/>
                         </a:rPr>
                         <a:t>Click here</a:t>
@@ -14652,25 +14637,18 @@
   <p:clrMapOvr>
     <a:masterClrMapping/>
   </p:clrMapOvr>
-  <mc:AlternateContent xmlns:mc="http://schemas.openxmlformats.org/markup-compatibility/2006">
-    <mc:Choice xmlns:p15="http://schemas.microsoft.com/office/powerpoint/2012/main" Requires="p15">
+  <mc:AlternateContent xmlns:mc="http://schemas.openxmlformats.org/markup-compatibility/2006" xmlns:p15="http://schemas.microsoft.com/office/powerpoint/2012/main">
+    <mc:Choice Requires="p15">
       <p:transition xmlns:p14="http://schemas.microsoft.com/office/powerpoint/2010/main" spd="slow" p14:dur="1250">
         <p15:prstTrans prst="peelOff"/>
       </p:transition>
     </mc:Choice>
-    <mc:Fallback>
+    <mc:Fallback xmlns="">
       <p:transition spd="slow">
         <p:fade/>
       </p:transition>
     </mc:Fallback>
   </mc:AlternateContent>
-  <p:timing>
-    <p:tnLst>
-      <p:par>
-        <p:cTn id="1" dur="indefinite" restart="never" nodeType="tmRoot"/>
-      </p:par>
-    </p:tnLst>
-  </p:timing>
 </p:sld>
 </file>
 
@@ -15100,7 +15078,7 @@
                     <a:lstStyle/>
                     <a:p>
                       <a:r>
-                        <a:rPr lang="en-US" b="0" dirty="0" smtClean="0">
+                        <a:rPr lang="en-US" b="0" dirty="0">
                           <a:solidFill>
                             <a:schemeClr val="bg1"/>
                           </a:solidFill>
@@ -15404,7 +15382,7 @@
                     <a:lstStyle/>
                     <a:p>
                       <a:r>
-                        <a:rPr lang="en-US" dirty="0" smtClean="0">
+                        <a:rPr lang="en-US" dirty="0">
                           <a:solidFill>
                             <a:schemeClr val="bg1">
                               <a:alpha val="50000"/>
@@ -15747,7 +15725,7 @@
                     <a:lstStyle/>
                     <a:p>
                       <a:r>
-                        <a:rPr lang="en-US" dirty="0" smtClean="0">
+                        <a:rPr lang="en-US" dirty="0">
                           <a:hlinkClick r:id="rId4"/>
                         </a:rPr>
                         <a:t>Click here</a:t>
@@ -15814,191 +15792,22 @@
   <p:clrMapOvr>
     <a:masterClrMapping/>
   </p:clrMapOvr>
-  <mc:AlternateContent xmlns:mc="http://schemas.openxmlformats.org/markup-compatibility/2006">
-    <mc:Choice xmlns:p15="http://schemas.microsoft.com/office/powerpoint/2012/main" Requires="p15">
+  <mc:AlternateContent xmlns:mc="http://schemas.openxmlformats.org/markup-compatibility/2006" xmlns:p15="http://schemas.microsoft.com/office/powerpoint/2012/main">
+    <mc:Choice Requires="p15">
       <p:transition xmlns:p14="http://schemas.microsoft.com/office/powerpoint/2010/main" spd="slow" p14:dur="1250">
         <p15:prstTrans prst="peelOff"/>
       </p:transition>
     </mc:Choice>
-    <mc:Fallback>
+    <mc:Fallback xmlns="">
       <p:transition spd="slow">
         <p:fade/>
       </p:transition>
     </mc:Fallback>
   </mc:AlternateContent>
-  <p:timing>
-    <p:tnLst>
-      <p:par>
-        <p:cTn id="1" dur="indefinite" restart="never" nodeType="tmRoot"/>
-      </p:par>
-    </p:tnLst>
-  </p:timing>
 </p:sld>
 </file>
 
 <file path=ppt/slides/slide5.xml><?xml version="1.0" encoding="utf-8"?>
-<p:sld xmlns:a="http://schemas.openxmlformats.org/drawingml/2006/main" xmlns:r="http://schemas.openxmlformats.org/officeDocument/2006/relationships" xmlns:p="http://schemas.openxmlformats.org/presentationml/2006/main">
-  <p:cSld>
-    <p:spTree>
-      <p:nvGrpSpPr>
-        <p:cNvPr id="1" name=""/>
-        <p:cNvGrpSpPr/>
-        <p:nvPr/>
-      </p:nvGrpSpPr>
-      <p:grpSpPr>
-        <a:xfrm>
-          <a:off x="0" y="0"/>
-          <a:ext cx="0" cy="0"/>
-          <a:chOff x="0" y="0"/>
-          <a:chExt cx="0" cy="0"/>
-        </a:xfrm>
-      </p:grpSpPr>
-      <p:sp>
-        <p:nvSpPr>
-          <p:cNvPr id="2" name="Slide Number Placeholder 1">
-            <a:extLst>
-              <a:ext uri="{FF2B5EF4-FFF2-40B4-BE49-F238E27FC236}">
-                <a16:creationId xmlns:a16="http://schemas.microsoft.com/office/drawing/2014/main" id="{FF832A81-494B-4395-952C-9372D0ACB3E2}"/>
-              </a:ext>
-            </a:extLst>
-          </p:cNvPr>
-          <p:cNvSpPr>
-            <a:spLocks noGrp="1"/>
-          </p:cNvSpPr>
-          <p:nvPr>
-            <p:ph type="sldNum" sz="quarter" idx="12"/>
-          </p:nvPr>
-        </p:nvSpPr>
-        <p:spPr/>
-        <p:txBody>
-          <a:bodyPr/>
-          <a:lstStyle/>
-          <a:p>
-            <a:fld id="{B59B104B-9B6C-40D2-938C-E7EC2A71093E}" type="slidenum">
-              <a:rPr lang="en-US" smtClean="0"/>
-              <a:t>5</a:t>
-            </a:fld>
-            <a:endParaRPr lang="en-US"/>
-          </a:p>
-        </p:txBody>
-      </p:sp>
-      <p:sp>
-        <p:nvSpPr>
-          <p:cNvPr id="3" name="TextBox 2">
-            <a:extLst>
-              <a:ext uri="{FF2B5EF4-FFF2-40B4-BE49-F238E27FC236}">
-                <a16:creationId xmlns:a16="http://schemas.microsoft.com/office/drawing/2014/main" id="{5B80F6FD-A96F-4946-958C-E01C6A4688BC}"/>
-              </a:ext>
-            </a:extLst>
-          </p:cNvPr>
-          <p:cNvSpPr txBox="1"/>
-          <p:nvPr/>
-        </p:nvSpPr>
-        <p:spPr>
-          <a:xfrm>
-            <a:off x="942109" y="2971800"/>
-            <a:ext cx="11249891" cy="1754326"/>
-          </a:xfrm>
-          <a:prstGeom prst="rect">
-            <a:avLst/>
-          </a:prstGeom>
-          <a:noFill/>
-        </p:spPr>
-        <p:txBody>
-          <a:bodyPr wrap="square" rtlCol="0">
-            <a:spAutoFit/>
-          </a:bodyPr>
-          <a:lstStyle/>
-          <a:p>
-            <a:pPr marL="342900" indent="-342900">
-              <a:buAutoNum type="arabicPeriod"/>
-            </a:pPr>
-            <a:r>
-              <a:rPr lang="en-IN" dirty="0"/>
-              <a:t>Designing PCB file</a:t>
-            </a:r>
-          </a:p>
-          <a:p>
-            <a:pPr marL="342900" indent="-342900">
-              <a:buAutoNum type="arabicPeriod"/>
-            </a:pPr>
-            <a:r>
-              <a:rPr lang="en-IN" dirty="0"/>
-              <a:t>Generating CSV file</a:t>
-            </a:r>
-          </a:p>
-          <a:p>
-            <a:pPr marL="342900" indent="-342900">
-              <a:buAutoNum type="arabicPeriod"/>
-            </a:pPr>
-            <a:r>
-              <a:rPr lang="en-IN" dirty="0"/>
-              <a:t>Extracting soldering points  from CSV file using Python</a:t>
-            </a:r>
-          </a:p>
-          <a:p>
-            <a:pPr marL="342900" indent="-342900">
-              <a:buAutoNum type="arabicPeriod"/>
-            </a:pPr>
-            <a:r>
-              <a:rPr lang="en-IN" dirty="0"/>
-              <a:t>Calculating steps needed to traverse from one point to another using Python</a:t>
-            </a:r>
-          </a:p>
-          <a:p>
-            <a:pPr marL="342900" indent="-342900">
-              <a:buAutoNum type="arabicPeriod"/>
-            </a:pPr>
-            <a:r>
-              <a:rPr lang="en-IN" dirty="0"/>
-              <a:t> The calculated results  are sent to ESP32(via Bluetooth from PC)</a:t>
-            </a:r>
-          </a:p>
-          <a:p>
-            <a:pPr marL="342900" indent="-342900">
-              <a:buAutoNum type="arabicPeriod"/>
-            </a:pPr>
-            <a:r>
-              <a:rPr lang="en-IN" dirty="0"/>
-              <a:t> ESP32 receives the command wirelessly and controls the actuators</a:t>
-            </a:r>
-            <a:endParaRPr lang="en-US" dirty="0"/>
-          </a:p>
-        </p:txBody>
-      </p:sp>
-    </p:spTree>
-    <p:extLst>
-      <p:ext uri="{BB962C8B-B14F-4D97-AF65-F5344CB8AC3E}">
-        <p14:creationId xmlns:p14="http://schemas.microsoft.com/office/powerpoint/2010/main" val="1755296599"/>
-      </p:ext>
-    </p:extLst>
-  </p:cSld>
-  <p:clrMapOvr>
-    <a:masterClrMapping/>
-  </p:clrMapOvr>
-  <mc:AlternateContent xmlns:mc="http://schemas.openxmlformats.org/markup-compatibility/2006">
-    <mc:Choice xmlns:p15="http://schemas.microsoft.com/office/powerpoint/2012/main" Requires="p15">
-      <p:transition xmlns:p14="http://schemas.microsoft.com/office/powerpoint/2010/main" spd="slow" p14:dur="1250">
-        <p15:prstTrans prst="peelOff"/>
-      </p:transition>
-    </mc:Choice>
-    <mc:Fallback>
-      <p:transition spd="slow">
-        <p:fade/>
-      </p:transition>
-    </mc:Fallback>
-  </mc:AlternateContent>
-  <p:timing>
-    <p:tnLst>
-      <p:par>
-        <p:cTn id="1" dur="indefinite" restart="never" nodeType="tmRoot"/>
-      </p:par>
-    </p:tnLst>
-  </p:timing>
-</p:sld>
-</file>
-
-<file path=ppt/slides/slide6.xml><?xml version="1.0" encoding="utf-8"?>
 <p:sld xmlns:a="http://schemas.openxmlformats.org/drawingml/2006/main" xmlns:r="http://schemas.openxmlformats.org/officeDocument/2006/relationships" xmlns:p="http://schemas.openxmlformats.org/presentationml/2006/main">
   <p:cSld>
     <p:spTree>
@@ -16038,7 +15847,7 @@
           <a:p>
             <a:fld id="{B59B104B-9B6C-40D2-938C-E7EC2A71093E}" type="slidenum">
               <a:rPr lang="en-US" smtClean="0"/>
-              <a:t>6</a:t>
+              <a:t>5</a:t>
             </a:fld>
             <a:endParaRPr lang="en-US"/>
           </a:p>
@@ -16703,7 +16512,7 @@
           <a:p>
             <a:pPr algn="ctr"/>
             <a:r>
-              <a:rPr lang="en-US" sz="4400" b="1" dirty="0" smtClean="0">
+              <a:rPr lang="en-US" sz="4400" b="1" dirty="0">
                 <a:ln w="6600">
                   <a:solidFill>
                     <a:schemeClr val="accent2"/>
@@ -16721,22 +16530,6 @@
               </a:rPr>
               <a:t>BLOCK DIAGRAM</a:t>
             </a:r>
-            <a:endParaRPr lang="en-US" sz="4400" b="1" dirty="0">
-              <a:ln w="6600">
-                <a:solidFill>
-                  <a:schemeClr val="accent2"/>
-                </a:solidFill>
-                <a:prstDash val="solid"/>
-              </a:ln>
-              <a:solidFill>
-                <a:srgbClr val="FFFFFF"/>
-              </a:solidFill>
-              <a:effectLst>
-                <a:outerShdw dist="38100" dir="2700000" algn="tl" rotWithShape="0">
-                  <a:schemeClr val="accent2"/>
-                </a:outerShdw>
-              </a:effectLst>
-            </a:endParaRPr>
           </a:p>
         </p:txBody>
       </p:sp>
@@ -16750,13 +16543,13 @@
   <p:clrMapOvr>
     <a:masterClrMapping/>
   </p:clrMapOvr>
-  <mc:AlternateContent xmlns:mc="http://schemas.openxmlformats.org/markup-compatibility/2006">
-    <mc:Choice xmlns:p15="http://schemas.microsoft.com/office/powerpoint/2012/main" Requires="p15">
+  <mc:AlternateContent xmlns:mc="http://schemas.openxmlformats.org/markup-compatibility/2006" xmlns:p15="http://schemas.microsoft.com/office/powerpoint/2012/main">
+    <mc:Choice Requires="p15">
       <p:transition xmlns:p14="http://schemas.microsoft.com/office/powerpoint/2010/main" spd="slow" p14:dur="1250">
         <p15:prstTrans prst="peelOff"/>
       </p:transition>
     </mc:Choice>
-    <mc:Fallback>
+    <mc:Fallback xmlns="">
       <p:transition spd="slow">
         <p:fade/>
       </p:transition>

</xml_diff>